<commit_message>
Changed link in Objects slides
</commit_message>
<xml_diff>
--- a/ClassMaterials/ObjectIntroAndMisc/Slides/ObjectIntroAndMisc.pptx
+++ b/ClassMaterials/ObjectIntroAndMisc/Slides/ObjectIntroAndMisc.pptx
@@ -228,7 +228,7 @@
           <a:p>
             <a:fld id="{73386005-8F80-1A49-87D1-22EBFA47E352}" type="datetimeFigureOut">
               <a:rPr lang="en-US" smtClean="0"/>
-              <a:t>9/6/2018</a:t>
+              <a:t>9/13/19</a:t>
             </a:fld>
             <a:endParaRPr lang="en-US"/>
           </a:p>
@@ -2278,7 +2278,7 @@
           <a:p>
             <a:fld id="{5B07E745-2C70-2943-8487-A8F6E88ADF5E}" type="datetimeFigureOut">
               <a:rPr lang="en-US" smtClean="0"/>
-              <a:t>9/6/2018</a:t>
+              <a:t>9/13/19</a:t>
             </a:fld>
             <a:endParaRPr lang="en-US"/>
           </a:p>
@@ -2446,7 +2446,7 @@
           <a:p>
             <a:fld id="{5B07E745-2C70-2943-8487-A8F6E88ADF5E}" type="datetimeFigureOut">
               <a:rPr lang="en-US" smtClean="0"/>
-              <a:t>9/6/2018</a:t>
+              <a:t>9/13/19</a:t>
             </a:fld>
             <a:endParaRPr lang="en-US"/>
           </a:p>
@@ -2624,7 +2624,7 @@
           <a:p>
             <a:fld id="{5B07E745-2C70-2943-8487-A8F6E88ADF5E}" type="datetimeFigureOut">
               <a:rPr lang="en-US" smtClean="0"/>
-              <a:t>9/6/2018</a:t>
+              <a:t>9/13/19</a:t>
             </a:fld>
             <a:endParaRPr lang="en-US"/>
           </a:p>
@@ -2792,7 +2792,7 @@
           <a:p>
             <a:fld id="{5B07E745-2C70-2943-8487-A8F6E88ADF5E}" type="datetimeFigureOut">
               <a:rPr lang="en-US" smtClean="0"/>
-              <a:t>9/6/2018</a:t>
+              <a:t>9/13/19</a:t>
             </a:fld>
             <a:endParaRPr lang="en-US"/>
           </a:p>
@@ -3037,7 +3037,7 @@
           <a:p>
             <a:fld id="{5B07E745-2C70-2943-8487-A8F6E88ADF5E}" type="datetimeFigureOut">
               <a:rPr lang="en-US" smtClean="0"/>
-              <a:t>9/6/2018</a:t>
+              <a:t>9/13/19</a:t>
             </a:fld>
             <a:endParaRPr lang="en-US"/>
           </a:p>
@@ -3322,7 +3322,7 @@
           <a:p>
             <a:fld id="{5B07E745-2C70-2943-8487-A8F6E88ADF5E}" type="datetimeFigureOut">
               <a:rPr lang="en-US" smtClean="0"/>
-              <a:t>9/6/2018</a:t>
+              <a:t>9/13/19</a:t>
             </a:fld>
             <a:endParaRPr lang="en-US"/>
           </a:p>
@@ -3741,7 +3741,7 @@
           <a:p>
             <a:fld id="{5B07E745-2C70-2943-8487-A8F6E88ADF5E}" type="datetimeFigureOut">
               <a:rPr lang="en-US" smtClean="0"/>
-              <a:t>9/6/2018</a:t>
+              <a:t>9/13/19</a:t>
             </a:fld>
             <a:endParaRPr lang="en-US"/>
           </a:p>
@@ -3858,7 +3858,7 @@
           <a:p>
             <a:fld id="{5B07E745-2C70-2943-8487-A8F6E88ADF5E}" type="datetimeFigureOut">
               <a:rPr lang="en-US" smtClean="0"/>
-              <a:t>9/6/2018</a:t>
+              <a:t>9/13/19</a:t>
             </a:fld>
             <a:endParaRPr lang="en-US"/>
           </a:p>
@@ -3953,7 +3953,7 @@
           <a:p>
             <a:fld id="{5B07E745-2C70-2943-8487-A8F6E88ADF5E}" type="datetimeFigureOut">
               <a:rPr lang="en-US" smtClean="0"/>
-              <a:t>9/6/2018</a:t>
+              <a:t>9/13/19</a:t>
             </a:fld>
             <a:endParaRPr lang="en-US"/>
           </a:p>
@@ -4228,7 +4228,7 @@
           <a:p>
             <a:fld id="{5B07E745-2C70-2943-8487-A8F6E88ADF5E}" type="datetimeFigureOut">
               <a:rPr lang="en-US" smtClean="0"/>
-              <a:t>9/6/2018</a:t>
+              <a:t>9/13/19</a:t>
             </a:fld>
             <a:endParaRPr lang="en-US"/>
           </a:p>
@@ -4480,7 +4480,7 @@
           <a:p>
             <a:fld id="{5B07E745-2C70-2943-8487-A8F6E88ADF5E}" type="datetimeFigureOut">
               <a:rPr lang="en-US" smtClean="0"/>
-              <a:t>9/6/2018</a:t>
+              <a:t>9/13/19</a:t>
             </a:fld>
             <a:endParaRPr lang="en-US"/>
           </a:p>
@@ -4691,7 +4691,7 @@
           <a:p>
             <a:fld id="{5B07E745-2C70-2943-8487-A8F6E88ADF5E}" type="datetimeFigureOut">
               <a:rPr lang="en-US" smtClean="0"/>
-              <a:t>9/6/2018</a:t>
+              <a:t>9/13/19</a:t>
             </a:fld>
             <a:endParaRPr lang="en-US"/>
           </a:p>
@@ -6853,7 +6853,7 @@
           </a:ln>
           <a:extLst>
             <a:ext uri="{C572A759-6A51-4108-AA02-DFA0A04FC94B}">
-              <ma14:wrappingTextBoxFlag xmlns:ma14="http://schemas.microsoft.com/office/mac/drawingml/2011/main" xmlns="" val="1"/>
+              <ma14:wrappingTextBoxFlag xmlns="" xmlns:ma14="http://schemas.microsoft.com/office/mac/drawingml/2011/main" val="1"/>
             </a:ext>
           </a:extLst>
         </p:spPr>
@@ -7075,7 +7075,7 @@
               <a:effectLst/>
               <a:extLst>
                 <a:ext uri="{C572A759-6A51-4108-AA02-DFA0A04FC94B}">
-                  <ma14:wrappingTextBoxFlag xmlns:ma14="http://schemas.microsoft.com/office/mac/drawingml/2011/main" xmlns="" val="1"/>
+                  <ma14:wrappingTextBoxFlag xmlns="" xmlns:ma14="http://schemas.microsoft.com/office/mac/drawingml/2011/main" val="1"/>
                 </a:ext>
               </a:extLst>
             </p:spPr>
@@ -7254,7 +7254,7 @@
               <a:effectLst/>
               <a:extLst>
                 <a:ext uri="{C572A759-6A51-4108-AA02-DFA0A04FC94B}">
-                  <ma14:wrappingTextBoxFlag xmlns:ma14="http://schemas.microsoft.com/office/mac/drawingml/2011/main" xmlns="" val="1"/>
+                  <ma14:wrappingTextBoxFlag xmlns="" xmlns:ma14="http://schemas.microsoft.com/office/mac/drawingml/2011/main" val="1"/>
                 </a:ext>
               </a:extLst>
             </p:spPr>
@@ -7424,7 +7424,7 @@
               <a:effectLst/>
               <a:extLst>
                 <a:ext uri="{C572A759-6A51-4108-AA02-DFA0A04FC94B}">
-                  <ma14:wrappingTextBoxFlag xmlns:ma14="http://schemas.microsoft.com/office/mac/drawingml/2011/main" xmlns="" val="1"/>
+                  <ma14:wrappingTextBoxFlag xmlns="" xmlns:ma14="http://schemas.microsoft.com/office/mac/drawingml/2011/main" val="1"/>
                 </a:ext>
               </a:extLst>
             </p:spPr>
@@ -7594,7 +7594,7 @@
               <a:effectLst/>
               <a:extLst>
                 <a:ext uri="{C572A759-6A51-4108-AA02-DFA0A04FC94B}">
-                  <ma14:wrappingTextBoxFlag xmlns:ma14="http://schemas.microsoft.com/office/mac/drawingml/2011/main" xmlns="" val="1"/>
+                  <ma14:wrappingTextBoxFlag xmlns="" xmlns:ma14="http://schemas.microsoft.com/office/mac/drawingml/2011/main" val="1"/>
                 </a:ext>
               </a:extLst>
             </p:spPr>
@@ -7739,7 +7739,7 @@
             <a:effectLst/>
             <a:extLst>
               <a:ext uri="{C572A759-6A51-4108-AA02-DFA0A04FC94B}">
-                <ma14:wrappingTextBoxFlag xmlns:ma14="http://schemas.microsoft.com/office/mac/drawingml/2011/main" xmlns="" val="1"/>
+                <ma14:wrappingTextBoxFlag xmlns="" xmlns:ma14="http://schemas.microsoft.com/office/mac/drawingml/2011/main" val="1"/>
               </a:ext>
             </a:extLst>
           </p:spPr>
@@ -8503,7 +8503,7 @@
             <a:effectLst/>
             <a:extLst>
               <a:ext uri="{C572A759-6A51-4108-AA02-DFA0A04FC94B}">
-                <ma14:wrappingTextBoxFlag xmlns:ma14="http://schemas.microsoft.com/office/mac/drawingml/2011/main" xmlns="" val="1"/>
+                <ma14:wrappingTextBoxFlag xmlns="" xmlns:ma14="http://schemas.microsoft.com/office/mac/drawingml/2011/main" val="1"/>
               </a:ext>
             </a:extLst>
           </p:spPr>
@@ -9273,7 +9273,7 @@
           </a:ln>
           <a:extLst>
             <a:ext uri="{C572A759-6A51-4108-AA02-DFA0A04FC94B}">
-              <ma14:wrappingTextBoxFlag xmlns:ma14="http://schemas.microsoft.com/office/mac/drawingml/2011/main" xmlns="" val="1"/>
+              <ma14:wrappingTextBoxFlag xmlns="" xmlns:ma14="http://schemas.microsoft.com/office/mac/drawingml/2011/main" val="1"/>
             </a:ext>
           </a:extLst>
         </p:spPr>
@@ -9689,7 +9689,13 @@
               <a:rPr lang="en-US" sz="2400" dirty="0">
                 <a:hlinkClick r:id="rId2"/>
               </a:rPr>
-              <a:t>https://hewner.github.io/csse220/Docs/grading_guide.html</a:t>
+              <a:t>https://github.com/RHIT-CSSE/csse220/blob/master/Docs/grading_guide</a:t>
+            </a:r>
+            <a:r>
+              <a:rPr lang="en-US" sz="2400">
+                <a:hlinkClick r:id="rId2"/>
+              </a:rPr>
+              <a:t>.md</a:t>
             </a:r>
             <a:endParaRPr lang="en-US" sz="2400" dirty="0"/>
           </a:p>
@@ -9810,9 +9816,7 @@
           <p:nvPr/>
         </p:nvPicPr>
         <p:blipFill>
-          <a:blip r:embed="rId3">
-            <a:extLst/>
-          </a:blip>
+          <a:blip r:embed="rId3"/>
           <a:stretch>
             <a:fillRect/>
           </a:stretch>
@@ -9837,9 +9841,7 @@
           <p:nvPr/>
         </p:nvPicPr>
         <p:blipFill>
-          <a:blip r:embed="rId4">
-            <a:extLst/>
-          </a:blip>
+          <a:blip r:embed="rId4"/>
           <a:stretch>
             <a:fillRect/>
           </a:stretch>
@@ -9936,7 +9938,7 @@
             <a:effectLst/>
             <a:extLst>
               <a:ext uri="{C572A759-6A51-4108-AA02-DFA0A04FC94B}">
-                <ma14:wrappingTextBoxFlag xmlns:ma14="http://schemas.microsoft.com/office/mac/drawingml/2011/main" xmlns="" val="1"/>
+                <ma14:wrappingTextBoxFlag xmlns="" xmlns:ma14="http://schemas.microsoft.com/office/mac/drawingml/2011/main" val="1"/>
               </a:ext>
             </a:extLst>
           </p:spPr>
@@ -10432,7 +10434,7 @@
             <a:effectLst/>
             <a:extLst>
               <a:ext uri="{C572A759-6A51-4108-AA02-DFA0A04FC94B}">
-                <ma14:wrappingTextBoxFlag xmlns:ma14="http://schemas.microsoft.com/office/mac/drawingml/2011/main" xmlns="" val="1"/>
+                <ma14:wrappingTextBoxFlag xmlns="" xmlns:ma14="http://schemas.microsoft.com/office/mac/drawingml/2011/main" val="1"/>
               </a:ext>
             </a:extLst>
           </p:spPr>

</xml_diff>

<commit_message>
Added slide to Object slides
</commit_message>
<xml_diff>
--- a/ClassMaterials/ObjectIntroAndMisc/Slides/ObjectIntroAndMisc.pptx
+++ b/ClassMaterials/ObjectIntroAndMisc/Slides/ObjectIntroAndMisc.pptx
@@ -5,7 +5,7 @@
     <p:sldMasterId id="2147483648" r:id="rId1"/>
   </p:sldMasterIdLst>
   <p:notesMasterIdLst>
-    <p:notesMasterId r:id="rId23"/>
+    <p:notesMasterId r:id="rId24"/>
   </p:notesMasterIdLst>
   <p:sldIdLst>
     <p:sldId id="256" r:id="rId2"/>
@@ -28,7 +28,8 @@
     <p:sldId id="297" r:id="rId19"/>
     <p:sldId id="295" r:id="rId20"/>
     <p:sldId id="296" r:id="rId21"/>
-    <p:sldId id="294" r:id="rId22"/>
+    <p:sldId id="309" r:id="rId22"/>
+    <p:sldId id="294" r:id="rId23"/>
   </p:sldIdLst>
   <p:sldSz cx="9144000" cy="6858000" type="screen4x3"/>
   <p:notesSz cx="6858000" cy="9144000"/>
@@ -1006,7 +1007,7 @@
               <a:pPr>
                 <a:defRPr/>
               </a:pPr>
-              <a:t>21</a:t>
+              <a:t>22</a:t>
             </a:fld>
             <a:endParaRPr lang="en-US"/>
           </a:p>
@@ -6853,7 +6854,7 @@
           </a:ln>
           <a:extLst>
             <a:ext uri="{C572A759-6A51-4108-AA02-DFA0A04FC94B}">
-              <ma14:wrappingTextBoxFlag xmlns="" xmlns:ma14="http://schemas.microsoft.com/office/mac/drawingml/2011/main" val="1"/>
+              <ma14:wrappingTextBoxFlag xmlns:ma14="http://schemas.microsoft.com/office/mac/drawingml/2011/main" xmlns="" val="1"/>
             </a:ext>
           </a:extLst>
         </p:spPr>
@@ -7075,7 +7076,7 @@
               <a:effectLst/>
               <a:extLst>
                 <a:ext uri="{C572A759-6A51-4108-AA02-DFA0A04FC94B}">
-                  <ma14:wrappingTextBoxFlag xmlns="" xmlns:ma14="http://schemas.microsoft.com/office/mac/drawingml/2011/main" val="1"/>
+                  <ma14:wrappingTextBoxFlag xmlns:ma14="http://schemas.microsoft.com/office/mac/drawingml/2011/main" xmlns="" val="1"/>
                 </a:ext>
               </a:extLst>
             </p:spPr>
@@ -7254,7 +7255,7 @@
               <a:effectLst/>
               <a:extLst>
                 <a:ext uri="{C572A759-6A51-4108-AA02-DFA0A04FC94B}">
-                  <ma14:wrappingTextBoxFlag xmlns="" xmlns:ma14="http://schemas.microsoft.com/office/mac/drawingml/2011/main" val="1"/>
+                  <ma14:wrappingTextBoxFlag xmlns:ma14="http://schemas.microsoft.com/office/mac/drawingml/2011/main" xmlns="" val="1"/>
                 </a:ext>
               </a:extLst>
             </p:spPr>
@@ -7424,7 +7425,7 @@
               <a:effectLst/>
               <a:extLst>
                 <a:ext uri="{C572A759-6A51-4108-AA02-DFA0A04FC94B}">
-                  <ma14:wrappingTextBoxFlag xmlns="" xmlns:ma14="http://schemas.microsoft.com/office/mac/drawingml/2011/main" val="1"/>
+                  <ma14:wrappingTextBoxFlag xmlns:ma14="http://schemas.microsoft.com/office/mac/drawingml/2011/main" xmlns="" val="1"/>
                 </a:ext>
               </a:extLst>
             </p:spPr>
@@ -7594,7 +7595,7 @@
               <a:effectLst/>
               <a:extLst>
                 <a:ext uri="{C572A759-6A51-4108-AA02-DFA0A04FC94B}">
-                  <ma14:wrappingTextBoxFlag xmlns="" xmlns:ma14="http://schemas.microsoft.com/office/mac/drawingml/2011/main" val="1"/>
+                  <ma14:wrappingTextBoxFlag xmlns:ma14="http://schemas.microsoft.com/office/mac/drawingml/2011/main" xmlns="" val="1"/>
                 </a:ext>
               </a:extLst>
             </p:spPr>
@@ -7739,7 +7740,7 @@
             <a:effectLst/>
             <a:extLst>
               <a:ext uri="{C572A759-6A51-4108-AA02-DFA0A04FC94B}">
-                <ma14:wrappingTextBoxFlag xmlns="" xmlns:ma14="http://schemas.microsoft.com/office/mac/drawingml/2011/main" val="1"/>
+                <ma14:wrappingTextBoxFlag xmlns:ma14="http://schemas.microsoft.com/office/mac/drawingml/2011/main" xmlns="" val="1"/>
               </a:ext>
             </a:extLst>
           </p:spPr>
@@ -7995,6 +7996,143 @@
       </p:grpSpPr>
       <p:sp>
         <p:nvSpPr>
+          <p:cNvPr id="2" name="Title 1">
+            <a:extLst>
+              <a:ext uri="{FF2B5EF4-FFF2-40B4-BE49-F238E27FC236}">
+                <a16:creationId xmlns:a16="http://schemas.microsoft.com/office/drawing/2014/main" id="{85FDD9F8-A62E-474D-9D52-0DCBBAD50BE2}"/>
+              </a:ext>
+            </a:extLst>
+          </p:cNvPr>
+          <p:cNvSpPr>
+            <a:spLocks noGrp="1"/>
+          </p:cNvSpPr>
+          <p:nvPr>
+            <p:ph type="title"/>
+          </p:nvPr>
+        </p:nvSpPr>
+        <p:spPr/>
+        <p:txBody>
+          <a:bodyPr/>
+          <a:lstStyle/>
+          <a:p>
+            <a:r>
+              <a:rPr lang="en-US" dirty="0"/>
+              <a:t>Practice</a:t>
+            </a:r>
+          </a:p>
+        </p:txBody>
+      </p:sp>
+      <p:sp>
+        <p:nvSpPr>
+          <p:cNvPr id="3" name="Content Placeholder 2">
+            <a:extLst>
+              <a:ext uri="{FF2B5EF4-FFF2-40B4-BE49-F238E27FC236}">
+                <a16:creationId xmlns:a16="http://schemas.microsoft.com/office/drawing/2014/main" id="{EFC74334-F80F-434C-B7F7-D161AEE72BAE}"/>
+              </a:ext>
+            </a:extLst>
+          </p:cNvPr>
+          <p:cNvSpPr>
+            <a:spLocks noGrp="1"/>
+          </p:cNvSpPr>
+          <p:nvPr>
+            <p:ph idx="1"/>
+          </p:nvPr>
+        </p:nvSpPr>
+        <p:spPr/>
+        <p:txBody>
+          <a:bodyPr/>
+          <a:lstStyle/>
+          <a:p>
+            <a:r>
+              <a:rPr lang="en-US" dirty="0"/>
+              <a:t>Work in </a:t>
+            </a:r>
+            <a:r>
+              <a:rPr lang="en-US" dirty="0" err="1"/>
+              <a:t>SmallClassProbs</a:t>
+            </a:r>
+            <a:r>
+              <a:rPr lang="en-US" dirty="0"/>
+              <a:t> filling out </a:t>
+            </a:r>
+            <a:r>
+              <a:rPr lang="en-US" dirty="0" err="1"/>
+              <a:t>ClassA.java</a:t>
+            </a:r>
+            <a:r>
+              <a:rPr lang="en-US" dirty="0"/>
+              <a:t>, </a:t>
+            </a:r>
+            <a:r>
+              <a:rPr lang="en-US" dirty="0" err="1"/>
+              <a:t>ClassB.java</a:t>
+            </a:r>
+            <a:r>
+              <a:rPr lang="en-US" dirty="0"/>
+              <a:t> and </a:t>
+            </a:r>
+            <a:r>
+              <a:rPr lang="en-US" dirty="0" err="1"/>
+              <a:t>ClassC.java</a:t>
+            </a:r>
+            <a:r>
+              <a:rPr lang="en-US" dirty="0"/>
+              <a:t> </a:t>
+            </a:r>
+          </a:p>
+          <a:p>
+            <a:pPr lvl="1"/>
+            <a:r>
+              <a:rPr lang="en-US" dirty="0"/>
+              <a:t>should work with the tests provided in </a:t>
+            </a:r>
+            <a:r>
+              <a:rPr lang="en-US" dirty="0" err="1"/>
+              <a:t>ClassTests</a:t>
+            </a:r>
+            <a:r>
+              <a:rPr lang="en-US" err="1"/>
+              <a:t>.</a:t>
+            </a:r>
+            <a:r>
+              <a:rPr lang="en-US"/>
+              <a:t>java</a:t>
+            </a:r>
+          </a:p>
+        </p:txBody>
+      </p:sp>
+    </p:spTree>
+    <p:extLst>
+      <p:ext uri="{BB962C8B-B14F-4D97-AF65-F5344CB8AC3E}">
+        <p14:creationId xmlns:p14="http://schemas.microsoft.com/office/powerpoint/2010/main" val="2875033241"/>
+      </p:ext>
+    </p:extLst>
+  </p:cSld>
+  <p:clrMapOvr>
+    <a:masterClrMapping/>
+  </p:clrMapOvr>
+</p:sld>
+</file>
+
+<file path=ppt/slides/slide22.xml><?xml version="1.0" encoding="utf-8"?>
+<p:sld xmlns:a="http://schemas.openxmlformats.org/drawingml/2006/main" xmlns:r="http://schemas.openxmlformats.org/officeDocument/2006/relationships" xmlns:p="http://schemas.openxmlformats.org/presentationml/2006/main">
+  <p:cSld>
+    <p:spTree>
+      <p:nvGrpSpPr>
+        <p:cNvPr id="1" name=""/>
+        <p:cNvGrpSpPr/>
+        <p:nvPr/>
+      </p:nvGrpSpPr>
+      <p:grpSpPr>
+        <a:xfrm>
+          <a:off x="0" y="0"/>
+          <a:ext cx="0" cy="0"/>
+          <a:chOff x="0" y="0"/>
+          <a:chExt cx="0" cy="0"/>
+        </a:xfrm>
+      </p:grpSpPr>
+      <p:sp>
+        <p:nvSpPr>
           <p:cNvPr id="2" name="Title 1"/>
           <p:cNvSpPr>
             <a:spLocks noGrp="1"/>
@@ -8503,7 +8641,7 @@
             <a:effectLst/>
             <a:extLst>
               <a:ext uri="{C572A759-6A51-4108-AA02-DFA0A04FC94B}">
-                <ma14:wrappingTextBoxFlag xmlns="" xmlns:ma14="http://schemas.microsoft.com/office/mac/drawingml/2011/main" val="1"/>
+                <ma14:wrappingTextBoxFlag xmlns:ma14="http://schemas.microsoft.com/office/mac/drawingml/2011/main" xmlns="" val="1"/>
               </a:ext>
             </a:extLst>
           </p:spPr>
@@ -9273,7 +9411,7 @@
           </a:ln>
           <a:extLst>
             <a:ext uri="{C572A759-6A51-4108-AA02-DFA0A04FC94B}">
-              <ma14:wrappingTextBoxFlag xmlns="" xmlns:ma14="http://schemas.microsoft.com/office/mac/drawingml/2011/main" val="1"/>
+              <ma14:wrappingTextBoxFlag xmlns:ma14="http://schemas.microsoft.com/office/mac/drawingml/2011/main" xmlns="" val="1"/>
             </a:ext>
           </a:extLst>
         </p:spPr>
@@ -9938,7 +10076,7 @@
             <a:effectLst/>
             <a:extLst>
               <a:ext uri="{C572A759-6A51-4108-AA02-DFA0A04FC94B}">
-                <ma14:wrappingTextBoxFlag xmlns="" xmlns:ma14="http://schemas.microsoft.com/office/mac/drawingml/2011/main" val="1"/>
+                <ma14:wrappingTextBoxFlag xmlns:ma14="http://schemas.microsoft.com/office/mac/drawingml/2011/main" xmlns="" val="1"/>
               </a:ext>
             </a:extLst>
           </p:spPr>
@@ -10434,7 +10572,7 @@
             <a:effectLst/>
             <a:extLst>
               <a:ext uri="{C572A759-6A51-4108-AA02-DFA0A04FC94B}">
-                <ma14:wrappingTextBoxFlag xmlns="" xmlns:ma14="http://schemas.microsoft.com/office/mac/drawingml/2011/main" val="1"/>
+                <ma14:wrappingTextBoxFlag xmlns:ma14="http://schemas.microsoft.com/office/mac/drawingml/2011/main" xmlns="" val="1"/>
               </a:ext>
             </a:extLst>
           </p:spPr>

</xml_diff>

<commit_message>
modifying debugging and studentgradebook slides
</commit_message>
<xml_diff>
--- a/ClassMaterials/ObjectIntroAndMisc/Slides/ObjectIntroAndMisc.pptx
+++ b/ClassMaterials/ObjectIntroAndMisc/Slides/ObjectIntroAndMisc.pptx
@@ -5,7 +5,7 @@
     <p:sldMasterId id="2147483648" r:id="rId1"/>
   </p:sldMasterIdLst>
   <p:notesMasterIdLst>
-    <p:notesMasterId r:id="rId32"/>
+    <p:notesMasterId r:id="rId34"/>
   </p:notesMasterIdLst>
   <p:sldIdLst>
     <p:sldId id="256" r:id="rId2"/>
@@ -21,23 +21,25 @@
     <p:sldId id="260" r:id="rId12"/>
     <p:sldId id="314" r:id="rId13"/>
     <p:sldId id="315" r:id="rId14"/>
-    <p:sldId id="316" r:id="rId15"/>
-    <p:sldId id="317" r:id="rId16"/>
-    <p:sldId id="318" r:id="rId17"/>
-    <p:sldId id="319" r:id="rId18"/>
-    <p:sldId id="312" r:id="rId19"/>
-    <p:sldId id="307" r:id="rId20"/>
-    <p:sldId id="277" r:id="rId21"/>
-    <p:sldId id="320" r:id="rId22"/>
-    <p:sldId id="321" r:id="rId23"/>
-    <p:sldId id="279" r:id="rId24"/>
-    <p:sldId id="322" r:id="rId25"/>
-    <p:sldId id="323" r:id="rId26"/>
-    <p:sldId id="324" r:id="rId27"/>
-    <p:sldId id="325" r:id="rId28"/>
-    <p:sldId id="326" r:id="rId29"/>
-    <p:sldId id="327" r:id="rId30"/>
-    <p:sldId id="294" r:id="rId31"/>
+    <p:sldId id="338" r:id="rId15"/>
+    <p:sldId id="262" r:id="rId16"/>
+    <p:sldId id="339" r:id="rId17"/>
+    <p:sldId id="316" r:id="rId18"/>
+    <p:sldId id="317" r:id="rId19"/>
+    <p:sldId id="318" r:id="rId20"/>
+    <p:sldId id="319" r:id="rId21"/>
+    <p:sldId id="312" r:id="rId22"/>
+    <p:sldId id="307" r:id="rId23"/>
+    <p:sldId id="277" r:id="rId24"/>
+    <p:sldId id="320" r:id="rId25"/>
+    <p:sldId id="321" r:id="rId26"/>
+    <p:sldId id="279" r:id="rId27"/>
+    <p:sldId id="322" r:id="rId28"/>
+    <p:sldId id="323" r:id="rId29"/>
+    <p:sldId id="324" r:id="rId30"/>
+    <p:sldId id="325" r:id="rId31"/>
+    <p:sldId id="326" r:id="rId32"/>
+    <p:sldId id="327" r:id="rId33"/>
   </p:sldIdLst>
   <p:sldSz cx="9144000" cy="6858000" type="screen4x3"/>
   <p:notesSz cx="6858000" cy="9144000"/>
@@ -237,7 +239,7 @@
           <a:p>
             <a:fld id="{73386005-8F80-1A49-87D1-22EBFA47E352}" type="datetimeFigureOut">
               <a:rPr lang="en-US" smtClean="0"/>
-              <a:t>3/1/22</a:t>
+              <a:t>3/13/2022</a:t>
             </a:fld>
             <a:endParaRPr lang="en-US"/>
           </a:p>
@@ -609,11 +611,11 @@
 </file>
 
 <file path=ppt/notesSlides/notesSlide10.xml><?xml version="1.0" encoding="utf-8"?>
-<p:notes xmlns:a="http://schemas.openxmlformats.org/drawingml/2006/main" xmlns:r="http://schemas.openxmlformats.org/officeDocument/2006/relationships" xmlns:p="http://schemas.openxmlformats.org/presentationml/2006/main">
+<p:notes xmlns:a="http://schemas.openxmlformats.org/drawingml/2006/main" xmlns:r="http://schemas.openxmlformats.org/officeDocument/2006/relationships" xmlns:p="http://schemas.openxmlformats.org/presentationml/2006/main" showMasterSp="0" showMasterPhAnim="0">
   <p:cSld>
     <p:spTree>
       <p:nvGrpSpPr>
-        <p:cNvPr id="1" name=""/>
+        <p:cNvPr id="1" name="Shape 133"/>
         <p:cNvGrpSpPr/>
         <p:nvPr/>
       </p:nvGrpSpPr>
@@ -627,64 +629,108 @@
       </p:grpSpPr>
       <p:sp>
         <p:nvSpPr>
-          <p:cNvPr id="2" name="Slide Image Placeholder 1"/>
+          <p:cNvPr id="134" name="Google Shape;134;g787571e53b_0_213:notes"/>
           <p:cNvSpPr>
             <a:spLocks noGrp="1" noRot="1" noChangeAspect="1"/>
           </p:cNvSpPr>
           <p:nvPr>
-            <p:ph type="sldImg"/>
-          </p:nvPr>
-        </p:nvSpPr>
-        <p:spPr/>
-      </p:sp>
-      <p:sp>
-        <p:nvSpPr>
-          <p:cNvPr id="3" name="Notes Placeholder 2"/>
-          <p:cNvSpPr>
+            <p:ph type="sldImg" idx="2"/>
+          </p:nvPr>
+        </p:nvSpPr>
+        <p:spPr>
+          <a:xfrm>
+            <a:off x="381175" y="685800"/>
+            <a:ext cx="6096300" cy="3429000"/>
+          </a:xfrm>
+          <a:custGeom>
+            <a:avLst/>
+            <a:gdLst/>
+            <a:ahLst/>
+            <a:cxnLst/>
+            <a:rect l="l" t="t" r="r" b="b"/>
+            <a:pathLst>
+              <a:path w="120000" h="120000" extrusionOk="0">
+                <a:moveTo>
+                  <a:pt x="0" y="0"/>
+                </a:moveTo>
+                <a:lnTo>
+                  <a:pt x="120000" y="0"/>
+                </a:lnTo>
+                <a:lnTo>
+                  <a:pt x="120000" y="120000"/>
+                </a:lnTo>
+                <a:lnTo>
+                  <a:pt x="0" y="120000"/>
+                </a:lnTo>
+                <a:close/>
+              </a:path>
+            </a:pathLst>
+          </a:custGeom>
+        </p:spPr>
+      </p:sp>
+      <p:sp>
+        <p:nvSpPr>
+          <p:cNvPr id="135" name="Google Shape;135;g787571e53b_0_213:notes"/>
+          <p:cNvSpPr txBox="1">
             <a:spLocks noGrp="1"/>
           </p:cNvSpPr>
           <p:nvPr>
             <p:ph type="body" idx="1"/>
           </p:nvPr>
         </p:nvSpPr>
-        <p:spPr/>
-        <p:txBody>
-          <a:bodyPr/>
-          <a:lstStyle/>
-          <a:p>
-            <a:endParaRPr lang="en-US" dirty="0"/>
-          </a:p>
-        </p:txBody>
-      </p:sp>
-      <p:sp>
-        <p:nvSpPr>
-          <p:cNvPr id="4" name="Slide Number Placeholder 3"/>
-          <p:cNvSpPr>
-            <a:spLocks noGrp="1"/>
-          </p:cNvSpPr>
-          <p:nvPr>
-            <p:ph type="sldNum" sz="quarter" idx="10"/>
-          </p:nvPr>
-        </p:nvSpPr>
-        <p:spPr/>
-        <p:txBody>
-          <a:bodyPr/>
-          <a:lstStyle/>
-          <a:p>
-            <a:fld id="{9B5CF600-4147-7540-9DE4-6C8272E0EDC3}" type="slidenum">
-              <a:rPr lang="en-US" smtClean="0"/>
-              <a:t>16</a:t>
-            </a:fld>
-            <a:endParaRPr lang="en-US"/>
+        <p:spPr>
+          <a:xfrm>
+            <a:off x="685800" y="4343400"/>
+            <a:ext cx="5486400" cy="4114800"/>
+          </a:xfrm>
+          <a:prstGeom prst="rect">
+            <a:avLst/>
+          </a:prstGeom>
+        </p:spPr>
+        <p:txBody>
+          <a:bodyPr spcFirstLastPara="1" wrap="square" lIns="91425" tIns="91425" rIns="91425" bIns="91425" anchor="t" anchorCtr="0">
+            <a:noAutofit/>
+          </a:bodyPr>
+          <a:lstStyle/>
+          <a:p>
+            <a:pPr marL="0" lvl="0" indent="0" algn="l" rtl="0">
+              <a:spcBef>
+                <a:spcPts val="0"/>
+              </a:spcBef>
+              <a:spcAft>
+                <a:spcPts val="0"/>
+              </a:spcAft>
+              <a:buNone/>
+            </a:pPr>
+            <a:r>
+              <a:rPr lang="en" sz="1800">
+                <a:solidFill>
+                  <a:srgbClr val="840629"/>
+                </a:solidFill>
+              </a:rPr>
+              <a:t>CAREFUL- if you do not stop the running debugger, you can have multiple instances running and the debugger variables you see might be from a different running </a:t>
+            </a:r>
+            <a:endParaRPr sz="1800">
+              <a:solidFill>
+                <a:srgbClr val="840629"/>
+              </a:solidFill>
+            </a:endParaRPr>
+          </a:p>
+          <a:p>
+            <a:pPr marL="0" lvl="0" indent="0" algn="l" rtl="0">
+              <a:spcBef>
+                <a:spcPts val="0"/>
+              </a:spcBef>
+              <a:spcAft>
+                <a:spcPts val="0"/>
+              </a:spcAft>
+              <a:buNone/>
+            </a:pPr>
+            <a:endParaRPr/>
           </a:p>
         </p:txBody>
       </p:sp>
     </p:spTree>
-    <p:extLst>
-      <p:ext uri="{BB962C8B-B14F-4D97-AF65-F5344CB8AC3E}">
-        <p14:creationId xmlns:p14="http://schemas.microsoft.com/office/powerpoint/2010/main" val="983935836"/>
-      </p:ext>
-    </p:extLst>
   </p:cSld>
   <p:clrMapOvr>
     <a:masterClrMapping/>
@@ -711,7 +757,7 @@
       </p:grpSpPr>
       <p:sp>
         <p:nvSpPr>
-          <p:cNvPr id="2" name="Slide Image Placeholder 1"/>
+          <p:cNvPr id="181" name="Shape 181"/>
           <p:cNvSpPr>
             <a:spLocks noGrp="1" noRot="1" noChangeAspect="1"/>
           </p:cNvSpPr>
@@ -719,104 +765,61 @@
             <p:ph type="sldImg"/>
           </p:nvPr>
         </p:nvSpPr>
-        <p:spPr/>
-      </p:sp>
-      <p:sp>
-        <p:nvSpPr>
-          <p:cNvPr id="3" name="Notes Placeholder 2"/>
-          <p:cNvSpPr>
-            <a:spLocks noGrp="1"/>
-          </p:cNvSpPr>
-          <p:nvPr>
-            <p:ph type="body" idx="1"/>
-          </p:nvPr>
-        </p:nvSpPr>
-        <p:spPr/>
+        <p:spPr>
+          <a:prstGeom prst="rect">
+            <a:avLst/>
+          </a:prstGeom>
+        </p:spPr>
         <p:txBody>
           <a:bodyPr/>
           <a:lstStyle/>
           <a:p>
-            <a:pPr marL="0" marR="0" lvl="0" indent="0" algn="l" defTabSz="457200" rtl="0" eaLnBrk="1" fontAlgn="auto" latinLnBrk="0" hangingPunct="1">
+            <a:pPr lvl="0"/>
+            <a:endParaRPr/>
+          </a:p>
+        </p:txBody>
+      </p:sp>
+      <p:sp>
+        <p:nvSpPr>
+          <p:cNvPr id="182" name="Shape 182"/>
+          <p:cNvSpPr>
+            <a:spLocks noGrp="1"/>
+          </p:cNvSpPr>
+          <p:nvPr>
+            <p:ph type="body" sz="quarter" idx="1"/>
+          </p:nvPr>
+        </p:nvSpPr>
+        <p:spPr>
+          <a:prstGeom prst="rect">
+            <a:avLst/>
+          </a:prstGeom>
+        </p:spPr>
+        <p:txBody>
+          <a:bodyPr/>
+          <a:lstStyle/>
+          <a:p>
+            <a:pPr lvl="0" defTabSz="914400">
               <a:lnSpc>
                 <a:spcPct val="100000"/>
               </a:lnSpc>
               <a:spcBef>
-                <a:spcPts val="0"/>
+                <a:spcPts val="400"/>
               </a:spcBef>
-              <a:spcAft>
-                <a:spcPts val="0"/>
-              </a:spcAft>
-              <a:buClrTx/>
-              <a:buSzTx/>
-              <a:buFontTx/>
-              <a:buNone/>
-              <a:tabLst/>
-              <a:defRPr/>
+              <a:defRPr sz="1800"/>
             </a:pPr>
-            <a:r>
-              <a:rPr lang="en-US" sz="1200" kern="1200" dirty="0" err="1">
-                <a:solidFill>
-                  <a:schemeClr val="tx1"/>
-                </a:solidFill>
-                <a:latin typeface="+mn-lt"/>
-                <a:ea typeface="+mn-ea"/>
-                <a:cs typeface="+mn-cs"/>
-              </a:rPr>
-              <a:t>uppercaseIfExclaimation</a:t>
-            </a:r>
-            <a:r>
-              <a:rPr lang="en-US" sz="1200" kern="1200" dirty="0">
-                <a:solidFill>
-                  <a:schemeClr val="tx1"/>
-                </a:solidFill>
-                <a:latin typeface="+mn-lt"/>
-                <a:ea typeface="+mn-ea"/>
-                <a:cs typeface="+mn-cs"/>
-              </a:rPr>
-              <a:t> ends up showing</a:t>
-            </a:r>
-            <a:r>
-              <a:rPr lang="en-US" sz="1200" kern="1200" baseline="0" dirty="0">
-                <a:solidFill>
-                  <a:schemeClr val="tx1"/>
-                </a:solidFill>
-                <a:latin typeface="+mn-lt"/>
-                <a:ea typeface="+mn-ea"/>
-                <a:cs typeface="+mn-cs"/>
-              </a:rPr>
-              <a:t> this</a:t>
-            </a:r>
-            <a:endParaRPr lang="en-US" dirty="0"/>
-          </a:p>
-        </p:txBody>
-      </p:sp>
-      <p:sp>
-        <p:nvSpPr>
-          <p:cNvPr id="4" name="Slide Number Placeholder 3"/>
-          <p:cNvSpPr>
-            <a:spLocks noGrp="1"/>
-          </p:cNvSpPr>
-          <p:nvPr>
-            <p:ph type="sldNum" sz="quarter" idx="10"/>
-          </p:nvPr>
-        </p:nvSpPr>
-        <p:spPr/>
-        <p:txBody>
-          <a:bodyPr/>
-          <a:lstStyle/>
-          <a:p>
-            <a:fld id="{9B5CF600-4147-7540-9DE4-6C8272E0EDC3}" type="slidenum">
-              <a:rPr lang="en-US" smtClean="0"/>
-              <a:t>17</a:t>
-            </a:fld>
-            <a:endParaRPr lang="en-US"/>
+            <a:endParaRPr sz="1200" dirty="0">
+              <a:latin typeface="Calibri"/>
+              <a:ea typeface="Calibri"/>
+              <a:cs typeface="Calibri"/>
+              <a:sym typeface="Calibri"/>
+            </a:endParaRPr>
           </a:p>
         </p:txBody>
       </p:sp>
     </p:spTree>
     <p:extLst>
       <p:ext uri="{BB962C8B-B14F-4D97-AF65-F5344CB8AC3E}">
-        <p14:creationId xmlns:p14="http://schemas.microsoft.com/office/powerpoint/2010/main" val="2214325646"/>
+        <p14:creationId xmlns:p14="http://schemas.microsoft.com/office/powerpoint/2010/main" val="1261416685"/>
       </p:ext>
     </p:extLst>
   </p:cSld>
@@ -870,6 +873,22 @@
           <a:bodyPr/>
           <a:lstStyle/>
           <a:p>
+            <a:r>
+              <a:rPr lang="en-US" dirty="0"/>
+              <a:t>Only spend time on this if you want to show the </a:t>
+            </a:r>
+            <a:r>
+              <a:rPr lang="en-US" dirty="0" err="1"/>
+              <a:t>DebugMeTest</a:t>
+            </a:r>
+            <a:r>
+              <a:rPr lang="en-US" dirty="0"/>
+              <a:t> examples,</a:t>
+            </a:r>
+            <a:r>
+              <a:rPr lang="en-US" baseline="0" dirty="0"/>
+              <a:t> in particular the final test which you can use to demonstrate this approach.</a:t>
+            </a:r>
             <a:endParaRPr lang="en-US" dirty="0"/>
           </a:p>
         </p:txBody>
@@ -889,15 +908,9 @@
           <a:bodyPr/>
           <a:lstStyle/>
           <a:p>
-            <a:pPr>
-              <a:defRPr/>
-            </a:pPr>
-            <a:fld id="{F3BF035C-C190-4FBE-9474-8535FCFBFED8}" type="slidenum">
+            <a:fld id="{9B5CF600-4147-7540-9DE4-6C8272E0EDC3}" type="slidenum">
               <a:rPr lang="en-US" smtClean="0"/>
-              <a:pPr>
-                <a:defRPr/>
-              </a:pPr>
-              <a:t>20</a:t>
+              <a:t>18</a:t>
             </a:fld>
             <a:endParaRPr lang="en-US"/>
           </a:p>
@@ -906,7 +919,7 @@
     </p:spTree>
     <p:extLst>
       <p:ext uri="{BB962C8B-B14F-4D97-AF65-F5344CB8AC3E}">
-        <p14:creationId xmlns:p14="http://schemas.microsoft.com/office/powerpoint/2010/main" val="140127366"/>
+        <p14:creationId xmlns:p14="http://schemas.microsoft.com/office/powerpoint/2010/main" val="3263308297"/>
       </p:ext>
     </p:extLst>
   </p:cSld>
@@ -935,29 +948,19 @@
       </p:grpSpPr>
       <p:sp>
         <p:nvSpPr>
-          <p:cNvPr id="41986" name="Slide Image Placeholder 1"/>
-          <p:cNvSpPr>
-            <a:spLocks noGrp="1" noRot="1" noChangeAspect="1" noTextEdit="1"/>
+          <p:cNvPr id="2" name="Slide Image Placeholder 1"/>
+          <p:cNvSpPr>
+            <a:spLocks noGrp="1" noRot="1" noChangeAspect="1"/>
           </p:cNvSpPr>
           <p:nvPr>
             <p:ph type="sldImg"/>
           </p:nvPr>
         </p:nvSpPr>
-        <p:spPr bwMode="auto">
-          <a:noFill/>
-          <a:ln>
-            <a:solidFill>
-              <a:srgbClr val="000000"/>
-            </a:solidFill>
-            <a:miter lim="800000"/>
-            <a:headEnd/>
-            <a:tailEnd/>
-          </a:ln>
-        </p:spPr>
-      </p:sp>
-      <p:sp>
-        <p:nvSpPr>
-          <p:cNvPr id="41987" name="Notes Placeholder 2"/>
+        <p:spPr/>
+      </p:sp>
+      <p:sp>
+        <p:nvSpPr>
+          <p:cNvPr id="3" name="Notes Placeholder 2"/>
           <p:cNvSpPr>
             <a:spLocks noGrp="1"/>
           </p:cNvSpPr>
@@ -965,10 +968,7 @@
             <p:ph type="body" idx="1"/>
           </p:nvPr>
         </p:nvSpPr>
-        <p:spPr>
-          <a:noFill/>
-          <a:ln/>
-        </p:spPr>
+        <p:spPr/>
         <p:txBody>
           <a:bodyPr/>
           <a:lstStyle/>
@@ -979,38 +979,31 @@
       </p:sp>
       <p:sp>
         <p:nvSpPr>
-          <p:cNvPr id="41988" name="Slide Number Placeholder 3"/>
-          <p:cNvSpPr>
-            <a:spLocks noGrp="1"/>
-          </p:cNvSpPr>
-          <p:nvPr>
-            <p:ph type="sldNum" sz="quarter" idx="5"/>
-          </p:nvPr>
-        </p:nvSpPr>
-        <p:spPr>
-          <a:noFill/>
-        </p:spPr>
+          <p:cNvPr id="4" name="Slide Number Placeholder 3"/>
+          <p:cNvSpPr>
+            <a:spLocks noGrp="1"/>
+          </p:cNvSpPr>
+          <p:nvPr>
+            <p:ph type="sldNum" sz="quarter" idx="10"/>
+          </p:nvPr>
+        </p:nvSpPr>
+        <p:spPr/>
         <p:txBody>
           <a:bodyPr/>
           <a:lstStyle/>
           <a:p>
-            <a:fld id="{21494292-921C-426B-9C45-35E1E1C6101A}" type="slidenum">
-              <a:rPr lang="en-US" smtClean="0">
-                <a:cs typeface="Arial" pitchFamily="34" charset="0"/>
-              </a:rPr>
-              <a:pPr/>
-              <a:t>22</a:t>
+            <a:fld id="{9B5CF600-4147-7540-9DE4-6C8272E0EDC3}" type="slidenum">
+              <a:rPr lang="en-US" smtClean="0"/>
+              <a:t>19</a:t>
             </a:fld>
-            <a:endParaRPr lang="en-US">
-              <a:cs typeface="Arial" pitchFamily="34" charset="0"/>
-            </a:endParaRPr>
+            <a:endParaRPr lang="en-US"/>
           </a:p>
         </p:txBody>
       </p:sp>
     </p:spTree>
     <p:extLst>
       <p:ext uri="{BB962C8B-B14F-4D97-AF65-F5344CB8AC3E}">
-        <p14:creationId xmlns:p14="http://schemas.microsoft.com/office/powerpoint/2010/main" val="2624089889"/>
+        <p14:creationId xmlns:p14="http://schemas.microsoft.com/office/powerpoint/2010/main" val="983935836"/>
       </p:ext>
     </p:extLst>
   </p:cSld>
@@ -1064,34 +1057,78 @@
           <a:bodyPr/>
           <a:lstStyle/>
           <a:p>
-            <a:endParaRPr lang="en-US"/>
-          </a:p>
-        </p:txBody>
-      </p:sp>
-      <p:sp>
-        <p:nvSpPr>
-          <p:cNvPr id="4" name="Slide Number Placeholder 3"/>
-          <p:cNvSpPr>
-            <a:spLocks noGrp="1"/>
-          </p:cNvSpPr>
-          <p:nvPr>
-            <p:ph type="sldNum" sz="quarter" idx="10"/>
-          </p:nvPr>
-        </p:nvSpPr>
-        <p:spPr/>
-        <p:txBody>
-          <a:bodyPr/>
-          <a:lstStyle/>
-          <a:p>
-            <a:pPr>
+            <a:pPr marL="0" marR="0" lvl="0" indent="0" algn="l" defTabSz="457200" rtl="0" eaLnBrk="1" fontAlgn="auto" latinLnBrk="0" hangingPunct="1">
+              <a:lnSpc>
+                <a:spcPct val="100000"/>
+              </a:lnSpc>
+              <a:spcBef>
+                <a:spcPts val="0"/>
+              </a:spcBef>
+              <a:spcAft>
+                <a:spcPts val="0"/>
+              </a:spcAft>
+              <a:buClrTx/>
+              <a:buSzTx/>
+              <a:buFontTx/>
+              <a:buNone/>
+              <a:tabLst/>
               <a:defRPr/>
             </a:pPr>
-            <a:fld id="{F3BF035C-C190-4FBE-9474-8535FCFBFED8}" type="slidenum">
+            <a:r>
+              <a:rPr lang="en-US" sz="1200" kern="1200" dirty="0" err="1">
+                <a:solidFill>
+                  <a:schemeClr val="tx1"/>
+                </a:solidFill>
+                <a:latin typeface="+mn-lt"/>
+                <a:ea typeface="+mn-ea"/>
+                <a:cs typeface="+mn-cs"/>
+              </a:rPr>
+              <a:t>uppercaseIfExclaimation</a:t>
+            </a:r>
+            <a:r>
+              <a:rPr lang="en-US" sz="1200" kern="1200" dirty="0">
+                <a:solidFill>
+                  <a:schemeClr val="tx1"/>
+                </a:solidFill>
+                <a:latin typeface="+mn-lt"/>
+                <a:ea typeface="+mn-ea"/>
+                <a:cs typeface="+mn-cs"/>
+              </a:rPr>
+              <a:t> ends up showing</a:t>
+            </a:r>
+            <a:r>
+              <a:rPr lang="en-US" sz="1200" kern="1200" baseline="0" dirty="0">
+                <a:solidFill>
+                  <a:schemeClr val="tx1"/>
+                </a:solidFill>
+                <a:latin typeface="+mn-lt"/>
+                <a:ea typeface="+mn-ea"/>
+                <a:cs typeface="+mn-cs"/>
+              </a:rPr>
+              <a:t> this</a:t>
+            </a:r>
+            <a:endParaRPr lang="en-US" dirty="0"/>
+          </a:p>
+        </p:txBody>
+      </p:sp>
+      <p:sp>
+        <p:nvSpPr>
+          <p:cNvPr id="4" name="Slide Number Placeholder 3"/>
+          <p:cNvSpPr>
+            <a:spLocks noGrp="1"/>
+          </p:cNvSpPr>
+          <p:nvPr>
+            <p:ph type="sldNum" sz="quarter" idx="10"/>
+          </p:nvPr>
+        </p:nvSpPr>
+        <p:spPr/>
+        <p:txBody>
+          <a:bodyPr/>
+          <a:lstStyle/>
+          <a:p>
+            <a:fld id="{9B5CF600-4147-7540-9DE4-6C8272E0EDC3}" type="slidenum">
               <a:rPr lang="en-US" smtClean="0"/>
-              <a:pPr>
-                <a:defRPr/>
-              </a:pPr>
-              <a:t>23</a:t>
+              <a:t>20</a:t>
             </a:fld>
             <a:endParaRPr lang="en-US"/>
           </a:p>
@@ -1100,7 +1137,7 @@
     </p:spTree>
     <p:extLst>
       <p:ext uri="{BB962C8B-B14F-4D97-AF65-F5344CB8AC3E}">
-        <p14:creationId xmlns:p14="http://schemas.microsoft.com/office/powerpoint/2010/main" val="4268954980"/>
+        <p14:creationId xmlns:p14="http://schemas.microsoft.com/office/powerpoint/2010/main" val="2214325646"/>
       </p:ext>
     </p:extLst>
   </p:cSld>
@@ -1129,7 +1166,7 @@
       </p:grpSpPr>
       <p:sp>
         <p:nvSpPr>
-          <p:cNvPr id="127" name="Shape 127"/>
+          <p:cNvPr id="2" name="Slide Image Placeholder 1"/>
           <p:cNvSpPr>
             <a:spLocks noGrp="1" noRot="1" noChangeAspect="1"/>
           </p:cNvSpPr>
@@ -1137,104 +1174,60 @@
             <p:ph type="sldImg"/>
           </p:nvPr>
         </p:nvSpPr>
-        <p:spPr>
-          <a:prstGeom prst="rect">
-            <a:avLst/>
-          </a:prstGeom>
-        </p:spPr>
+        <p:spPr/>
+      </p:sp>
+      <p:sp>
+        <p:nvSpPr>
+          <p:cNvPr id="3" name="Notes Placeholder 2"/>
+          <p:cNvSpPr>
+            <a:spLocks noGrp="1"/>
+          </p:cNvSpPr>
+          <p:nvPr>
+            <p:ph type="body" idx="1"/>
+          </p:nvPr>
+        </p:nvSpPr>
+        <p:spPr/>
         <p:txBody>
           <a:bodyPr/>
           <a:lstStyle/>
           <a:p>
-            <a:pPr lvl="0"/>
-            <a:endParaRPr/>
-          </a:p>
-        </p:txBody>
-      </p:sp>
-      <p:sp>
-        <p:nvSpPr>
-          <p:cNvPr id="128" name="Shape 128"/>
-          <p:cNvSpPr>
-            <a:spLocks noGrp="1"/>
-          </p:cNvSpPr>
-          <p:nvPr>
-            <p:ph type="body" sz="quarter" idx="1"/>
-          </p:nvPr>
-        </p:nvSpPr>
-        <p:spPr>
-          <a:prstGeom prst="rect">
-            <a:avLst/>
-          </a:prstGeom>
-        </p:spPr>
+            <a:endParaRPr lang="en-US" dirty="0"/>
+          </a:p>
+        </p:txBody>
+      </p:sp>
+      <p:sp>
+        <p:nvSpPr>
+          <p:cNvPr id="4" name="Slide Number Placeholder 3"/>
+          <p:cNvSpPr>
+            <a:spLocks noGrp="1"/>
+          </p:cNvSpPr>
+          <p:nvPr>
+            <p:ph type="sldNum" sz="quarter" idx="10"/>
+          </p:nvPr>
+        </p:nvSpPr>
+        <p:spPr/>
         <p:txBody>
           <a:bodyPr/>
           <a:lstStyle/>
           <a:p>
-            <a:pPr lvl="0" defTabSz="914400">
-              <a:lnSpc>
-                <a:spcPct val="100000"/>
-              </a:lnSpc>
-              <a:defRPr sz="1800"/>
+            <a:pPr>
+              <a:defRPr/>
             </a:pPr>
-            <a:r>
-              <a:rPr sz="1200" b="1">
-                <a:latin typeface="Lucida Sans"/>
-                <a:ea typeface="Lucida Sans"/>
-                <a:cs typeface="Lucida Sans"/>
-                <a:sym typeface="Lucida Sans"/>
-              </a:rPr>
-              <a:t>Argument for main </a:t>
-            </a:r>
-            <a:r>
-              <a:rPr sz="1200">
-                <a:latin typeface="Lucida Sans"/>
-                <a:ea typeface="Lucida Sans"/>
-                <a:cs typeface="Lucida Sans"/>
-                <a:sym typeface="Lucida Sans"/>
-              </a:rPr>
-              <a:t>is not optional.  Must be there.</a:t>
-            </a:r>
-            <a:endParaRPr sz="1200">
-              <a:latin typeface="Gill Sans"/>
-              <a:ea typeface="Gill Sans"/>
-              <a:cs typeface="Gill Sans"/>
-              <a:sym typeface="Gill Sans"/>
-            </a:endParaRPr>
-          </a:p>
-          <a:p>
-            <a:pPr lvl="0" defTabSz="914400">
-              <a:lnSpc>
-                <a:spcPct val="100000"/>
-              </a:lnSpc>
-              <a:defRPr sz="1800"/>
-            </a:pPr>
-            <a:endParaRPr sz="1200">
-              <a:latin typeface="Lucida Sans"/>
-              <a:ea typeface="Lucida Sans"/>
-              <a:cs typeface="Lucida Sans"/>
-              <a:sym typeface="Lucida Sans"/>
-            </a:endParaRPr>
-          </a:p>
-          <a:p>
-            <a:pPr lvl="0" defTabSz="914400">
-              <a:lnSpc>
-                <a:spcPct val="100000"/>
-              </a:lnSpc>
-              <a:defRPr sz="1800"/>
-            </a:pPr>
-            <a:endParaRPr sz="1200">
-              <a:latin typeface="Lucida Sans"/>
-              <a:ea typeface="Lucida Sans"/>
-              <a:cs typeface="Lucida Sans"/>
-              <a:sym typeface="Lucida Sans"/>
-            </a:endParaRPr>
+            <a:fld id="{F3BF035C-C190-4FBE-9474-8535FCFBFED8}" type="slidenum">
+              <a:rPr lang="en-US" smtClean="0"/>
+              <a:pPr>
+                <a:defRPr/>
+              </a:pPr>
+              <a:t>23</a:t>
+            </a:fld>
+            <a:endParaRPr lang="en-US"/>
           </a:p>
         </p:txBody>
       </p:sp>
     </p:spTree>
     <p:extLst>
       <p:ext uri="{BB962C8B-B14F-4D97-AF65-F5344CB8AC3E}">
-        <p14:creationId xmlns:p14="http://schemas.microsoft.com/office/powerpoint/2010/main" val="3443566566"/>
+        <p14:creationId xmlns:p14="http://schemas.microsoft.com/office/powerpoint/2010/main" val="140127366"/>
       </p:ext>
     </p:extLst>
   </p:cSld>
@@ -1263,19 +1256,29 @@
       </p:grpSpPr>
       <p:sp>
         <p:nvSpPr>
-          <p:cNvPr id="2" name="Slide Image Placeholder 1"/>
-          <p:cNvSpPr>
-            <a:spLocks noGrp="1" noRot="1" noChangeAspect="1"/>
+          <p:cNvPr id="41986" name="Slide Image Placeholder 1"/>
+          <p:cNvSpPr>
+            <a:spLocks noGrp="1" noRot="1" noChangeAspect="1" noTextEdit="1"/>
           </p:cNvSpPr>
           <p:nvPr>
             <p:ph type="sldImg"/>
           </p:nvPr>
         </p:nvSpPr>
-        <p:spPr/>
-      </p:sp>
-      <p:sp>
-        <p:nvSpPr>
-          <p:cNvPr id="3" name="Notes Placeholder 2"/>
+        <p:spPr bwMode="auto">
+          <a:noFill/>
+          <a:ln>
+            <a:solidFill>
+              <a:srgbClr val="000000"/>
+            </a:solidFill>
+            <a:miter lim="800000"/>
+            <a:headEnd/>
+            <a:tailEnd/>
+          </a:ln>
+        </p:spPr>
+      </p:sp>
+      <p:sp>
+        <p:nvSpPr>
+          <p:cNvPr id="41987" name="Notes Placeholder 2"/>
           <p:cNvSpPr>
             <a:spLocks noGrp="1"/>
           </p:cNvSpPr>
@@ -1283,56 +1286,52 @@
             <p:ph type="body" idx="1"/>
           </p:nvPr>
         </p:nvSpPr>
-        <p:spPr/>
+        <p:spPr>
+          <a:noFill/>
+          <a:ln/>
+        </p:spPr>
         <p:txBody>
           <a:bodyPr/>
           <a:lstStyle/>
           <a:p>
-            <a:r>
-              <a:rPr lang="en-US" dirty="0"/>
-              <a:t>Do</a:t>
-            </a:r>
-            <a:r>
-              <a:rPr lang="en-US" baseline="0" dirty="0"/>
-              <a:t> not spend too much time on this since students will need time outside of class to complete this.  Be sure to reserve time for the rest of the material and for students to complete the quiz.</a:t>
-            </a:r>
             <a:endParaRPr lang="en-US" dirty="0"/>
           </a:p>
         </p:txBody>
       </p:sp>
       <p:sp>
         <p:nvSpPr>
-          <p:cNvPr id="4" name="Slide Number Placeholder 3"/>
-          <p:cNvSpPr>
-            <a:spLocks noGrp="1"/>
-          </p:cNvSpPr>
-          <p:nvPr>
-            <p:ph type="sldNum" sz="quarter" idx="10"/>
-          </p:nvPr>
-        </p:nvSpPr>
-        <p:spPr/>
+          <p:cNvPr id="41988" name="Slide Number Placeholder 3"/>
+          <p:cNvSpPr>
+            <a:spLocks noGrp="1"/>
+          </p:cNvSpPr>
+          <p:nvPr>
+            <p:ph type="sldNum" sz="quarter" idx="5"/>
+          </p:nvPr>
+        </p:nvSpPr>
+        <p:spPr>
+          <a:noFill/>
+        </p:spPr>
         <p:txBody>
           <a:bodyPr/>
           <a:lstStyle/>
           <a:p>
-            <a:pPr>
-              <a:defRPr/>
-            </a:pPr>
-            <a:fld id="{F3BF035C-C190-4FBE-9474-8535FCFBFED8}" type="slidenum">
-              <a:rPr lang="en-US" smtClean="0"/>
-              <a:pPr>
-                <a:defRPr/>
-              </a:pPr>
-              <a:t>29</a:t>
+            <a:fld id="{21494292-921C-426B-9C45-35E1E1C6101A}" type="slidenum">
+              <a:rPr lang="en-US" smtClean="0">
+                <a:cs typeface="Arial" pitchFamily="34" charset="0"/>
+              </a:rPr>
+              <a:pPr/>
+              <a:t>25</a:t>
             </a:fld>
-            <a:endParaRPr lang="en-US"/>
+            <a:endParaRPr lang="en-US">
+              <a:cs typeface="Arial" pitchFamily="34" charset="0"/>
+            </a:endParaRPr>
           </a:p>
         </p:txBody>
       </p:sp>
     </p:spTree>
     <p:extLst>
       <p:ext uri="{BB962C8B-B14F-4D97-AF65-F5344CB8AC3E}">
-        <p14:creationId xmlns:p14="http://schemas.microsoft.com/office/powerpoint/2010/main" val="1834661279"/>
+        <p14:creationId xmlns:p14="http://schemas.microsoft.com/office/powerpoint/2010/main" val="2624089889"/>
       </p:ext>
     </p:extLst>
   </p:cSld>
@@ -1386,15 +1385,7 @@
           <a:bodyPr/>
           <a:lstStyle/>
           <a:p>
-            <a:r>
-              <a:rPr lang="en-US" dirty="0"/>
-              <a:t>Do</a:t>
-            </a:r>
-            <a:r>
-              <a:rPr lang="en-US" baseline="0" dirty="0"/>
-              <a:t> not spend too much time on this since students will need time outside of class to complete this.  Be sure to reserve time for the rest of the material and for students to complete the quiz.</a:t>
-            </a:r>
-            <a:endParaRPr lang="en-US" dirty="0"/>
+            <a:endParaRPr lang="en-US"/>
           </a:p>
         </p:txBody>
       </p:sp>
@@ -1421,7 +1412,239 @@
               <a:pPr>
                 <a:defRPr/>
               </a:pPr>
-              <a:t>30</a:t>
+              <a:t>26</a:t>
+            </a:fld>
+            <a:endParaRPr lang="en-US"/>
+          </a:p>
+        </p:txBody>
+      </p:sp>
+    </p:spTree>
+    <p:extLst>
+      <p:ext uri="{BB962C8B-B14F-4D97-AF65-F5344CB8AC3E}">
+        <p14:creationId xmlns:p14="http://schemas.microsoft.com/office/powerpoint/2010/main" val="4268954980"/>
+      </p:ext>
+    </p:extLst>
+  </p:cSld>
+  <p:clrMapOvr>
+    <a:masterClrMapping/>
+  </p:clrMapOvr>
+</p:notes>
+</file>
+
+<file path=ppt/notesSlides/notesSlide18.xml><?xml version="1.0" encoding="utf-8"?>
+<p:notes xmlns:a="http://schemas.openxmlformats.org/drawingml/2006/main" xmlns:r="http://schemas.openxmlformats.org/officeDocument/2006/relationships" xmlns:p="http://schemas.openxmlformats.org/presentationml/2006/main">
+  <p:cSld>
+    <p:spTree>
+      <p:nvGrpSpPr>
+        <p:cNvPr id="1" name=""/>
+        <p:cNvGrpSpPr/>
+        <p:nvPr/>
+      </p:nvGrpSpPr>
+      <p:grpSpPr>
+        <a:xfrm>
+          <a:off x="0" y="0"/>
+          <a:ext cx="0" cy="0"/>
+          <a:chOff x="0" y="0"/>
+          <a:chExt cx="0" cy="0"/>
+        </a:xfrm>
+      </p:grpSpPr>
+      <p:sp>
+        <p:nvSpPr>
+          <p:cNvPr id="127" name="Shape 127"/>
+          <p:cNvSpPr>
+            <a:spLocks noGrp="1" noRot="1" noChangeAspect="1"/>
+          </p:cNvSpPr>
+          <p:nvPr>
+            <p:ph type="sldImg"/>
+          </p:nvPr>
+        </p:nvSpPr>
+        <p:spPr>
+          <a:prstGeom prst="rect">
+            <a:avLst/>
+          </a:prstGeom>
+        </p:spPr>
+        <p:txBody>
+          <a:bodyPr/>
+          <a:lstStyle/>
+          <a:p>
+            <a:pPr lvl="0"/>
+            <a:endParaRPr/>
+          </a:p>
+        </p:txBody>
+      </p:sp>
+      <p:sp>
+        <p:nvSpPr>
+          <p:cNvPr id="128" name="Shape 128"/>
+          <p:cNvSpPr>
+            <a:spLocks noGrp="1"/>
+          </p:cNvSpPr>
+          <p:nvPr>
+            <p:ph type="body" sz="quarter" idx="1"/>
+          </p:nvPr>
+        </p:nvSpPr>
+        <p:spPr>
+          <a:prstGeom prst="rect">
+            <a:avLst/>
+          </a:prstGeom>
+        </p:spPr>
+        <p:txBody>
+          <a:bodyPr/>
+          <a:lstStyle/>
+          <a:p>
+            <a:pPr lvl="0" defTabSz="914400">
+              <a:lnSpc>
+                <a:spcPct val="100000"/>
+              </a:lnSpc>
+              <a:defRPr sz="1800"/>
+            </a:pPr>
+            <a:r>
+              <a:rPr sz="1200" b="1">
+                <a:latin typeface="Lucida Sans"/>
+                <a:ea typeface="Lucida Sans"/>
+                <a:cs typeface="Lucida Sans"/>
+                <a:sym typeface="Lucida Sans"/>
+              </a:rPr>
+              <a:t>Argument for main </a:t>
+            </a:r>
+            <a:r>
+              <a:rPr sz="1200">
+                <a:latin typeface="Lucida Sans"/>
+                <a:ea typeface="Lucida Sans"/>
+                <a:cs typeface="Lucida Sans"/>
+                <a:sym typeface="Lucida Sans"/>
+              </a:rPr>
+              <a:t>is not optional.  Must be there.</a:t>
+            </a:r>
+            <a:endParaRPr sz="1200">
+              <a:latin typeface="Gill Sans"/>
+              <a:ea typeface="Gill Sans"/>
+              <a:cs typeface="Gill Sans"/>
+              <a:sym typeface="Gill Sans"/>
+            </a:endParaRPr>
+          </a:p>
+          <a:p>
+            <a:pPr lvl="0" defTabSz="914400">
+              <a:lnSpc>
+                <a:spcPct val="100000"/>
+              </a:lnSpc>
+              <a:defRPr sz="1800"/>
+            </a:pPr>
+            <a:endParaRPr sz="1200">
+              <a:latin typeface="Lucida Sans"/>
+              <a:ea typeface="Lucida Sans"/>
+              <a:cs typeface="Lucida Sans"/>
+              <a:sym typeface="Lucida Sans"/>
+            </a:endParaRPr>
+          </a:p>
+          <a:p>
+            <a:pPr lvl="0" defTabSz="914400">
+              <a:lnSpc>
+                <a:spcPct val="100000"/>
+              </a:lnSpc>
+              <a:defRPr sz="1800"/>
+            </a:pPr>
+            <a:endParaRPr sz="1200">
+              <a:latin typeface="Lucida Sans"/>
+              <a:ea typeface="Lucida Sans"/>
+              <a:cs typeface="Lucida Sans"/>
+              <a:sym typeface="Lucida Sans"/>
+            </a:endParaRPr>
+          </a:p>
+        </p:txBody>
+      </p:sp>
+    </p:spTree>
+    <p:extLst>
+      <p:ext uri="{BB962C8B-B14F-4D97-AF65-F5344CB8AC3E}">
+        <p14:creationId xmlns:p14="http://schemas.microsoft.com/office/powerpoint/2010/main" val="3443566566"/>
+      </p:ext>
+    </p:extLst>
+  </p:cSld>
+  <p:clrMapOvr>
+    <a:masterClrMapping/>
+  </p:clrMapOvr>
+</p:notes>
+</file>
+
+<file path=ppt/notesSlides/notesSlide19.xml><?xml version="1.0" encoding="utf-8"?>
+<p:notes xmlns:a="http://schemas.openxmlformats.org/drawingml/2006/main" xmlns:r="http://schemas.openxmlformats.org/officeDocument/2006/relationships" xmlns:p="http://schemas.openxmlformats.org/presentationml/2006/main">
+  <p:cSld>
+    <p:spTree>
+      <p:nvGrpSpPr>
+        <p:cNvPr id="1" name=""/>
+        <p:cNvGrpSpPr/>
+        <p:nvPr/>
+      </p:nvGrpSpPr>
+      <p:grpSpPr>
+        <a:xfrm>
+          <a:off x="0" y="0"/>
+          <a:ext cx="0" cy="0"/>
+          <a:chOff x="0" y="0"/>
+          <a:chExt cx="0" cy="0"/>
+        </a:xfrm>
+      </p:grpSpPr>
+      <p:sp>
+        <p:nvSpPr>
+          <p:cNvPr id="2" name="Slide Image Placeholder 1"/>
+          <p:cNvSpPr>
+            <a:spLocks noGrp="1" noRot="1" noChangeAspect="1"/>
+          </p:cNvSpPr>
+          <p:nvPr>
+            <p:ph type="sldImg"/>
+          </p:nvPr>
+        </p:nvSpPr>
+        <p:spPr/>
+      </p:sp>
+      <p:sp>
+        <p:nvSpPr>
+          <p:cNvPr id="3" name="Notes Placeholder 2"/>
+          <p:cNvSpPr>
+            <a:spLocks noGrp="1"/>
+          </p:cNvSpPr>
+          <p:nvPr>
+            <p:ph type="body" idx="1"/>
+          </p:nvPr>
+        </p:nvSpPr>
+        <p:spPr/>
+        <p:txBody>
+          <a:bodyPr/>
+          <a:lstStyle/>
+          <a:p>
+            <a:r>
+              <a:rPr lang="en-US" dirty="0"/>
+              <a:t>Do</a:t>
+            </a:r>
+            <a:r>
+              <a:rPr lang="en-US" baseline="0" dirty="0"/>
+              <a:t> not spend too much time on this since students will need time outside of class to complete this.  Be sure to reserve time for the rest of the material and for students to complete the quiz.</a:t>
+            </a:r>
+            <a:endParaRPr lang="en-US" dirty="0"/>
+          </a:p>
+        </p:txBody>
+      </p:sp>
+      <p:sp>
+        <p:nvSpPr>
+          <p:cNvPr id="4" name="Slide Number Placeholder 3"/>
+          <p:cNvSpPr>
+            <a:spLocks noGrp="1"/>
+          </p:cNvSpPr>
+          <p:nvPr>
+            <p:ph type="sldNum" sz="quarter" idx="10"/>
+          </p:nvPr>
+        </p:nvSpPr>
+        <p:spPr/>
+        <p:txBody>
+          <a:bodyPr/>
+          <a:lstStyle/>
+          <a:p>
+            <a:pPr>
+              <a:defRPr/>
+            </a:pPr>
+            <a:fld id="{F3BF035C-C190-4FBE-9474-8535FCFBFED8}" type="slidenum">
+              <a:rPr lang="en-US" smtClean="0"/>
+              <a:pPr>
+                <a:defRPr/>
+              </a:pPr>
+              <a:t>32</a:t>
             </a:fld>
             <a:endParaRPr lang="en-US"/>
           </a:p>
@@ -2282,11 +2505,11 @@
 </file>
 
 <file path=ppt/notesSlides/notesSlide8.xml><?xml version="1.0" encoding="utf-8"?>
-<p:notes xmlns:a="http://schemas.openxmlformats.org/drawingml/2006/main" xmlns:r="http://schemas.openxmlformats.org/officeDocument/2006/relationships" xmlns:p="http://schemas.openxmlformats.org/presentationml/2006/main">
+<p:notes xmlns:a="http://schemas.openxmlformats.org/drawingml/2006/main" xmlns:r="http://schemas.openxmlformats.org/officeDocument/2006/relationships" xmlns:p="http://schemas.openxmlformats.org/presentationml/2006/main" showMasterSp="0" showMasterPhAnim="0">
   <p:cSld>
     <p:spTree>
       <p:nvGrpSpPr>
-        <p:cNvPr id="1" name=""/>
+        <p:cNvPr id="1" name="Shape 108"/>
         <p:cNvGrpSpPr/>
         <p:nvPr/>
       </p:nvGrpSpPr>
@@ -2300,71 +2523,84 @@
       </p:grpSpPr>
       <p:sp>
         <p:nvSpPr>
-          <p:cNvPr id="181" name="Shape 181"/>
+          <p:cNvPr id="109" name="Google Shape;109;g787571e53b_0_172:notes"/>
           <p:cNvSpPr>
             <a:spLocks noGrp="1" noRot="1" noChangeAspect="1"/>
           </p:cNvSpPr>
           <p:nvPr>
-            <p:ph type="sldImg"/>
+            <p:ph type="sldImg" idx="2"/>
           </p:nvPr>
         </p:nvSpPr>
         <p:spPr>
+          <a:xfrm>
+            <a:off x="381175" y="685800"/>
+            <a:ext cx="6096300" cy="3429000"/>
+          </a:xfrm>
+          <a:custGeom>
+            <a:avLst/>
+            <a:gdLst/>
+            <a:ahLst/>
+            <a:cxnLst/>
+            <a:rect l="l" t="t" r="r" b="b"/>
+            <a:pathLst>
+              <a:path w="120000" h="120000" extrusionOk="0">
+                <a:moveTo>
+                  <a:pt x="0" y="0"/>
+                </a:moveTo>
+                <a:lnTo>
+                  <a:pt x="120000" y="0"/>
+                </a:lnTo>
+                <a:lnTo>
+                  <a:pt x="120000" y="120000"/>
+                </a:lnTo>
+                <a:lnTo>
+                  <a:pt x="0" y="120000"/>
+                </a:lnTo>
+                <a:close/>
+              </a:path>
+            </a:pathLst>
+          </a:custGeom>
+        </p:spPr>
+      </p:sp>
+      <p:sp>
+        <p:nvSpPr>
+          <p:cNvPr id="110" name="Google Shape;110;g787571e53b_0_172:notes"/>
+          <p:cNvSpPr txBox="1">
+            <a:spLocks noGrp="1"/>
+          </p:cNvSpPr>
+          <p:nvPr>
+            <p:ph type="body" idx="1"/>
+          </p:nvPr>
+        </p:nvSpPr>
+        <p:spPr>
+          <a:xfrm>
+            <a:off x="685800" y="4343400"/>
+            <a:ext cx="5486400" cy="4114800"/>
+          </a:xfrm>
           <a:prstGeom prst="rect">
             <a:avLst/>
           </a:prstGeom>
         </p:spPr>
         <p:txBody>
-          <a:bodyPr/>
-          <a:lstStyle/>
-          <a:p>
-            <a:pPr lvl="0"/>
+          <a:bodyPr spcFirstLastPara="1" wrap="square" lIns="91425" tIns="91425" rIns="91425" bIns="91425" anchor="t" anchorCtr="0">
+            <a:noAutofit/>
+          </a:bodyPr>
+          <a:lstStyle/>
+          <a:p>
+            <a:pPr marL="0" lvl="0" indent="0" algn="l" rtl="0">
+              <a:spcBef>
+                <a:spcPts val="0"/>
+              </a:spcBef>
+              <a:spcAft>
+                <a:spcPts val="0"/>
+              </a:spcAft>
+              <a:buNone/>
+            </a:pPr>
             <a:endParaRPr/>
           </a:p>
         </p:txBody>
       </p:sp>
-      <p:sp>
-        <p:nvSpPr>
-          <p:cNvPr id="182" name="Shape 182"/>
-          <p:cNvSpPr>
-            <a:spLocks noGrp="1"/>
-          </p:cNvSpPr>
-          <p:nvPr>
-            <p:ph type="body" sz="quarter" idx="1"/>
-          </p:nvPr>
-        </p:nvSpPr>
-        <p:spPr>
-          <a:prstGeom prst="rect">
-            <a:avLst/>
-          </a:prstGeom>
-        </p:spPr>
-        <p:txBody>
-          <a:bodyPr/>
-          <a:lstStyle/>
-          <a:p>
-            <a:pPr lvl="0" defTabSz="914400">
-              <a:lnSpc>
-                <a:spcPct val="100000"/>
-              </a:lnSpc>
-              <a:spcBef>
-                <a:spcPts val="400"/>
-              </a:spcBef>
-              <a:defRPr sz="1800"/>
-            </a:pPr>
-            <a:endParaRPr sz="1200" dirty="0">
-              <a:latin typeface="Calibri"/>
-              <a:ea typeface="Calibri"/>
-              <a:cs typeface="Calibri"/>
-              <a:sym typeface="Calibri"/>
-            </a:endParaRPr>
-          </a:p>
-        </p:txBody>
-      </p:sp>
     </p:spTree>
-    <p:extLst>
-      <p:ext uri="{BB962C8B-B14F-4D97-AF65-F5344CB8AC3E}">
-        <p14:creationId xmlns:p14="http://schemas.microsoft.com/office/powerpoint/2010/main" val="1261416685"/>
-      </p:ext>
-    </p:extLst>
   </p:cSld>
   <p:clrMapOvr>
     <a:masterClrMapping/>
@@ -2373,11 +2609,11 @@
 </file>
 
 <file path=ppt/notesSlides/notesSlide9.xml><?xml version="1.0" encoding="utf-8"?>
-<p:notes xmlns:a="http://schemas.openxmlformats.org/drawingml/2006/main" xmlns:r="http://schemas.openxmlformats.org/officeDocument/2006/relationships" xmlns:p="http://schemas.openxmlformats.org/presentationml/2006/main">
+<p:notes xmlns:a="http://schemas.openxmlformats.org/drawingml/2006/main" xmlns:r="http://schemas.openxmlformats.org/officeDocument/2006/relationships" xmlns:p="http://schemas.openxmlformats.org/presentationml/2006/main" showMasterSp="0" showMasterPhAnim="0">
   <p:cSld>
     <p:spTree>
       <p:nvGrpSpPr>
-        <p:cNvPr id="1" name=""/>
+        <p:cNvPr id="1" name="Shape 120"/>
         <p:cNvGrpSpPr/>
         <p:nvPr/>
       </p:nvGrpSpPr>
@@ -2391,80 +2627,108 @@
       </p:grpSpPr>
       <p:sp>
         <p:nvSpPr>
-          <p:cNvPr id="2" name="Slide Image Placeholder 1"/>
+          <p:cNvPr id="121" name="Google Shape;121;g787571e53b_0_191:notes"/>
           <p:cNvSpPr>
             <a:spLocks noGrp="1" noRot="1" noChangeAspect="1"/>
           </p:cNvSpPr>
           <p:nvPr>
-            <p:ph type="sldImg"/>
-          </p:nvPr>
-        </p:nvSpPr>
-        <p:spPr/>
-      </p:sp>
-      <p:sp>
-        <p:nvSpPr>
-          <p:cNvPr id="3" name="Notes Placeholder 2"/>
-          <p:cNvSpPr>
+            <p:ph type="sldImg" idx="2"/>
+          </p:nvPr>
+        </p:nvSpPr>
+        <p:spPr>
+          <a:xfrm>
+            <a:off x="381175" y="685800"/>
+            <a:ext cx="6096300" cy="3429000"/>
+          </a:xfrm>
+          <a:custGeom>
+            <a:avLst/>
+            <a:gdLst/>
+            <a:ahLst/>
+            <a:cxnLst/>
+            <a:rect l="l" t="t" r="r" b="b"/>
+            <a:pathLst>
+              <a:path w="120000" h="120000" extrusionOk="0">
+                <a:moveTo>
+                  <a:pt x="0" y="0"/>
+                </a:moveTo>
+                <a:lnTo>
+                  <a:pt x="120000" y="0"/>
+                </a:lnTo>
+                <a:lnTo>
+                  <a:pt x="120000" y="120000"/>
+                </a:lnTo>
+                <a:lnTo>
+                  <a:pt x="0" y="120000"/>
+                </a:lnTo>
+                <a:close/>
+              </a:path>
+            </a:pathLst>
+          </a:custGeom>
+        </p:spPr>
+      </p:sp>
+      <p:sp>
+        <p:nvSpPr>
+          <p:cNvPr id="122" name="Google Shape;122;g787571e53b_0_191:notes"/>
+          <p:cNvSpPr txBox="1">
             <a:spLocks noGrp="1"/>
           </p:cNvSpPr>
           <p:nvPr>
             <p:ph type="body" idx="1"/>
           </p:nvPr>
         </p:nvSpPr>
-        <p:spPr/>
-        <p:txBody>
-          <a:bodyPr/>
-          <a:lstStyle/>
-          <a:p>
-            <a:r>
-              <a:rPr lang="en-US" dirty="0"/>
-              <a:t>Only spend time on this if you want to show the </a:t>
-            </a:r>
-            <a:r>
-              <a:rPr lang="en-US" dirty="0" err="1"/>
-              <a:t>DebugMeTest</a:t>
-            </a:r>
-            <a:r>
-              <a:rPr lang="en-US" dirty="0"/>
-              <a:t> examples,</a:t>
-            </a:r>
-            <a:r>
-              <a:rPr lang="en-US" baseline="0" dirty="0"/>
-              <a:t> in particular the final test which you can use to demonstrate this approach.</a:t>
-            </a:r>
-            <a:endParaRPr lang="en-US" dirty="0"/>
-          </a:p>
-        </p:txBody>
-      </p:sp>
-      <p:sp>
-        <p:nvSpPr>
-          <p:cNvPr id="4" name="Slide Number Placeholder 3"/>
-          <p:cNvSpPr>
-            <a:spLocks noGrp="1"/>
-          </p:cNvSpPr>
-          <p:nvPr>
-            <p:ph type="sldNum" sz="quarter" idx="10"/>
-          </p:nvPr>
-        </p:nvSpPr>
-        <p:spPr/>
-        <p:txBody>
-          <a:bodyPr/>
-          <a:lstStyle/>
-          <a:p>
-            <a:fld id="{9B5CF600-4147-7540-9DE4-6C8272E0EDC3}" type="slidenum">
-              <a:rPr lang="en-US" smtClean="0"/>
-              <a:t>15</a:t>
-            </a:fld>
-            <a:endParaRPr lang="en-US"/>
+        <p:spPr>
+          <a:xfrm>
+            <a:off x="685800" y="4343400"/>
+            <a:ext cx="5486400" cy="4114800"/>
+          </a:xfrm>
+          <a:prstGeom prst="rect">
+            <a:avLst/>
+          </a:prstGeom>
+        </p:spPr>
+        <p:txBody>
+          <a:bodyPr spcFirstLastPara="1" wrap="square" lIns="91425" tIns="91425" rIns="91425" bIns="91425" anchor="t" anchorCtr="0">
+            <a:noAutofit/>
+          </a:bodyPr>
+          <a:lstStyle/>
+          <a:p>
+            <a:pPr marL="0" lvl="0" indent="0" algn="l" rtl="0">
+              <a:spcBef>
+                <a:spcPts val="0"/>
+              </a:spcBef>
+              <a:spcAft>
+                <a:spcPts val="0"/>
+              </a:spcAft>
+              <a:buNone/>
+            </a:pPr>
+            <a:r>
+              <a:rPr lang="en" sz="1800">
+                <a:solidFill>
+                  <a:srgbClr val="840629"/>
+                </a:solidFill>
+              </a:rPr>
+              <a:t>CAREFUL- if you do not stop the running debugger, you can have multiple instances running and the debugger variables you see might be from a different running </a:t>
+            </a:r>
+            <a:endParaRPr sz="1800">
+              <a:solidFill>
+                <a:srgbClr val="840629"/>
+              </a:solidFill>
+            </a:endParaRPr>
+          </a:p>
+          <a:p>
+            <a:pPr marL="0" lvl="0" indent="0" algn="l" rtl="0">
+              <a:spcBef>
+                <a:spcPts val="0"/>
+              </a:spcBef>
+              <a:spcAft>
+                <a:spcPts val="0"/>
+              </a:spcAft>
+              <a:buNone/>
+            </a:pPr>
+            <a:endParaRPr/>
           </a:p>
         </p:txBody>
       </p:sp>
     </p:spTree>
-    <p:extLst>
-      <p:ext uri="{BB962C8B-B14F-4D97-AF65-F5344CB8AC3E}">
-        <p14:creationId xmlns:p14="http://schemas.microsoft.com/office/powerpoint/2010/main" val="3263308297"/>
-      </p:ext>
-    </p:extLst>
   </p:cSld>
   <p:clrMapOvr>
     <a:masterClrMapping/>
@@ -2651,7 +2915,7 @@
           <a:p>
             <a:fld id="{5B07E745-2C70-2943-8487-A8F6E88ADF5E}" type="datetimeFigureOut">
               <a:rPr lang="en-US" smtClean="0"/>
-              <a:t>3/1/22</a:t>
+              <a:t>3/13/2022</a:t>
             </a:fld>
             <a:endParaRPr lang="en-US"/>
           </a:p>
@@ -2819,7 +3083,7 @@
           <a:p>
             <a:fld id="{5B07E745-2C70-2943-8487-A8F6E88ADF5E}" type="datetimeFigureOut">
               <a:rPr lang="en-US" smtClean="0"/>
-              <a:t>3/1/22</a:t>
+              <a:t>3/13/2022</a:t>
             </a:fld>
             <a:endParaRPr lang="en-US"/>
           </a:p>
@@ -2997,7 +3261,7 @@
           <a:p>
             <a:fld id="{5B07E745-2C70-2943-8487-A8F6E88ADF5E}" type="datetimeFigureOut">
               <a:rPr lang="en-US" smtClean="0"/>
-              <a:t>3/1/22</a:t>
+              <a:t>3/13/2022</a:t>
             </a:fld>
             <a:endParaRPr lang="en-US"/>
           </a:p>
@@ -3049,6 +3313,383 @@
     <p:extLst>
       <p:ext uri="{BB962C8B-B14F-4D97-AF65-F5344CB8AC3E}">
         <p14:creationId xmlns:p14="http://schemas.microsoft.com/office/powerpoint/2010/main" val="3898878775"/>
+      </p:ext>
+    </p:extLst>
+  </p:cSld>
+  <p:clrMapOvr>
+    <a:masterClrMapping/>
+  </p:clrMapOvr>
+</p:sldLayout>
+</file>
+
+<file path=ppt/slideLayouts/slideLayout12.xml><?xml version="1.0" encoding="utf-8"?>
+<p:sldLayout xmlns:a="http://schemas.openxmlformats.org/drawingml/2006/main" xmlns:r="http://schemas.openxmlformats.org/officeDocument/2006/relationships" xmlns:p="http://schemas.openxmlformats.org/presentationml/2006/main" matchingName="Title and body" type="tx">
+  <p:cSld name="Title and body">
+    <p:spTree>
+      <p:nvGrpSpPr>
+        <p:cNvPr id="1" name="Shape 56"/>
+        <p:cNvGrpSpPr/>
+        <p:nvPr/>
+      </p:nvGrpSpPr>
+      <p:grpSpPr>
+        <a:xfrm>
+          <a:off x="0" y="0"/>
+          <a:ext cx="0" cy="0"/>
+          <a:chOff x="0" y="0"/>
+          <a:chExt cx="0" cy="0"/>
+        </a:xfrm>
+      </p:grpSpPr>
+      <p:sp>
+        <p:nvSpPr>
+          <p:cNvPr id="57" name="Google Shape;57;p15"/>
+          <p:cNvSpPr txBox="1">
+            <a:spLocks noGrp="1"/>
+          </p:cNvSpPr>
+          <p:nvPr>
+            <p:ph type="title"/>
+          </p:nvPr>
+        </p:nvSpPr>
+        <p:spPr>
+          <a:xfrm>
+            <a:off x="457200" y="274637"/>
+            <a:ext cx="8229600" cy="1143200"/>
+          </a:xfrm>
+          <a:prstGeom prst="rect">
+            <a:avLst/>
+          </a:prstGeom>
+          <a:noFill/>
+          <a:ln>
+            <a:noFill/>
+          </a:ln>
+        </p:spPr>
+        <p:txBody>
+          <a:bodyPr spcFirstLastPara="1" wrap="square" lIns="91425" tIns="91425" rIns="91425" bIns="91425" anchor="b" anchorCtr="0">
+            <a:noAutofit/>
+          </a:bodyPr>
+          <a:lstStyle>
+            <a:lvl1pPr lvl="0" algn="l" rtl="0">
+              <a:spcBef>
+                <a:spcPts val="0"/>
+              </a:spcBef>
+              <a:spcAft>
+                <a:spcPts val="0"/>
+              </a:spcAft>
+              <a:buSzPts val="3600"/>
+              <a:buFont typeface="Arial"/>
+              <a:buNone/>
+              <a:defRPr sz="3600" b="1">
+                <a:solidFill>
+                  <a:schemeClr val="dk1"/>
+                </a:solidFill>
+                <a:latin typeface="Arial"/>
+                <a:ea typeface="Arial"/>
+                <a:cs typeface="Arial"/>
+                <a:sym typeface="Arial"/>
+              </a:defRPr>
+            </a:lvl1pPr>
+            <a:lvl2pPr lvl="1" algn="l" rtl="0">
+              <a:spcBef>
+                <a:spcPts val="0"/>
+              </a:spcBef>
+              <a:spcAft>
+                <a:spcPts val="0"/>
+              </a:spcAft>
+              <a:buSzPts val="3600"/>
+              <a:buFont typeface="Arial"/>
+              <a:buNone/>
+              <a:defRPr sz="3600" b="1">
+                <a:solidFill>
+                  <a:schemeClr val="dk1"/>
+                </a:solidFill>
+                <a:latin typeface="Arial"/>
+                <a:ea typeface="Arial"/>
+                <a:cs typeface="Arial"/>
+                <a:sym typeface="Arial"/>
+              </a:defRPr>
+            </a:lvl2pPr>
+            <a:lvl3pPr lvl="2" algn="l" rtl="0">
+              <a:spcBef>
+                <a:spcPts val="0"/>
+              </a:spcBef>
+              <a:spcAft>
+                <a:spcPts val="0"/>
+              </a:spcAft>
+              <a:buSzPts val="3600"/>
+              <a:buFont typeface="Arial"/>
+              <a:buNone/>
+              <a:defRPr sz="3600" b="1">
+                <a:solidFill>
+                  <a:schemeClr val="dk1"/>
+                </a:solidFill>
+                <a:latin typeface="Arial"/>
+                <a:ea typeface="Arial"/>
+                <a:cs typeface="Arial"/>
+                <a:sym typeface="Arial"/>
+              </a:defRPr>
+            </a:lvl3pPr>
+            <a:lvl4pPr lvl="3" algn="l" rtl="0">
+              <a:spcBef>
+                <a:spcPts val="0"/>
+              </a:spcBef>
+              <a:spcAft>
+                <a:spcPts val="0"/>
+              </a:spcAft>
+              <a:buSzPts val="3600"/>
+              <a:buFont typeface="Arial"/>
+              <a:buNone/>
+              <a:defRPr sz="3600" b="1">
+                <a:solidFill>
+                  <a:schemeClr val="dk1"/>
+                </a:solidFill>
+                <a:latin typeface="Arial"/>
+                <a:ea typeface="Arial"/>
+                <a:cs typeface="Arial"/>
+                <a:sym typeface="Arial"/>
+              </a:defRPr>
+            </a:lvl4pPr>
+            <a:lvl5pPr lvl="4" algn="l" rtl="0">
+              <a:spcBef>
+                <a:spcPts val="0"/>
+              </a:spcBef>
+              <a:spcAft>
+                <a:spcPts val="0"/>
+              </a:spcAft>
+              <a:buSzPts val="3600"/>
+              <a:buFont typeface="Arial"/>
+              <a:buNone/>
+              <a:defRPr sz="3600" b="1">
+                <a:solidFill>
+                  <a:schemeClr val="dk1"/>
+                </a:solidFill>
+                <a:latin typeface="Arial"/>
+                <a:ea typeface="Arial"/>
+                <a:cs typeface="Arial"/>
+                <a:sym typeface="Arial"/>
+              </a:defRPr>
+            </a:lvl5pPr>
+            <a:lvl6pPr lvl="5" algn="l" rtl="0">
+              <a:spcBef>
+                <a:spcPts val="0"/>
+              </a:spcBef>
+              <a:spcAft>
+                <a:spcPts val="0"/>
+              </a:spcAft>
+              <a:buSzPts val="3600"/>
+              <a:buFont typeface="Arial"/>
+              <a:buNone/>
+              <a:defRPr sz="3600" b="1">
+                <a:solidFill>
+                  <a:schemeClr val="dk1"/>
+                </a:solidFill>
+                <a:latin typeface="Arial"/>
+                <a:ea typeface="Arial"/>
+                <a:cs typeface="Arial"/>
+                <a:sym typeface="Arial"/>
+              </a:defRPr>
+            </a:lvl6pPr>
+            <a:lvl7pPr lvl="6" algn="l" rtl="0">
+              <a:spcBef>
+                <a:spcPts val="0"/>
+              </a:spcBef>
+              <a:spcAft>
+                <a:spcPts val="0"/>
+              </a:spcAft>
+              <a:buSzPts val="3600"/>
+              <a:buFont typeface="Arial"/>
+              <a:buNone/>
+              <a:defRPr sz="3600" b="1">
+                <a:solidFill>
+                  <a:schemeClr val="dk1"/>
+                </a:solidFill>
+                <a:latin typeface="Arial"/>
+                <a:ea typeface="Arial"/>
+                <a:cs typeface="Arial"/>
+                <a:sym typeface="Arial"/>
+              </a:defRPr>
+            </a:lvl7pPr>
+            <a:lvl8pPr lvl="7" algn="l" rtl="0">
+              <a:spcBef>
+                <a:spcPts val="0"/>
+              </a:spcBef>
+              <a:spcAft>
+                <a:spcPts val="0"/>
+              </a:spcAft>
+              <a:buSzPts val="3600"/>
+              <a:buFont typeface="Arial"/>
+              <a:buNone/>
+              <a:defRPr sz="3600" b="1">
+                <a:solidFill>
+                  <a:schemeClr val="dk1"/>
+                </a:solidFill>
+                <a:latin typeface="Arial"/>
+                <a:ea typeface="Arial"/>
+                <a:cs typeface="Arial"/>
+                <a:sym typeface="Arial"/>
+              </a:defRPr>
+            </a:lvl8pPr>
+            <a:lvl9pPr lvl="8" algn="l" rtl="0">
+              <a:spcBef>
+                <a:spcPts val="0"/>
+              </a:spcBef>
+              <a:spcAft>
+                <a:spcPts val="0"/>
+              </a:spcAft>
+              <a:buSzPts val="3600"/>
+              <a:buFont typeface="Arial"/>
+              <a:buNone/>
+              <a:defRPr sz="3600" b="1">
+                <a:solidFill>
+                  <a:schemeClr val="dk1"/>
+                </a:solidFill>
+                <a:latin typeface="Arial"/>
+                <a:ea typeface="Arial"/>
+                <a:cs typeface="Arial"/>
+                <a:sym typeface="Arial"/>
+              </a:defRPr>
+            </a:lvl9pPr>
+          </a:lstStyle>
+          <a:p>
+            <a:endParaRPr/>
+          </a:p>
+        </p:txBody>
+      </p:sp>
+      <p:sp>
+        <p:nvSpPr>
+          <p:cNvPr id="58" name="Google Shape;58;p15"/>
+          <p:cNvSpPr txBox="1">
+            <a:spLocks noGrp="1"/>
+          </p:cNvSpPr>
+          <p:nvPr>
+            <p:ph type="body" idx="1"/>
+          </p:nvPr>
+        </p:nvSpPr>
+        <p:spPr>
+          <a:xfrm>
+            <a:off x="457200" y="1600200"/>
+            <a:ext cx="8229600" cy="4967600"/>
+          </a:xfrm>
+          <a:prstGeom prst="rect">
+            <a:avLst/>
+          </a:prstGeom>
+          <a:noFill/>
+          <a:ln>
+            <a:noFill/>
+          </a:ln>
+        </p:spPr>
+        <p:txBody>
+          <a:bodyPr spcFirstLastPara="1" wrap="square" lIns="91425" tIns="91425" rIns="91425" bIns="91425" anchor="t" anchorCtr="0">
+            <a:noAutofit/>
+          </a:bodyPr>
+          <a:lstStyle>
+            <a:lvl1pPr marL="457200" lvl="0" indent="-419100" rtl="0">
+              <a:spcBef>
+                <a:spcPts val="600"/>
+              </a:spcBef>
+              <a:spcAft>
+                <a:spcPts val="0"/>
+              </a:spcAft>
+              <a:buSzPts val="3000"/>
+              <a:buChar char="●"/>
+              <a:defRPr/>
+            </a:lvl1pPr>
+            <a:lvl2pPr marL="914400" lvl="1" indent="-381000" rtl="0">
+              <a:spcBef>
+                <a:spcPts val="0"/>
+              </a:spcBef>
+              <a:spcAft>
+                <a:spcPts val="0"/>
+              </a:spcAft>
+              <a:buSzPts val="2400"/>
+              <a:buChar char="○"/>
+              <a:defRPr/>
+            </a:lvl2pPr>
+            <a:lvl3pPr marL="1371600" lvl="2" indent="-381000" rtl="0">
+              <a:spcBef>
+                <a:spcPts val="0"/>
+              </a:spcBef>
+              <a:spcAft>
+                <a:spcPts val="0"/>
+              </a:spcAft>
+              <a:buSzPts val="2400"/>
+              <a:buChar char="■"/>
+              <a:defRPr/>
+            </a:lvl3pPr>
+            <a:lvl4pPr marL="1828800" lvl="3" indent="-342900" rtl="0">
+              <a:spcBef>
+                <a:spcPts val="0"/>
+              </a:spcBef>
+              <a:spcAft>
+                <a:spcPts val="0"/>
+              </a:spcAft>
+              <a:buSzPts val="1800"/>
+              <a:buChar char="●"/>
+              <a:defRPr/>
+            </a:lvl4pPr>
+            <a:lvl5pPr marL="2286000" lvl="4" indent="-342900" rtl="0">
+              <a:spcBef>
+                <a:spcPts val="0"/>
+              </a:spcBef>
+              <a:spcAft>
+                <a:spcPts val="0"/>
+              </a:spcAft>
+              <a:buSzPts val="1800"/>
+              <a:buChar char="○"/>
+              <a:defRPr sz="1800"/>
+            </a:lvl5pPr>
+            <a:lvl6pPr marL="2743200" lvl="5" indent="-342900" rtl="0">
+              <a:spcBef>
+                <a:spcPts val="0"/>
+              </a:spcBef>
+              <a:spcAft>
+                <a:spcPts val="0"/>
+              </a:spcAft>
+              <a:buSzPts val="1800"/>
+              <a:buChar char="■"/>
+              <a:defRPr sz="1800"/>
+            </a:lvl6pPr>
+            <a:lvl7pPr marL="3200400" lvl="6" indent="-342900" rtl="0">
+              <a:spcBef>
+                <a:spcPts val="0"/>
+              </a:spcBef>
+              <a:spcAft>
+                <a:spcPts val="0"/>
+              </a:spcAft>
+              <a:buSzPts val="1800"/>
+              <a:buChar char="●"/>
+              <a:defRPr sz="1800"/>
+            </a:lvl7pPr>
+            <a:lvl8pPr marL="3657600" lvl="7" indent="-342900" rtl="0">
+              <a:spcBef>
+                <a:spcPts val="0"/>
+              </a:spcBef>
+              <a:spcAft>
+                <a:spcPts val="0"/>
+              </a:spcAft>
+              <a:buSzPts val="1800"/>
+              <a:buChar char="○"/>
+              <a:defRPr sz="1800"/>
+            </a:lvl8pPr>
+            <a:lvl9pPr marL="4114800" lvl="8" indent="-342900" rtl="0">
+              <a:spcBef>
+                <a:spcPts val="0"/>
+              </a:spcBef>
+              <a:spcAft>
+                <a:spcPts val="0"/>
+              </a:spcAft>
+              <a:buSzPts val="1800"/>
+              <a:buChar char="■"/>
+              <a:defRPr sz="1800"/>
+            </a:lvl9pPr>
+          </a:lstStyle>
+          <a:p>
+            <a:endParaRPr/>
+          </a:p>
+        </p:txBody>
+      </p:sp>
+    </p:spTree>
+    <p:extLst>
+      <p:ext uri="{BB962C8B-B14F-4D97-AF65-F5344CB8AC3E}">
+        <p14:creationId xmlns:p14="http://schemas.microsoft.com/office/powerpoint/2010/main" val="1147282297"/>
       </p:ext>
     </p:extLst>
   </p:cSld>
@@ -3165,7 +3806,7 @@
           <a:p>
             <a:fld id="{5B07E745-2C70-2943-8487-A8F6E88ADF5E}" type="datetimeFigureOut">
               <a:rPr lang="en-US" smtClean="0"/>
-              <a:t>3/1/22</a:t>
+              <a:t>3/13/2022</a:t>
             </a:fld>
             <a:endParaRPr lang="en-US"/>
           </a:p>
@@ -3410,7 +4051,7 @@
           <a:p>
             <a:fld id="{5B07E745-2C70-2943-8487-A8F6E88ADF5E}" type="datetimeFigureOut">
               <a:rPr lang="en-US" smtClean="0"/>
-              <a:t>3/1/22</a:t>
+              <a:t>3/13/2022</a:t>
             </a:fld>
             <a:endParaRPr lang="en-US"/>
           </a:p>
@@ -3695,7 +4336,7 @@
           <a:p>
             <a:fld id="{5B07E745-2C70-2943-8487-A8F6E88ADF5E}" type="datetimeFigureOut">
               <a:rPr lang="en-US" smtClean="0"/>
-              <a:t>3/1/22</a:t>
+              <a:t>3/13/2022</a:t>
             </a:fld>
             <a:endParaRPr lang="en-US"/>
           </a:p>
@@ -4114,7 +4755,7 @@
           <a:p>
             <a:fld id="{5B07E745-2C70-2943-8487-A8F6E88ADF5E}" type="datetimeFigureOut">
               <a:rPr lang="en-US" smtClean="0"/>
-              <a:t>3/1/22</a:t>
+              <a:t>3/13/2022</a:t>
             </a:fld>
             <a:endParaRPr lang="en-US"/>
           </a:p>
@@ -4231,7 +4872,7 @@
           <a:p>
             <a:fld id="{5B07E745-2C70-2943-8487-A8F6E88ADF5E}" type="datetimeFigureOut">
               <a:rPr lang="en-US" smtClean="0"/>
-              <a:t>3/1/22</a:t>
+              <a:t>3/13/2022</a:t>
             </a:fld>
             <a:endParaRPr lang="en-US"/>
           </a:p>
@@ -4326,7 +4967,7 @@
           <a:p>
             <a:fld id="{5B07E745-2C70-2943-8487-A8F6E88ADF5E}" type="datetimeFigureOut">
               <a:rPr lang="en-US" smtClean="0"/>
-              <a:t>3/1/22</a:t>
+              <a:t>3/13/2022</a:t>
             </a:fld>
             <a:endParaRPr lang="en-US"/>
           </a:p>
@@ -4601,7 +5242,7 @@
           <a:p>
             <a:fld id="{5B07E745-2C70-2943-8487-A8F6E88ADF5E}" type="datetimeFigureOut">
               <a:rPr lang="en-US" smtClean="0"/>
-              <a:t>3/1/22</a:t>
+              <a:t>3/13/2022</a:t>
             </a:fld>
             <a:endParaRPr lang="en-US"/>
           </a:p>
@@ -4853,7 +5494,7 @@
           <a:p>
             <a:fld id="{5B07E745-2C70-2943-8487-A8F6E88ADF5E}" type="datetimeFigureOut">
               <a:rPr lang="en-US" smtClean="0"/>
-              <a:t>3/1/22</a:t>
+              <a:t>3/13/2022</a:t>
             </a:fld>
             <a:endParaRPr lang="en-US"/>
           </a:p>
@@ -5064,7 +5705,7 @@
           <a:p>
             <a:fld id="{5B07E745-2C70-2943-8487-A8F6E88ADF5E}" type="datetimeFigureOut">
               <a:rPr lang="en-US" smtClean="0"/>
-              <a:t>3/1/22</a:t>
+              <a:t>3/13/2022</a:t>
             </a:fld>
             <a:endParaRPr lang="en-US"/>
           </a:p>
@@ -5168,6 +5809,7 @@
     <p:sldLayoutId id="2147483657" r:id="rId9"/>
     <p:sldLayoutId id="2147483658" r:id="rId10"/>
     <p:sldLayoutId id="2147483659" r:id="rId11"/>
+    <p:sldLayoutId id="2147483660" r:id="rId12"/>
   </p:sldLayoutIdLst>
   <p:txStyles>
     <p:titleStyle>
@@ -6103,7 +6745,7 @@
             <a:effectLst/>
             <a:extLst>
               <a:ext uri="{C572A759-6A51-4108-AA02-DFA0A04FC94B}">
-                <ma14:wrappingTextBoxFlag xmlns="" xmlns:ma14="http://schemas.microsoft.com/office/mac/drawingml/2011/main" val="1"/>
+                <ma14:wrappingTextBoxFlag xmlns:ma14="http://schemas.microsoft.com/office/mac/drawingml/2011/main" xmlns="" val="1"/>
               </a:ext>
             </a:extLst>
           </p:spPr>
@@ -6271,6 +6913,1285 @@
   <p:cSld>
     <p:spTree>
       <p:nvGrpSpPr>
+        <p:cNvPr id="1" name="Shape 111"/>
+        <p:cNvGrpSpPr/>
+        <p:nvPr/>
+      </p:nvGrpSpPr>
+      <p:grpSpPr>
+        <a:xfrm>
+          <a:off x="0" y="0"/>
+          <a:ext cx="0" cy="0"/>
+          <a:chOff x="0" y="0"/>
+          <a:chExt cx="0" cy="0"/>
+        </a:xfrm>
+      </p:grpSpPr>
+      <p:sp>
+        <p:nvSpPr>
+          <p:cNvPr id="112" name="Google Shape;112;p25"/>
+          <p:cNvSpPr txBox="1">
+            <a:spLocks noGrp="1"/>
+          </p:cNvSpPr>
+          <p:nvPr>
+            <p:ph type="title"/>
+          </p:nvPr>
+        </p:nvSpPr>
+        <p:spPr>
+          <a:xfrm>
+            <a:off x="249550" y="919625"/>
+            <a:ext cx="8636100" cy="817200"/>
+          </a:xfrm>
+          <a:prstGeom prst="rect">
+            <a:avLst/>
+          </a:prstGeom>
+        </p:spPr>
+        <p:txBody>
+          <a:bodyPr spcFirstLastPara="1" vert="horz" wrap="square" lIns="91425" tIns="91425" rIns="91425" bIns="91425" rtlCol="0" anchor="b" anchorCtr="0">
+            <a:noAutofit/>
+          </a:bodyPr>
+          <a:lstStyle/>
+          <a:p>
+            <a:r>
+              <a:rPr lang="en" sz="2400">
+                <a:solidFill>
+                  <a:srgbClr val="840629"/>
+                </a:solidFill>
+              </a:rPr>
+              <a:t>The Debugger Up Close</a:t>
+            </a:r>
+            <a:endParaRPr sz="2400">
+              <a:solidFill>
+                <a:srgbClr val="840629"/>
+              </a:solidFill>
+            </a:endParaRPr>
+          </a:p>
+        </p:txBody>
+      </p:sp>
+      <p:pic>
+        <p:nvPicPr>
+          <p:cNvPr id="113" name="Google Shape;113;p25"/>
+          <p:cNvPicPr preferRelativeResize="0"/>
+          <p:nvPr/>
+        </p:nvPicPr>
+        <p:blipFill>
+          <a:blip r:embed="rId3">
+            <a:alphaModFix/>
+          </a:blip>
+          <a:stretch>
+            <a:fillRect/>
+          </a:stretch>
+        </p:blipFill>
+        <p:spPr>
+          <a:xfrm>
+            <a:off x="165250" y="1842950"/>
+            <a:ext cx="3788100" cy="1974400"/>
+          </a:xfrm>
+          <a:prstGeom prst="rect">
+            <a:avLst/>
+          </a:prstGeom>
+          <a:noFill/>
+          <a:ln w="19050" cap="flat" cmpd="sng">
+            <a:solidFill>
+              <a:schemeClr val="dk2"/>
+            </a:solidFill>
+            <a:prstDash val="solid"/>
+            <a:round/>
+            <a:headEnd type="none" w="sm" len="sm"/>
+            <a:tailEnd type="none" w="sm" len="sm"/>
+          </a:ln>
+        </p:spPr>
+      </p:pic>
+      <p:pic>
+        <p:nvPicPr>
+          <p:cNvPr id="114" name="Google Shape;114;p25"/>
+          <p:cNvPicPr preferRelativeResize="0"/>
+          <p:nvPr/>
+        </p:nvPicPr>
+        <p:blipFill>
+          <a:blip r:embed="rId4">
+            <a:alphaModFix/>
+          </a:blip>
+          <a:stretch>
+            <a:fillRect/>
+          </a:stretch>
+        </p:blipFill>
+        <p:spPr>
+          <a:xfrm>
+            <a:off x="165250" y="3923469"/>
+            <a:ext cx="3788100" cy="1719807"/>
+          </a:xfrm>
+          <a:prstGeom prst="rect">
+            <a:avLst/>
+          </a:prstGeom>
+          <a:noFill/>
+          <a:ln w="19050" cap="flat" cmpd="sng">
+            <a:solidFill>
+              <a:schemeClr val="dk2"/>
+            </a:solidFill>
+            <a:prstDash val="solid"/>
+            <a:round/>
+            <a:headEnd type="none" w="sm" len="sm"/>
+            <a:tailEnd type="none" w="sm" len="sm"/>
+          </a:ln>
+        </p:spPr>
+      </p:pic>
+      <p:pic>
+        <p:nvPicPr>
+          <p:cNvPr id="115" name="Google Shape;115;p25"/>
+          <p:cNvPicPr preferRelativeResize="0"/>
+          <p:nvPr/>
+        </p:nvPicPr>
+        <p:blipFill>
+          <a:blip r:embed="rId5">
+            <a:alphaModFix/>
+          </a:blip>
+          <a:stretch>
+            <a:fillRect/>
+          </a:stretch>
+        </p:blipFill>
+        <p:spPr>
+          <a:xfrm>
+            <a:off x="4234325" y="1842951"/>
+            <a:ext cx="4548200" cy="921925"/>
+          </a:xfrm>
+          <a:prstGeom prst="rect">
+            <a:avLst/>
+          </a:prstGeom>
+          <a:noFill/>
+          <a:ln>
+            <a:noFill/>
+          </a:ln>
+        </p:spPr>
+      </p:pic>
+      <p:cxnSp>
+        <p:nvCxnSpPr>
+          <p:cNvPr id="116" name="Google Shape;116;p25"/>
+          <p:cNvCxnSpPr/>
+          <p:nvPr/>
+        </p:nvCxnSpPr>
+        <p:spPr>
+          <a:xfrm rot="10800000" flipH="1">
+            <a:off x="6763700" y="2644725"/>
+            <a:ext cx="1028700" cy="1182900"/>
+          </a:xfrm>
+          <a:prstGeom prst="straightConnector1">
+            <a:avLst/>
+          </a:prstGeom>
+          <a:noFill/>
+          <a:ln w="76200" cap="flat" cmpd="sng">
+            <a:solidFill>
+              <a:schemeClr val="dk2"/>
+            </a:solidFill>
+            <a:prstDash val="solid"/>
+            <a:round/>
+            <a:headEnd type="none" w="med" len="med"/>
+            <a:tailEnd type="triangle" w="med" len="med"/>
+          </a:ln>
+        </p:spPr>
+      </p:cxnSp>
+      <p:cxnSp>
+        <p:nvCxnSpPr>
+          <p:cNvPr id="117" name="Google Shape;117;p25"/>
+          <p:cNvCxnSpPr/>
+          <p:nvPr/>
+        </p:nvCxnSpPr>
+        <p:spPr>
+          <a:xfrm rot="10800000">
+            <a:off x="8461025" y="2644650"/>
+            <a:ext cx="12900" cy="2044500"/>
+          </a:xfrm>
+          <a:prstGeom prst="straightConnector1">
+            <a:avLst/>
+          </a:prstGeom>
+          <a:noFill/>
+          <a:ln w="76200" cap="flat" cmpd="sng">
+            <a:solidFill>
+              <a:schemeClr val="dk2"/>
+            </a:solidFill>
+            <a:prstDash val="solid"/>
+            <a:round/>
+            <a:headEnd type="none" w="med" len="med"/>
+            <a:tailEnd type="triangle" w="med" len="med"/>
+          </a:ln>
+        </p:spPr>
+      </p:cxnSp>
+      <p:sp>
+        <p:nvSpPr>
+          <p:cNvPr id="118" name="Google Shape;118;p25"/>
+          <p:cNvSpPr txBox="1"/>
+          <p:nvPr/>
+        </p:nvSpPr>
+        <p:spPr>
+          <a:xfrm>
+            <a:off x="5452100" y="3763325"/>
+            <a:ext cx="1684500" cy="398700"/>
+          </a:xfrm>
+          <a:prstGeom prst="rect">
+            <a:avLst/>
+          </a:prstGeom>
+          <a:solidFill>
+            <a:srgbClr val="F9CB9C"/>
+          </a:solidFill>
+          <a:ln w="19050" cap="flat" cmpd="sng">
+            <a:solidFill>
+              <a:srgbClr val="000000"/>
+            </a:solidFill>
+            <a:prstDash val="solid"/>
+            <a:round/>
+            <a:headEnd type="none" w="sm" len="sm"/>
+            <a:tailEnd type="none" w="sm" len="sm"/>
+          </a:ln>
+        </p:spPr>
+        <p:txBody>
+          <a:bodyPr spcFirstLastPara="1" wrap="square" lIns="91425" tIns="91425" rIns="91425" bIns="91425" anchor="t" anchorCtr="0">
+            <a:noAutofit/>
+          </a:bodyPr>
+          <a:lstStyle/>
+          <a:p>
+            <a:pPr>
+              <a:spcBef>
+                <a:spcPts val="0"/>
+              </a:spcBef>
+              <a:spcAft>
+                <a:spcPts val="0"/>
+              </a:spcAft>
+            </a:pPr>
+            <a:r>
+              <a:rPr lang="en"/>
+              <a:t>Java Perspective</a:t>
+            </a:r>
+            <a:endParaRPr/>
+          </a:p>
+        </p:txBody>
+      </p:sp>
+      <p:sp>
+        <p:nvSpPr>
+          <p:cNvPr id="119" name="Google Shape;119;p25"/>
+          <p:cNvSpPr txBox="1"/>
+          <p:nvPr/>
+        </p:nvSpPr>
+        <p:spPr>
+          <a:xfrm>
+            <a:off x="7075500" y="4689150"/>
+            <a:ext cx="2068500" cy="398700"/>
+          </a:xfrm>
+          <a:prstGeom prst="rect">
+            <a:avLst/>
+          </a:prstGeom>
+          <a:solidFill>
+            <a:srgbClr val="F9CB9C"/>
+          </a:solidFill>
+          <a:ln w="19050" cap="flat" cmpd="sng">
+            <a:solidFill>
+              <a:srgbClr val="000000"/>
+            </a:solidFill>
+            <a:prstDash val="solid"/>
+            <a:round/>
+            <a:headEnd type="none" w="sm" len="sm"/>
+            <a:tailEnd type="none" w="sm" len="sm"/>
+          </a:ln>
+        </p:spPr>
+        <p:txBody>
+          <a:bodyPr spcFirstLastPara="1" wrap="square" lIns="91425" tIns="91425" rIns="91425" bIns="91425" anchor="t" anchorCtr="0">
+            <a:noAutofit/>
+          </a:bodyPr>
+          <a:lstStyle/>
+          <a:p>
+            <a:pPr>
+              <a:spcBef>
+                <a:spcPts val="0"/>
+              </a:spcBef>
+              <a:spcAft>
+                <a:spcPts val="0"/>
+              </a:spcAft>
+            </a:pPr>
+            <a:r>
+              <a:rPr lang="en"/>
+              <a:t>Debugging Perspective</a:t>
+            </a:r>
+            <a:endParaRPr/>
+          </a:p>
+        </p:txBody>
+      </p:sp>
+    </p:spTree>
+  </p:cSld>
+  <p:clrMapOvr>
+    <a:masterClrMapping/>
+  </p:clrMapOvr>
+</p:sld>
+</file>
+
+<file path=ppt/slides/slide15.xml><?xml version="1.0" encoding="utf-8"?>
+<p:sld xmlns:a="http://schemas.openxmlformats.org/drawingml/2006/main" xmlns:r="http://schemas.openxmlformats.org/officeDocument/2006/relationships" xmlns:p="http://schemas.openxmlformats.org/presentationml/2006/main">
+  <p:cSld>
+    <p:spTree>
+      <p:nvGrpSpPr>
+        <p:cNvPr id="1" name="Shape 123"/>
+        <p:cNvGrpSpPr/>
+        <p:nvPr/>
+      </p:nvGrpSpPr>
+      <p:grpSpPr>
+        <a:xfrm>
+          <a:off x="0" y="0"/>
+          <a:ext cx="0" cy="0"/>
+          <a:chOff x="0" y="0"/>
+          <a:chExt cx="0" cy="0"/>
+        </a:xfrm>
+      </p:grpSpPr>
+      <p:pic>
+        <p:nvPicPr>
+          <p:cNvPr id="124" name="Google Shape;124;p26"/>
+          <p:cNvPicPr preferRelativeResize="0"/>
+          <p:nvPr/>
+        </p:nvPicPr>
+        <p:blipFill>
+          <a:blip r:embed="rId3">
+            <a:alphaModFix/>
+          </a:blip>
+          <a:stretch>
+            <a:fillRect/>
+          </a:stretch>
+        </p:blipFill>
+        <p:spPr>
+          <a:xfrm>
+            <a:off x="5501650" y="1873100"/>
+            <a:ext cx="3088000" cy="1478750"/>
+          </a:xfrm>
+          <a:prstGeom prst="rect">
+            <a:avLst/>
+          </a:prstGeom>
+          <a:noFill/>
+          <a:ln>
+            <a:noFill/>
+          </a:ln>
+        </p:spPr>
+      </p:pic>
+      <p:cxnSp>
+        <p:nvCxnSpPr>
+          <p:cNvPr id="125" name="Google Shape;125;p26"/>
+          <p:cNvCxnSpPr>
+            <a:stCxn id="126" idx="0"/>
+          </p:cNvCxnSpPr>
+          <p:nvPr/>
+        </p:nvCxnSpPr>
+        <p:spPr>
+          <a:xfrm rot="10800000">
+            <a:off x="6082100" y="2670450"/>
+            <a:ext cx="1337400" cy="1526400"/>
+          </a:xfrm>
+          <a:prstGeom prst="straightConnector1">
+            <a:avLst/>
+          </a:prstGeom>
+          <a:noFill/>
+          <a:ln w="76200" cap="flat" cmpd="sng">
+            <a:solidFill>
+              <a:schemeClr val="dk2"/>
+            </a:solidFill>
+            <a:prstDash val="solid"/>
+            <a:round/>
+            <a:headEnd type="none" w="med" len="med"/>
+            <a:tailEnd type="triangle" w="med" len="med"/>
+          </a:ln>
+        </p:spPr>
+      </p:cxnSp>
+      <p:sp>
+        <p:nvSpPr>
+          <p:cNvPr id="126" name="Google Shape;126;p26"/>
+          <p:cNvSpPr txBox="1"/>
+          <p:nvPr/>
+        </p:nvSpPr>
+        <p:spPr>
+          <a:xfrm>
+            <a:off x="6249350" y="4196850"/>
+            <a:ext cx="2340300" cy="733200"/>
+          </a:xfrm>
+          <a:prstGeom prst="rect">
+            <a:avLst/>
+          </a:prstGeom>
+          <a:solidFill>
+            <a:srgbClr val="F9CB9C"/>
+          </a:solidFill>
+          <a:ln w="19050" cap="flat" cmpd="sng">
+            <a:solidFill>
+              <a:srgbClr val="000000"/>
+            </a:solidFill>
+            <a:prstDash val="solid"/>
+            <a:round/>
+            <a:headEnd type="none" w="sm" len="sm"/>
+            <a:tailEnd type="none" w="sm" len="sm"/>
+          </a:ln>
+        </p:spPr>
+        <p:txBody>
+          <a:bodyPr spcFirstLastPara="1" wrap="square" lIns="91425" tIns="91425" rIns="91425" bIns="91425" anchor="t" anchorCtr="0">
+            <a:noAutofit/>
+          </a:bodyPr>
+          <a:lstStyle/>
+          <a:p>
+            <a:pPr>
+              <a:spcBef>
+                <a:spcPts val="0"/>
+              </a:spcBef>
+              <a:spcAft>
+                <a:spcPts val="0"/>
+              </a:spcAft>
+            </a:pPr>
+            <a:r>
+              <a:rPr lang="en" sz="1600"/>
+              <a:t>Indicates that the program is still running</a:t>
+            </a:r>
+            <a:endParaRPr sz="1600"/>
+          </a:p>
+        </p:txBody>
+      </p:sp>
+      <p:sp>
+        <p:nvSpPr>
+          <p:cNvPr id="127" name="Google Shape;127;p26"/>
+          <p:cNvSpPr txBox="1"/>
+          <p:nvPr/>
+        </p:nvSpPr>
+        <p:spPr>
+          <a:xfrm>
+            <a:off x="320725" y="3756000"/>
+            <a:ext cx="2803200" cy="1614900"/>
+          </a:xfrm>
+          <a:prstGeom prst="rect">
+            <a:avLst/>
+          </a:prstGeom>
+          <a:solidFill>
+            <a:srgbClr val="F9CB9C"/>
+          </a:solidFill>
+          <a:ln w="19050" cap="flat" cmpd="sng">
+            <a:solidFill>
+              <a:srgbClr val="000000"/>
+            </a:solidFill>
+            <a:prstDash val="solid"/>
+            <a:round/>
+            <a:headEnd type="none" w="sm" len="sm"/>
+            <a:tailEnd type="none" w="sm" len="sm"/>
+          </a:ln>
+        </p:spPr>
+        <p:txBody>
+          <a:bodyPr spcFirstLastPara="1" wrap="square" lIns="91425" tIns="91425" rIns="91425" bIns="91425" anchor="t" anchorCtr="0">
+            <a:noAutofit/>
+          </a:bodyPr>
+          <a:lstStyle/>
+          <a:p>
+            <a:pPr>
+              <a:spcBef>
+                <a:spcPts val="0"/>
+              </a:spcBef>
+              <a:spcAft>
+                <a:spcPts val="0"/>
+              </a:spcAft>
+            </a:pPr>
+            <a:r>
+              <a:rPr lang="en" sz="1600"/>
+              <a:t>Even after you click the red STOP SQUARE, if you ran it multiple times before, you have to repeatedly clear it (or restart Eclipse)</a:t>
+            </a:r>
+            <a:endParaRPr sz="1600"/>
+          </a:p>
+        </p:txBody>
+      </p:sp>
+      <p:pic>
+        <p:nvPicPr>
+          <p:cNvPr id="128" name="Google Shape;128;p26"/>
+          <p:cNvPicPr preferRelativeResize="0"/>
+          <p:nvPr/>
+        </p:nvPicPr>
+        <p:blipFill>
+          <a:blip r:embed="rId4">
+            <a:alphaModFix/>
+          </a:blip>
+          <a:stretch>
+            <a:fillRect/>
+          </a:stretch>
+        </p:blipFill>
+        <p:spPr>
+          <a:xfrm>
+            <a:off x="435301" y="1975950"/>
+            <a:ext cx="3988125" cy="898500"/>
+          </a:xfrm>
+          <a:prstGeom prst="rect">
+            <a:avLst/>
+          </a:prstGeom>
+          <a:noFill/>
+          <a:ln>
+            <a:noFill/>
+          </a:ln>
+        </p:spPr>
+      </p:pic>
+      <p:pic>
+        <p:nvPicPr>
+          <p:cNvPr id="129" name="Google Shape;129;p26"/>
+          <p:cNvPicPr preferRelativeResize="0"/>
+          <p:nvPr/>
+        </p:nvPicPr>
+        <p:blipFill>
+          <a:blip r:embed="rId5">
+            <a:alphaModFix/>
+          </a:blip>
+          <a:stretch>
+            <a:fillRect/>
+          </a:stretch>
+        </p:blipFill>
+        <p:spPr>
+          <a:xfrm>
+            <a:off x="3905588" y="4196850"/>
+            <a:ext cx="1562100" cy="1524000"/>
+          </a:xfrm>
+          <a:prstGeom prst="rect">
+            <a:avLst/>
+          </a:prstGeom>
+          <a:noFill/>
+          <a:ln w="19050" cap="flat" cmpd="sng">
+            <a:solidFill>
+              <a:schemeClr val="dk2"/>
+            </a:solidFill>
+            <a:prstDash val="solid"/>
+            <a:round/>
+            <a:headEnd type="none" w="sm" len="sm"/>
+            <a:tailEnd type="none" w="sm" len="sm"/>
+          </a:ln>
+        </p:spPr>
+      </p:pic>
+      <p:cxnSp>
+        <p:nvCxnSpPr>
+          <p:cNvPr id="130" name="Google Shape;130;p26"/>
+          <p:cNvCxnSpPr/>
+          <p:nvPr/>
+        </p:nvCxnSpPr>
+        <p:spPr>
+          <a:xfrm rot="10800000" flipH="1">
+            <a:off x="1183000" y="2580125"/>
+            <a:ext cx="38700" cy="1183200"/>
+          </a:xfrm>
+          <a:prstGeom prst="straightConnector1">
+            <a:avLst/>
+          </a:prstGeom>
+          <a:noFill/>
+          <a:ln w="76200" cap="flat" cmpd="sng">
+            <a:solidFill>
+              <a:schemeClr val="dk2"/>
+            </a:solidFill>
+            <a:prstDash val="solid"/>
+            <a:round/>
+            <a:headEnd type="none" w="med" len="med"/>
+            <a:tailEnd type="triangle" w="med" len="med"/>
+          </a:ln>
+        </p:spPr>
+      </p:cxnSp>
+      <p:cxnSp>
+        <p:nvCxnSpPr>
+          <p:cNvPr id="131" name="Google Shape;131;p26"/>
+          <p:cNvCxnSpPr>
+            <a:endCxn id="129" idx="1"/>
+          </p:cNvCxnSpPr>
+          <p:nvPr/>
+        </p:nvCxnSpPr>
+        <p:spPr>
+          <a:xfrm>
+            <a:off x="2918888" y="4804950"/>
+            <a:ext cx="986700" cy="153900"/>
+          </a:xfrm>
+          <a:prstGeom prst="straightConnector1">
+            <a:avLst/>
+          </a:prstGeom>
+          <a:noFill/>
+          <a:ln w="76200" cap="flat" cmpd="sng">
+            <a:solidFill>
+              <a:schemeClr val="dk2"/>
+            </a:solidFill>
+            <a:prstDash val="solid"/>
+            <a:round/>
+            <a:headEnd type="none" w="med" len="med"/>
+            <a:tailEnd type="triangle" w="med" len="med"/>
+          </a:ln>
+        </p:spPr>
+      </p:cxnSp>
+      <p:sp>
+        <p:nvSpPr>
+          <p:cNvPr id="132" name="Google Shape;132;p26"/>
+          <p:cNvSpPr txBox="1">
+            <a:spLocks noGrp="1"/>
+          </p:cNvSpPr>
+          <p:nvPr>
+            <p:ph type="title"/>
+          </p:nvPr>
+        </p:nvSpPr>
+        <p:spPr>
+          <a:xfrm>
+            <a:off x="141350" y="919625"/>
+            <a:ext cx="8928600" cy="817200"/>
+          </a:xfrm>
+          <a:prstGeom prst="rect">
+            <a:avLst/>
+          </a:prstGeom>
+        </p:spPr>
+        <p:txBody>
+          <a:bodyPr spcFirstLastPara="1" vert="horz" wrap="square" lIns="91425" tIns="91425" rIns="91425" bIns="91425" rtlCol="0" anchor="b" anchorCtr="0">
+            <a:noAutofit/>
+          </a:bodyPr>
+          <a:lstStyle/>
+          <a:p>
+            <a:r>
+              <a:rPr lang="en" sz="2400">
+                <a:solidFill>
+                  <a:srgbClr val="840629"/>
+                </a:solidFill>
+              </a:rPr>
+              <a:t>ALWAYS (1) </a:t>
+            </a:r>
+            <a:r>
+              <a:rPr lang="en" sz="2400" u="sng">
+                <a:solidFill>
+                  <a:srgbClr val="840629"/>
+                </a:solidFill>
+              </a:rPr>
+              <a:t>stop</a:t>
+            </a:r>
+            <a:r>
+              <a:rPr lang="en" sz="2400">
+                <a:solidFill>
+                  <a:srgbClr val="840629"/>
+                </a:solidFill>
+              </a:rPr>
+              <a:t> the debugger AND (2) </a:t>
+            </a:r>
+            <a:r>
+              <a:rPr lang="en" sz="2400" u="sng">
+                <a:solidFill>
+                  <a:srgbClr val="840629"/>
+                </a:solidFill>
+              </a:rPr>
+              <a:t>clear</a:t>
+            </a:r>
+            <a:r>
+              <a:rPr lang="en" sz="2400">
+                <a:solidFill>
+                  <a:srgbClr val="840629"/>
+                </a:solidFill>
+              </a:rPr>
+              <a:t> it when done!</a:t>
+            </a:r>
+            <a:endParaRPr sz="2400">
+              <a:solidFill>
+                <a:srgbClr val="840629"/>
+              </a:solidFill>
+            </a:endParaRPr>
+          </a:p>
+        </p:txBody>
+      </p:sp>
+    </p:spTree>
+  </p:cSld>
+  <p:clrMapOvr>
+    <a:masterClrMapping/>
+  </p:clrMapOvr>
+</p:sld>
+</file>
+
+<file path=ppt/slides/slide16.xml><?xml version="1.0" encoding="utf-8"?>
+<p:sld xmlns:a="http://schemas.openxmlformats.org/drawingml/2006/main" xmlns:r="http://schemas.openxmlformats.org/officeDocument/2006/relationships" xmlns:p="http://schemas.openxmlformats.org/presentationml/2006/main">
+  <p:cSld>
+    <p:spTree>
+      <p:nvGrpSpPr>
+        <p:cNvPr id="1" name="Shape 136"/>
+        <p:cNvGrpSpPr/>
+        <p:nvPr/>
+      </p:nvGrpSpPr>
+      <p:grpSpPr>
+        <a:xfrm>
+          <a:off x="0" y="0"/>
+          <a:ext cx="0" cy="0"/>
+          <a:chOff x="0" y="0"/>
+          <a:chExt cx="0" cy="0"/>
+        </a:xfrm>
+      </p:grpSpPr>
+      <p:sp>
+        <p:nvSpPr>
+          <p:cNvPr id="137" name="Google Shape;137;p27"/>
+          <p:cNvSpPr txBox="1"/>
+          <p:nvPr/>
+        </p:nvSpPr>
+        <p:spPr>
+          <a:xfrm>
+            <a:off x="4738400" y="3985575"/>
+            <a:ext cx="1158000" cy="778800"/>
+          </a:xfrm>
+          <a:prstGeom prst="rect">
+            <a:avLst/>
+          </a:prstGeom>
+          <a:solidFill>
+            <a:srgbClr val="F9CB9C"/>
+          </a:solidFill>
+          <a:ln w="19050" cap="flat" cmpd="sng">
+            <a:solidFill>
+              <a:srgbClr val="000000"/>
+            </a:solidFill>
+            <a:prstDash val="solid"/>
+            <a:round/>
+            <a:headEnd type="none" w="sm" len="sm"/>
+            <a:tailEnd type="none" w="sm" len="sm"/>
+          </a:ln>
+        </p:spPr>
+        <p:txBody>
+          <a:bodyPr spcFirstLastPara="1" wrap="square" lIns="91425" tIns="91425" rIns="91425" bIns="91425" anchor="t" anchorCtr="0">
+            <a:noAutofit/>
+          </a:bodyPr>
+          <a:lstStyle/>
+          <a:p>
+            <a:pPr>
+              <a:spcBef>
+                <a:spcPts val="0"/>
+              </a:spcBef>
+              <a:spcAft>
+                <a:spcPts val="0"/>
+              </a:spcAft>
+            </a:pPr>
+            <a:r>
+              <a:rPr lang="en" sz="1600"/>
+              <a:t>Step Into</a:t>
+            </a:r>
+            <a:endParaRPr sz="1600"/>
+          </a:p>
+          <a:p>
+            <a:pPr>
+              <a:spcBef>
+                <a:spcPts val="0"/>
+              </a:spcBef>
+              <a:spcAft>
+                <a:spcPts val="0"/>
+              </a:spcAft>
+            </a:pPr>
+            <a:r>
+              <a:rPr lang="en" sz="1600"/>
+              <a:t>method</a:t>
+            </a:r>
+            <a:endParaRPr sz="1600"/>
+          </a:p>
+        </p:txBody>
+      </p:sp>
+      <p:sp>
+        <p:nvSpPr>
+          <p:cNvPr id="138" name="Google Shape;138;p27"/>
+          <p:cNvSpPr txBox="1"/>
+          <p:nvPr/>
+        </p:nvSpPr>
+        <p:spPr>
+          <a:xfrm>
+            <a:off x="189650" y="4165575"/>
+            <a:ext cx="1384500" cy="1513800"/>
+          </a:xfrm>
+          <a:prstGeom prst="rect">
+            <a:avLst/>
+          </a:prstGeom>
+          <a:solidFill>
+            <a:srgbClr val="F9CB9C"/>
+          </a:solidFill>
+          <a:ln w="19050" cap="flat" cmpd="sng">
+            <a:solidFill>
+              <a:srgbClr val="000000"/>
+            </a:solidFill>
+            <a:prstDash val="solid"/>
+            <a:round/>
+            <a:headEnd type="none" w="sm" len="sm"/>
+            <a:tailEnd type="none" w="sm" len="sm"/>
+          </a:ln>
+        </p:spPr>
+        <p:txBody>
+          <a:bodyPr spcFirstLastPara="1" wrap="square" lIns="91425" tIns="91425" rIns="91425" bIns="91425" anchor="t" anchorCtr="0">
+            <a:noAutofit/>
+          </a:bodyPr>
+          <a:lstStyle/>
+          <a:p>
+            <a:pPr>
+              <a:spcBef>
+                <a:spcPts val="0"/>
+              </a:spcBef>
+              <a:spcAft>
+                <a:spcPts val="0"/>
+              </a:spcAft>
+            </a:pPr>
+            <a:r>
+              <a:rPr lang="en" sz="1600"/>
+              <a:t>Resume</a:t>
+            </a:r>
+            <a:endParaRPr sz="1600"/>
+          </a:p>
+          <a:p>
+            <a:pPr>
+              <a:spcBef>
+                <a:spcPts val="0"/>
+              </a:spcBef>
+              <a:spcAft>
+                <a:spcPts val="0"/>
+              </a:spcAft>
+            </a:pPr>
+            <a:r>
+              <a:rPr lang="en" sz="1600"/>
+              <a:t>(until next break point or complete)</a:t>
+            </a:r>
+            <a:endParaRPr sz="1600"/>
+          </a:p>
+        </p:txBody>
+      </p:sp>
+      <p:sp>
+        <p:nvSpPr>
+          <p:cNvPr id="139" name="Google Shape;139;p27"/>
+          <p:cNvSpPr txBox="1">
+            <a:spLocks noGrp="1"/>
+          </p:cNvSpPr>
+          <p:nvPr>
+            <p:ph type="title"/>
+          </p:nvPr>
+        </p:nvSpPr>
+        <p:spPr>
+          <a:xfrm>
+            <a:off x="141350" y="919625"/>
+            <a:ext cx="8928600" cy="817200"/>
+          </a:xfrm>
+          <a:prstGeom prst="rect">
+            <a:avLst/>
+          </a:prstGeom>
+        </p:spPr>
+        <p:txBody>
+          <a:bodyPr spcFirstLastPara="1" vert="horz" wrap="square" lIns="91425" tIns="91425" rIns="91425" bIns="91425" rtlCol="0" anchor="b" anchorCtr="0">
+            <a:noAutofit/>
+          </a:bodyPr>
+          <a:lstStyle/>
+          <a:p>
+            <a:r>
+              <a:rPr lang="en" sz="2400">
+                <a:solidFill>
+                  <a:srgbClr val="840629"/>
+                </a:solidFill>
+              </a:rPr>
+              <a:t>Debugger Controls Up Close</a:t>
+            </a:r>
+            <a:endParaRPr sz="2400">
+              <a:solidFill>
+                <a:srgbClr val="840629"/>
+              </a:solidFill>
+            </a:endParaRPr>
+          </a:p>
+        </p:txBody>
+      </p:sp>
+      <p:pic>
+        <p:nvPicPr>
+          <p:cNvPr id="140" name="Google Shape;140;p27"/>
+          <p:cNvPicPr preferRelativeResize="0"/>
+          <p:nvPr/>
+        </p:nvPicPr>
+        <p:blipFill>
+          <a:blip r:embed="rId3">
+            <a:alphaModFix/>
+          </a:blip>
+          <a:stretch>
+            <a:fillRect/>
+          </a:stretch>
+        </p:blipFill>
+        <p:spPr>
+          <a:xfrm>
+            <a:off x="1574064" y="1924439"/>
+            <a:ext cx="5436825" cy="995475"/>
+          </a:xfrm>
+          <a:prstGeom prst="rect">
+            <a:avLst/>
+          </a:prstGeom>
+          <a:noFill/>
+          <a:ln>
+            <a:noFill/>
+          </a:ln>
+        </p:spPr>
+      </p:pic>
+      <p:sp>
+        <p:nvSpPr>
+          <p:cNvPr id="141" name="Google Shape;141;p27"/>
+          <p:cNvSpPr txBox="1"/>
+          <p:nvPr/>
+        </p:nvSpPr>
+        <p:spPr>
+          <a:xfrm>
+            <a:off x="1709475" y="4165575"/>
+            <a:ext cx="1158000" cy="534600"/>
+          </a:xfrm>
+          <a:prstGeom prst="rect">
+            <a:avLst/>
+          </a:prstGeom>
+          <a:solidFill>
+            <a:srgbClr val="F9CB9C"/>
+          </a:solidFill>
+          <a:ln w="19050" cap="flat" cmpd="sng">
+            <a:solidFill>
+              <a:srgbClr val="000000"/>
+            </a:solidFill>
+            <a:prstDash val="solid"/>
+            <a:round/>
+            <a:headEnd type="none" w="sm" len="sm"/>
+            <a:tailEnd type="none" w="sm" len="sm"/>
+          </a:ln>
+        </p:spPr>
+        <p:txBody>
+          <a:bodyPr spcFirstLastPara="1" wrap="square" lIns="91425" tIns="91425" rIns="91425" bIns="91425" anchor="t" anchorCtr="0">
+            <a:noAutofit/>
+          </a:bodyPr>
+          <a:lstStyle/>
+          <a:p>
+            <a:pPr>
+              <a:spcBef>
+                <a:spcPts val="0"/>
+              </a:spcBef>
+              <a:spcAft>
+                <a:spcPts val="0"/>
+              </a:spcAft>
+            </a:pPr>
+            <a:r>
+              <a:rPr lang="en" sz="1600"/>
+              <a:t>Suspend</a:t>
+            </a:r>
+            <a:endParaRPr sz="1600"/>
+          </a:p>
+        </p:txBody>
+      </p:sp>
+      <p:sp>
+        <p:nvSpPr>
+          <p:cNvPr id="142" name="Google Shape;142;p27"/>
+          <p:cNvSpPr txBox="1"/>
+          <p:nvPr/>
+        </p:nvSpPr>
+        <p:spPr>
+          <a:xfrm>
+            <a:off x="3111100" y="4165575"/>
+            <a:ext cx="1158000" cy="534600"/>
+          </a:xfrm>
+          <a:prstGeom prst="rect">
+            <a:avLst/>
+          </a:prstGeom>
+          <a:solidFill>
+            <a:srgbClr val="F9CB9C"/>
+          </a:solidFill>
+          <a:ln w="19050" cap="flat" cmpd="sng">
+            <a:solidFill>
+              <a:srgbClr val="000000"/>
+            </a:solidFill>
+            <a:prstDash val="solid"/>
+            <a:round/>
+            <a:headEnd type="none" w="sm" len="sm"/>
+            <a:tailEnd type="none" w="sm" len="sm"/>
+          </a:ln>
+        </p:spPr>
+        <p:txBody>
+          <a:bodyPr spcFirstLastPara="1" wrap="square" lIns="91425" tIns="91425" rIns="91425" bIns="91425" anchor="t" anchorCtr="0">
+            <a:noAutofit/>
+          </a:bodyPr>
+          <a:lstStyle/>
+          <a:p>
+            <a:pPr>
+              <a:spcBef>
+                <a:spcPts val="0"/>
+              </a:spcBef>
+              <a:spcAft>
+                <a:spcPts val="0"/>
+              </a:spcAft>
+            </a:pPr>
+            <a:r>
+              <a:rPr lang="en" sz="1600"/>
+              <a:t>Terminate</a:t>
+            </a:r>
+            <a:endParaRPr sz="1600"/>
+          </a:p>
+        </p:txBody>
+      </p:sp>
+      <p:sp>
+        <p:nvSpPr>
+          <p:cNvPr id="143" name="Google Shape;143;p27"/>
+          <p:cNvSpPr txBox="1"/>
+          <p:nvPr/>
+        </p:nvSpPr>
+        <p:spPr>
+          <a:xfrm>
+            <a:off x="5996650" y="3985575"/>
+            <a:ext cx="1158000" cy="778800"/>
+          </a:xfrm>
+          <a:prstGeom prst="rect">
+            <a:avLst/>
+          </a:prstGeom>
+          <a:solidFill>
+            <a:srgbClr val="F9CB9C"/>
+          </a:solidFill>
+          <a:ln w="19050" cap="flat" cmpd="sng">
+            <a:solidFill>
+              <a:srgbClr val="000000"/>
+            </a:solidFill>
+            <a:prstDash val="solid"/>
+            <a:round/>
+            <a:headEnd type="none" w="sm" len="sm"/>
+            <a:tailEnd type="none" w="sm" len="sm"/>
+          </a:ln>
+        </p:spPr>
+        <p:txBody>
+          <a:bodyPr spcFirstLastPara="1" wrap="square" lIns="91425" tIns="91425" rIns="91425" bIns="91425" anchor="t" anchorCtr="0">
+            <a:noAutofit/>
+          </a:bodyPr>
+          <a:lstStyle/>
+          <a:p>
+            <a:pPr>
+              <a:spcBef>
+                <a:spcPts val="0"/>
+              </a:spcBef>
+              <a:spcAft>
+                <a:spcPts val="0"/>
+              </a:spcAft>
+            </a:pPr>
+            <a:r>
+              <a:rPr lang="en" sz="1600"/>
+              <a:t>Step Over</a:t>
+            </a:r>
+            <a:endParaRPr sz="1600"/>
+          </a:p>
+          <a:p>
+            <a:pPr>
+              <a:spcBef>
+                <a:spcPts val="0"/>
+              </a:spcBef>
+              <a:spcAft>
+                <a:spcPts val="0"/>
+              </a:spcAft>
+            </a:pPr>
+            <a:r>
+              <a:rPr lang="en" sz="1600"/>
+              <a:t>method</a:t>
+            </a:r>
+            <a:endParaRPr sz="1600"/>
+          </a:p>
+        </p:txBody>
+      </p:sp>
+      <p:sp>
+        <p:nvSpPr>
+          <p:cNvPr id="144" name="Google Shape;144;p27"/>
+          <p:cNvSpPr txBox="1"/>
+          <p:nvPr/>
+        </p:nvSpPr>
+        <p:spPr>
+          <a:xfrm>
+            <a:off x="7332350" y="4024275"/>
+            <a:ext cx="1347300" cy="870600"/>
+          </a:xfrm>
+          <a:prstGeom prst="rect">
+            <a:avLst/>
+          </a:prstGeom>
+          <a:solidFill>
+            <a:srgbClr val="F9CB9C"/>
+          </a:solidFill>
+          <a:ln w="19050" cap="flat" cmpd="sng">
+            <a:solidFill>
+              <a:srgbClr val="000000"/>
+            </a:solidFill>
+            <a:prstDash val="solid"/>
+            <a:round/>
+            <a:headEnd type="none" w="sm" len="sm"/>
+            <a:tailEnd type="none" w="sm" len="sm"/>
+          </a:ln>
+        </p:spPr>
+        <p:txBody>
+          <a:bodyPr spcFirstLastPara="1" wrap="square" lIns="91425" tIns="91425" rIns="91425" bIns="91425" anchor="t" anchorCtr="0">
+            <a:noAutofit/>
+          </a:bodyPr>
+          <a:lstStyle/>
+          <a:p>
+            <a:pPr>
+              <a:spcBef>
+                <a:spcPts val="0"/>
+              </a:spcBef>
+              <a:spcAft>
+                <a:spcPts val="0"/>
+              </a:spcAft>
+            </a:pPr>
+            <a:r>
+              <a:rPr lang="en" sz="1600"/>
+              <a:t>Step Return (Out)</a:t>
+            </a:r>
+            <a:endParaRPr sz="1600"/>
+          </a:p>
+        </p:txBody>
+      </p:sp>
+      <p:cxnSp>
+        <p:nvCxnSpPr>
+          <p:cNvPr id="145" name="Google Shape;145;p27"/>
+          <p:cNvCxnSpPr/>
+          <p:nvPr/>
+        </p:nvCxnSpPr>
+        <p:spPr>
+          <a:xfrm rot="10800000" flipH="1">
+            <a:off x="835875" y="2850375"/>
+            <a:ext cx="1080000" cy="1315200"/>
+          </a:xfrm>
+          <a:prstGeom prst="straightConnector1">
+            <a:avLst/>
+          </a:prstGeom>
+          <a:noFill/>
+          <a:ln w="76200" cap="flat" cmpd="sng">
+            <a:solidFill>
+              <a:schemeClr val="dk2"/>
+            </a:solidFill>
+            <a:prstDash val="solid"/>
+            <a:round/>
+            <a:headEnd type="none" w="med" len="med"/>
+            <a:tailEnd type="triangle" w="med" len="med"/>
+          </a:ln>
+        </p:spPr>
+      </p:cxnSp>
+      <p:cxnSp>
+        <p:nvCxnSpPr>
+          <p:cNvPr id="146" name="Google Shape;146;p27"/>
+          <p:cNvCxnSpPr>
+            <a:stCxn id="142" idx="0"/>
+          </p:cNvCxnSpPr>
+          <p:nvPr/>
+        </p:nvCxnSpPr>
+        <p:spPr>
+          <a:xfrm rot="10800000">
+            <a:off x="3639100" y="2721675"/>
+            <a:ext cx="51000" cy="1443900"/>
+          </a:xfrm>
+          <a:prstGeom prst="straightConnector1">
+            <a:avLst/>
+          </a:prstGeom>
+          <a:noFill/>
+          <a:ln w="76200" cap="flat" cmpd="sng">
+            <a:solidFill>
+              <a:schemeClr val="dk2"/>
+            </a:solidFill>
+            <a:prstDash val="solid"/>
+            <a:round/>
+            <a:headEnd type="none" w="med" len="med"/>
+            <a:tailEnd type="triangle" w="med" len="med"/>
+          </a:ln>
+        </p:spPr>
+      </p:cxnSp>
+      <p:cxnSp>
+        <p:nvCxnSpPr>
+          <p:cNvPr id="147" name="Google Shape;147;p27"/>
+          <p:cNvCxnSpPr>
+            <a:stCxn id="141" idx="0"/>
+          </p:cNvCxnSpPr>
+          <p:nvPr/>
+        </p:nvCxnSpPr>
+        <p:spPr>
+          <a:xfrm rot="10800000" flipH="1">
+            <a:off x="2288475" y="2824575"/>
+            <a:ext cx="579000" cy="1341000"/>
+          </a:xfrm>
+          <a:prstGeom prst="straightConnector1">
+            <a:avLst/>
+          </a:prstGeom>
+          <a:noFill/>
+          <a:ln w="76200" cap="flat" cmpd="sng">
+            <a:solidFill>
+              <a:schemeClr val="dk2"/>
+            </a:solidFill>
+            <a:prstDash val="solid"/>
+            <a:round/>
+            <a:headEnd type="none" w="med" len="med"/>
+            <a:tailEnd type="triangle" w="med" len="med"/>
+          </a:ln>
+        </p:spPr>
+      </p:cxnSp>
+      <p:cxnSp>
+        <p:nvCxnSpPr>
+          <p:cNvPr id="148" name="Google Shape;148;p27"/>
+          <p:cNvCxnSpPr>
+            <a:stCxn id="137" idx="0"/>
+          </p:cNvCxnSpPr>
+          <p:nvPr/>
+        </p:nvCxnSpPr>
+        <p:spPr>
+          <a:xfrm rot="10800000">
+            <a:off x="5027900" y="2811675"/>
+            <a:ext cx="289500" cy="1173900"/>
+          </a:xfrm>
+          <a:prstGeom prst="straightConnector1">
+            <a:avLst/>
+          </a:prstGeom>
+          <a:noFill/>
+          <a:ln w="76200" cap="flat" cmpd="sng">
+            <a:solidFill>
+              <a:schemeClr val="dk2"/>
+            </a:solidFill>
+            <a:prstDash val="solid"/>
+            <a:round/>
+            <a:headEnd type="none" w="med" len="med"/>
+            <a:tailEnd type="triangle" w="med" len="med"/>
+          </a:ln>
+        </p:spPr>
+      </p:cxnSp>
+      <p:cxnSp>
+        <p:nvCxnSpPr>
+          <p:cNvPr id="149" name="Google Shape;149;p27"/>
+          <p:cNvCxnSpPr>
+            <a:stCxn id="143" idx="0"/>
+          </p:cNvCxnSpPr>
+          <p:nvPr/>
+        </p:nvCxnSpPr>
+        <p:spPr>
+          <a:xfrm rot="10800000">
+            <a:off x="5767450" y="2666175"/>
+            <a:ext cx="808200" cy="1319400"/>
+          </a:xfrm>
+          <a:prstGeom prst="straightConnector1">
+            <a:avLst/>
+          </a:prstGeom>
+          <a:noFill/>
+          <a:ln w="76200" cap="flat" cmpd="sng">
+            <a:solidFill>
+              <a:schemeClr val="dk2"/>
+            </a:solidFill>
+            <a:prstDash val="solid"/>
+            <a:round/>
+            <a:headEnd type="none" w="med" len="med"/>
+            <a:tailEnd type="triangle" w="med" len="med"/>
+          </a:ln>
+        </p:spPr>
+      </p:cxnSp>
+      <p:cxnSp>
+        <p:nvCxnSpPr>
+          <p:cNvPr id="150" name="Google Shape;150;p27"/>
+          <p:cNvCxnSpPr>
+            <a:stCxn id="144" idx="0"/>
+          </p:cNvCxnSpPr>
+          <p:nvPr/>
+        </p:nvCxnSpPr>
+        <p:spPr>
+          <a:xfrm rot="10800000">
+            <a:off x="6621500" y="2740575"/>
+            <a:ext cx="1384500" cy="1283700"/>
+          </a:xfrm>
+          <a:prstGeom prst="straightConnector1">
+            <a:avLst/>
+          </a:prstGeom>
+          <a:noFill/>
+          <a:ln w="76200" cap="flat" cmpd="sng">
+            <a:solidFill>
+              <a:schemeClr val="dk2"/>
+            </a:solidFill>
+            <a:prstDash val="solid"/>
+            <a:round/>
+            <a:headEnd type="none" w="med" len="med"/>
+            <a:tailEnd type="triangle" w="med" len="med"/>
+          </a:ln>
+        </p:spPr>
+      </p:cxnSp>
+    </p:spTree>
+  </p:cSld>
+  <p:clrMapOvr>
+    <a:masterClrMapping/>
+  </p:clrMapOvr>
+</p:sld>
+</file>
+
+<file path=ppt/slides/slide17.xml><?xml version="1.0" encoding="utf-8"?>
+<p:sld xmlns:a="http://schemas.openxmlformats.org/drawingml/2006/main" xmlns:r="http://schemas.openxmlformats.org/officeDocument/2006/relationships" xmlns:p="http://schemas.openxmlformats.org/presentationml/2006/main">
+  <p:cSld>
+    <p:spTree>
+      <p:nvGrpSpPr>
         <p:cNvPr id="1" name=""/>
         <p:cNvGrpSpPr/>
         <p:nvPr/>
@@ -6397,7 +8318,7 @@
 </p:sld>
 </file>
 
-<file path=ppt/slides/slide15.xml><?xml version="1.0" encoding="utf-8"?>
+<file path=ppt/slides/slide18.xml><?xml version="1.0" encoding="utf-8"?>
 <p:sld xmlns:a="http://schemas.openxmlformats.org/drawingml/2006/main" xmlns:r="http://schemas.openxmlformats.org/officeDocument/2006/relationships" xmlns:p="http://schemas.openxmlformats.org/presentationml/2006/main">
   <p:cSld>
     <p:spTree>
@@ -6526,7 +8447,7 @@
 </p:sld>
 </file>
 
-<file path=ppt/slides/slide16.xml><?xml version="1.0" encoding="utf-8"?>
+<file path=ppt/slides/slide19.xml><?xml version="1.0" encoding="utf-8"?>
 <p:sld xmlns:a="http://schemas.openxmlformats.org/drawingml/2006/main" xmlns:r="http://schemas.openxmlformats.org/officeDocument/2006/relationships" xmlns:p="http://schemas.openxmlformats.org/presentationml/2006/main">
   <p:cSld>
     <p:spTree>
@@ -6612,7 +8533,93 @@
 </p:sld>
 </file>
 
-<file path=ppt/slides/slide17.xml><?xml version="1.0" encoding="utf-8"?>
+<file path=ppt/slides/slide2.xml><?xml version="1.0" encoding="utf-8"?>
+<p:sld xmlns:a="http://schemas.openxmlformats.org/drawingml/2006/main" xmlns:r="http://schemas.openxmlformats.org/officeDocument/2006/relationships" xmlns:p="http://schemas.openxmlformats.org/presentationml/2006/main">
+  <p:cSld>
+    <p:spTree>
+      <p:nvGrpSpPr>
+        <p:cNvPr id="1" name=""/>
+        <p:cNvGrpSpPr/>
+        <p:nvPr/>
+      </p:nvGrpSpPr>
+      <p:grpSpPr>
+        <a:xfrm>
+          <a:off x="0" y="0"/>
+          <a:ext cx="0" cy="0"/>
+          <a:chOff x="0" y="0"/>
+          <a:chExt cx="0" cy="0"/>
+        </a:xfrm>
+      </p:grpSpPr>
+      <p:sp>
+        <p:nvSpPr>
+          <p:cNvPr id="2" name="Title 1"/>
+          <p:cNvSpPr>
+            <a:spLocks noGrp="1"/>
+          </p:cNvSpPr>
+          <p:nvPr>
+            <p:ph type="title"/>
+          </p:nvPr>
+        </p:nvSpPr>
+        <p:spPr/>
+        <p:txBody>
+          <a:bodyPr/>
+          <a:lstStyle/>
+          <a:p>
+            <a:r>
+              <a:rPr lang="en-US" dirty="0"/>
+              <a:t>Agenda</a:t>
+            </a:r>
+          </a:p>
+        </p:txBody>
+      </p:sp>
+      <p:sp>
+        <p:nvSpPr>
+          <p:cNvPr id="3" name="Content Placeholder 2"/>
+          <p:cNvSpPr>
+            <a:spLocks noGrp="1"/>
+          </p:cNvSpPr>
+          <p:nvPr>
+            <p:ph idx="1"/>
+          </p:nvPr>
+        </p:nvSpPr>
+        <p:spPr/>
+        <p:txBody>
+          <a:bodyPr/>
+          <a:lstStyle/>
+          <a:p>
+            <a:r>
+              <a:rPr lang="en-US" dirty="0"/>
+              <a:t>Coding Conventions, Style, Grading</a:t>
+            </a:r>
+          </a:p>
+          <a:p>
+            <a:r>
+              <a:rPr lang="en-US" dirty="0"/>
+              <a:t>Debugging</a:t>
+            </a:r>
+          </a:p>
+          <a:p>
+            <a:r>
+              <a:rPr lang="en-US" dirty="0"/>
+              <a:t>Objects and Classes</a:t>
+            </a:r>
+          </a:p>
+        </p:txBody>
+      </p:sp>
+    </p:spTree>
+    <p:extLst>
+      <p:ext uri="{BB962C8B-B14F-4D97-AF65-F5344CB8AC3E}">
+        <p14:creationId xmlns:p14="http://schemas.microsoft.com/office/powerpoint/2010/main" val="4273818967"/>
+      </p:ext>
+    </p:extLst>
+  </p:cSld>
+  <p:clrMapOvr>
+    <a:masterClrMapping/>
+  </p:clrMapOvr>
+</p:sld>
+</file>
+
+<file path=ppt/slides/slide20.xml><?xml version="1.0" encoding="utf-8"?>
 <p:sld xmlns:a="http://schemas.openxmlformats.org/drawingml/2006/main" xmlns:r="http://schemas.openxmlformats.org/officeDocument/2006/relationships" xmlns:p="http://schemas.openxmlformats.org/presentationml/2006/main">
   <p:cSld>
     <p:spTree>
@@ -6947,360 +8954,6 @@
 </p:sld>
 </file>
 
-<file path=ppt/slides/slide18.xml><?xml version="1.0" encoding="utf-8"?>
-<p:sld xmlns:a="http://schemas.openxmlformats.org/drawingml/2006/main" xmlns:r="http://schemas.openxmlformats.org/officeDocument/2006/relationships" xmlns:p="http://schemas.openxmlformats.org/presentationml/2006/main">
-  <p:cSld>
-    <p:spTree>
-      <p:nvGrpSpPr>
-        <p:cNvPr id="1" name=""/>
-        <p:cNvGrpSpPr/>
-        <p:nvPr/>
-      </p:nvGrpSpPr>
-      <p:grpSpPr>
-        <a:xfrm>
-          <a:off x="0" y="0"/>
-          <a:ext cx="0" cy="0"/>
-          <a:chOff x="0" y="0"/>
-          <a:chExt cx="0" cy="0"/>
-        </a:xfrm>
-      </p:grpSpPr>
-      <p:sp>
-        <p:nvSpPr>
-          <p:cNvPr id="2" name="Title 1"/>
-          <p:cNvSpPr>
-            <a:spLocks noGrp="1"/>
-          </p:cNvSpPr>
-          <p:nvPr>
-            <p:ph type="title"/>
-          </p:nvPr>
-        </p:nvSpPr>
-        <p:spPr/>
-        <p:txBody>
-          <a:bodyPr/>
-          <a:lstStyle/>
-          <a:p>
-            <a:r>
-              <a:rPr lang="en-US" dirty="0"/>
-              <a:t>Agenda</a:t>
-            </a:r>
-          </a:p>
-        </p:txBody>
-      </p:sp>
-      <p:sp>
-        <p:nvSpPr>
-          <p:cNvPr id="3" name="Content Placeholder 2"/>
-          <p:cNvSpPr>
-            <a:spLocks noGrp="1"/>
-          </p:cNvSpPr>
-          <p:nvPr>
-            <p:ph idx="1"/>
-          </p:nvPr>
-        </p:nvSpPr>
-        <p:spPr/>
-        <p:txBody>
-          <a:bodyPr/>
-          <a:lstStyle/>
-          <a:p>
-            <a:r>
-              <a:rPr lang="en-US" strike="sngStrike" dirty="0"/>
-              <a:t>Coding Conventions, Style, Grading</a:t>
-            </a:r>
-          </a:p>
-          <a:p>
-            <a:r>
-              <a:rPr lang="en-US" strike="sngStrike" dirty="0"/>
-              <a:t>Debugging</a:t>
-            </a:r>
-          </a:p>
-          <a:p>
-            <a:r>
-              <a:rPr lang="en-US" dirty="0"/>
-              <a:t>Objects and Classes</a:t>
-            </a:r>
-          </a:p>
-        </p:txBody>
-      </p:sp>
-    </p:spTree>
-    <p:extLst>
-      <p:ext uri="{BB962C8B-B14F-4D97-AF65-F5344CB8AC3E}">
-        <p14:creationId xmlns:p14="http://schemas.microsoft.com/office/powerpoint/2010/main" val="1338212096"/>
-      </p:ext>
-    </p:extLst>
-  </p:cSld>
-  <p:clrMapOvr>
-    <a:masterClrMapping/>
-  </p:clrMapOvr>
-</p:sld>
-</file>
-
-<file path=ppt/slides/slide19.xml><?xml version="1.0" encoding="utf-8"?>
-<p:sld xmlns:a="http://schemas.openxmlformats.org/drawingml/2006/main" xmlns:r="http://schemas.openxmlformats.org/officeDocument/2006/relationships" xmlns:p="http://schemas.openxmlformats.org/presentationml/2006/main">
-  <p:cSld>
-    <p:spTree>
-      <p:nvGrpSpPr>
-        <p:cNvPr id="1" name=""/>
-        <p:cNvGrpSpPr/>
-        <p:nvPr/>
-      </p:nvGrpSpPr>
-      <p:grpSpPr>
-        <a:xfrm>
-          <a:off x="0" y="0"/>
-          <a:ext cx="0" cy="0"/>
-          <a:chOff x="0" y="0"/>
-          <a:chExt cx="0" cy="0"/>
-        </a:xfrm>
-      </p:grpSpPr>
-      <p:sp>
-        <p:nvSpPr>
-          <p:cNvPr id="4" name="Title 3"/>
-          <p:cNvSpPr>
-            <a:spLocks noGrp="1"/>
-          </p:cNvSpPr>
-          <p:nvPr>
-            <p:ph type="ctrTitle"/>
-          </p:nvPr>
-        </p:nvSpPr>
-        <p:spPr/>
-        <p:txBody>
-          <a:bodyPr/>
-          <a:lstStyle/>
-          <a:p>
-            <a:r>
-              <a:rPr lang="en-US" dirty="0"/>
-              <a:t>Object Basics</a:t>
-            </a:r>
-          </a:p>
-        </p:txBody>
-      </p:sp>
-      <p:sp>
-        <p:nvSpPr>
-          <p:cNvPr id="5" name="Subtitle 4"/>
-          <p:cNvSpPr>
-            <a:spLocks noGrp="1"/>
-          </p:cNvSpPr>
-          <p:nvPr>
-            <p:ph type="subTitle" idx="1"/>
-          </p:nvPr>
-        </p:nvSpPr>
-        <p:spPr/>
-        <p:txBody>
-          <a:bodyPr/>
-          <a:lstStyle/>
-          <a:p>
-            <a:endParaRPr lang="en-US"/>
-          </a:p>
-        </p:txBody>
-      </p:sp>
-    </p:spTree>
-    <p:extLst>
-      <p:ext uri="{BB962C8B-B14F-4D97-AF65-F5344CB8AC3E}">
-        <p14:creationId xmlns:p14="http://schemas.microsoft.com/office/powerpoint/2010/main" val="3070909107"/>
-      </p:ext>
-    </p:extLst>
-  </p:cSld>
-  <p:clrMapOvr>
-    <a:masterClrMapping/>
-  </p:clrMapOvr>
-</p:sld>
-</file>
-
-<file path=ppt/slides/slide2.xml><?xml version="1.0" encoding="utf-8"?>
-<p:sld xmlns:a="http://schemas.openxmlformats.org/drawingml/2006/main" xmlns:r="http://schemas.openxmlformats.org/officeDocument/2006/relationships" xmlns:p="http://schemas.openxmlformats.org/presentationml/2006/main">
-  <p:cSld>
-    <p:spTree>
-      <p:nvGrpSpPr>
-        <p:cNvPr id="1" name=""/>
-        <p:cNvGrpSpPr/>
-        <p:nvPr/>
-      </p:nvGrpSpPr>
-      <p:grpSpPr>
-        <a:xfrm>
-          <a:off x="0" y="0"/>
-          <a:ext cx="0" cy="0"/>
-          <a:chOff x="0" y="0"/>
-          <a:chExt cx="0" cy="0"/>
-        </a:xfrm>
-      </p:grpSpPr>
-      <p:sp>
-        <p:nvSpPr>
-          <p:cNvPr id="2" name="Title 1"/>
-          <p:cNvSpPr>
-            <a:spLocks noGrp="1"/>
-          </p:cNvSpPr>
-          <p:nvPr>
-            <p:ph type="title"/>
-          </p:nvPr>
-        </p:nvSpPr>
-        <p:spPr/>
-        <p:txBody>
-          <a:bodyPr/>
-          <a:lstStyle/>
-          <a:p>
-            <a:r>
-              <a:rPr lang="en-US" dirty="0"/>
-              <a:t>Agenda</a:t>
-            </a:r>
-          </a:p>
-        </p:txBody>
-      </p:sp>
-      <p:sp>
-        <p:nvSpPr>
-          <p:cNvPr id="3" name="Content Placeholder 2"/>
-          <p:cNvSpPr>
-            <a:spLocks noGrp="1"/>
-          </p:cNvSpPr>
-          <p:nvPr>
-            <p:ph idx="1"/>
-          </p:nvPr>
-        </p:nvSpPr>
-        <p:spPr/>
-        <p:txBody>
-          <a:bodyPr/>
-          <a:lstStyle/>
-          <a:p>
-            <a:r>
-              <a:rPr lang="en-US" dirty="0"/>
-              <a:t>Coding Conventions, Style, Grading</a:t>
-            </a:r>
-          </a:p>
-          <a:p>
-            <a:r>
-              <a:rPr lang="en-US" dirty="0"/>
-              <a:t>Debugging</a:t>
-            </a:r>
-          </a:p>
-          <a:p>
-            <a:r>
-              <a:rPr lang="en-US" dirty="0"/>
-              <a:t>Objects and Classes</a:t>
-            </a:r>
-          </a:p>
-        </p:txBody>
-      </p:sp>
-    </p:spTree>
-    <p:extLst>
-      <p:ext uri="{BB962C8B-B14F-4D97-AF65-F5344CB8AC3E}">
-        <p14:creationId xmlns:p14="http://schemas.microsoft.com/office/powerpoint/2010/main" val="4273818967"/>
-      </p:ext>
-    </p:extLst>
-  </p:cSld>
-  <p:clrMapOvr>
-    <a:masterClrMapping/>
-  </p:clrMapOvr>
-</p:sld>
-</file>
-
-<file path=ppt/slides/slide20.xml><?xml version="1.0" encoding="utf-8"?>
-<p:sld xmlns:a="http://schemas.openxmlformats.org/drawingml/2006/main" xmlns:r="http://schemas.openxmlformats.org/officeDocument/2006/relationships" xmlns:p="http://schemas.openxmlformats.org/presentationml/2006/main">
-  <p:cSld>
-    <p:spTree>
-      <p:nvGrpSpPr>
-        <p:cNvPr id="1" name=""/>
-        <p:cNvGrpSpPr/>
-        <p:nvPr/>
-      </p:nvGrpSpPr>
-      <p:grpSpPr>
-        <a:xfrm>
-          <a:off x="0" y="0"/>
-          <a:ext cx="0" cy="0"/>
-          <a:chOff x="0" y="0"/>
-          <a:chExt cx="0" cy="0"/>
-        </a:xfrm>
-      </p:grpSpPr>
-      <p:sp>
-        <p:nvSpPr>
-          <p:cNvPr id="2" name="Title 1"/>
-          <p:cNvSpPr>
-            <a:spLocks noGrp="1"/>
-          </p:cNvSpPr>
-          <p:nvPr>
-            <p:ph type="title"/>
-          </p:nvPr>
-        </p:nvSpPr>
-        <p:spPr/>
-        <p:txBody>
-          <a:bodyPr>
-            <a:normAutofit/>
-          </a:bodyPr>
-          <a:lstStyle/>
-          <a:p>
-            <a:r>
-              <a:rPr lang="en-US" dirty="0"/>
-              <a:t>Class – What, When, Why, &amp; How?</a:t>
-            </a:r>
-          </a:p>
-        </p:txBody>
-      </p:sp>
-      <p:sp>
-        <p:nvSpPr>
-          <p:cNvPr id="3" name="Content Placeholder 2"/>
-          <p:cNvSpPr>
-            <a:spLocks noGrp="1"/>
-          </p:cNvSpPr>
-          <p:nvPr>
-            <p:ph idx="1"/>
-          </p:nvPr>
-        </p:nvSpPr>
-        <p:spPr/>
-        <p:txBody>
-          <a:bodyPr/>
-          <a:lstStyle/>
-          <a:p>
-            <a:pPr marL="0" indent="0">
-              <a:buNone/>
-            </a:pPr>
-            <a:r>
-              <a:rPr lang="en-US" dirty="0"/>
-              <a:t>What:</a:t>
-            </a:r>
-          </a:p>
-          <a:p>
-            <a:r>
-              <a:rPr lang="en-US" dirty="0"/>
-              <a:t>A blueprint for a custom </a:t>
-            </a:r>
-            <a:r>
-              <a:rPr lang="en-US" b="1" dirty="0"/>
-              <a:t>type</a:t>
-            </a:r>
-            <a:endParaRPr lang="en-US" dirty="0"/>
-          </a:p>
-          <a:p>
-            <a:pPr marL="0" indent="0">
-              <a:buNone/>
-            </a:pPr>
-            <a:r>
-              <a:rPr lang="en-US" dirty="0"/>
-              <a:t>When:</a:t>
-            </a:r>
-          </a:p>
-          <a:p>
-            <a:r>
-              <a:rPr lang="en-US" dirty="0"/>
-              <a:t>Define a class when you’re representing a concept (think nouns)</a:t>
-            </a:r>
-          </a:p>
-          <a:p>
-            <a:r>
-              <a:rPr lang="en-US" dirty="0"/>
-              <a:t>When no other existing type can do what you want/need</a:t>
-            </a:r>
-          </a:p>
-        </p:txBody>
-      </p:sp>
-    </p:spTree>
-    <p:extLst>
-      <p:ext uri="{BB962C8B-B14F-4D97-AF65-F5344CB8AC3E}">
-        <p14:creationId xmlns:p14="http://schemas.microsoft.com/office/powerpoint/2010/main" val="2434022835"/>
-      </p:ext>
-    </p:extLst>
-  </p:cSld>
-  <p:clrMapOvr>
-    <a:masterClrMapping/>
-  </p:clrMapOvr>
-</p:sld>
-</file>
-
 <file path=ppt/slides/slide21.xml><?xml version="1.0" encoding="utf-8"?>
 <p:sld xmlns:a="http://schemas.openxmlformats.org/drawingml/2006/main" xmlns:r="http://schemas.openxmlformats.org/officeDocument/2006/relationships" xmlns:p="http://schemas.openxmlformats.org/presentationml/2006/main">
   <p:cSld>
@@ -7335,6 +8988,274 @@
           <a:p>
             <a:r>
               <a:rPr lang="en-US" dirty="0"/>
+              <a:t>Agenda</a:t>
+            </a:r>
+          </a:p>
+        </p:txBody>
+      </p:sp>
+      <p:sp>
+        <p:nvSpPr>
+          <p:cNvPr id="3" name="Content Placeholder 2"/>
+          <p:cNvSpPr>
+            <a:spLocks noGrp="1"/>
+          </p:cNvSpPr>
+          <p:nvPr>
+            <p:ph idx="1"/>
+          </p:nvPr>
+        </p:nvSpPr>
+        <p:spPr/>
+        <p:txBody>
+          <a:bodyPr/>
+          <a:lstStyle/>
+          <a:p>
+            <a:r>
+              <a:rPr lang="en-US" strike="sngStrike" dirty="0"/>
+              <a:t>Coding Conventions, Style, Grading</a:t>
+            </a:r>
+          </a:p>
+          <a:p>
+            <a:r>
+              <a:rPr lang="en-US" strike="sngStrike" dirty="0"/>
+              <a:t>Debugging</a:t>
+            </a:r>
+          </a:p>
+          <a:p>
+            <a:r>
+              <a:rPr lang="en-US" dirty="0"/>
+              <a:t>Objects and Classes</a:t>
+            </a:r>
+          </a:p>
+        </p:txBody>
+      </p:sp>
+    </p:spTree>
+    <p:extLst>
+      <p:ext uri="{BB962C8B-B14F-4D97-AF65-F5344CB8AC3E}">
+        <p14:creationId xmlns:p14="http://schemas.microsoft.com/office/powerpoint/2010/main" val="1338212096"/>
+      </p:ext>
+    </p:extLst>
+  </p:cSld>
+  <p:clrMapOvr>
+    <a:masterClrMapping/>
+  </p:clrMapOvr>
+</p:sld>
+</file>
+
+<file path=ppt/slides/slide22.xml><?xml version="1.0" encoding="utf-8"?>
+<p:sld xmlns:a="http://schemas.openxmlformats.org/drawingml/2006/main" xmlns:r="http://schemas.openxmlformats.org/officeDocument/2006/relationships" xmlns:p="http://schemas.openxmlformats.org/presentationml/2006/main">
+  <p:cSld>
+    <p:spTree>
+      <p:nvGrpSpPr>
+        <p:cNvPr id="1" name=""/>
+        <p:cNvGrpSpPr/>
+        <p:nvPr/>
+      </p:nvGrpSpPr>
+      <p:grpSpPr>
+        <a:xfrm>
+          <a:off x="0" y="0"/>
+          <a:ext cx="0" cy="0"/>
+          <a:chOff x="0" y="0"/>
+          <a:chExt cx="0" cy="0"/>
+        </a:xfrm>
+      </p:grpSpPr>
+      <p:sp>
+        <p:nvSpPr>
+          <p:cNvPr id="4" name="Title 3"/>
+          <p:cNvSpPr>
+            <a:spLocks noGrp="1"/>
+          </p:cNvSpPr>
+          <p:nvPr>
+            <p:ph type="ctrTitle"/>
+          </p:nvPr>
+        </p:nvSpPr>
+        <p:spPr/>
+        <p:txBody>
+          <a:bodyPr/>
+          <a:lstStyle/>
+          <a:p>
+            <a:r>
+              <a:rPr lang="en-US" dirty="0"/>
+              <a:t>Object Basics</a:t>
+            </a:r>
+          </a:p>
+        </p:txBody>
+      </p:sp>
+      <p:sp>
+        <p:nvSpPr>
+          <p:cNvPr id="5" name="Subtitle 4"/>
+          <p:cNvSpPr>
+            <a:spLocks noGrp="1"/>
+          </p:cNvSpPr>
+          <p:nvPr>
+            <p:ph type="subTitle" idx="1"/>
+          </p:nvPr>
+        </p:nvSpPr>
+        <p:spPr/>
+        <p:txBody>
+          <a:bodyPr/>
+          <a:lstStyle/>
+          <a:p>
+            <a:endParaRPr lang="en-US"/>
+          </a:p>
+        </p:txBody>
+      </p:sp>
+    </p:spTree>
+    <p:extLst>
+      <p:ext uri="{BB962C8B-B14F-4D97-AF65-F5344CB8AC3E}">
+        <p14:creationId xmlns:p14="http://schemas.microsoft.com/office/powerpoint/2010/main" val="3070909107"/>
+      </p:ext>
+    </p:extLst>
+  </p:cSld>
+  <p:clrMapOvr>
+    <a:masterClrMapping/>
+  </p:clrMapOvr>
+</p:sld>
+</file>
+
+<file path=ppt/slides/slide23.xml><?xml version="1.0" encoding="utf-8"?>
+<p:sld xmlns:a="http://schemas.openxmlformats.org/drawingml/2006/main" xmlns:r="http://schemas.openxmlformats.org/officeDocument/2006/relationships" xmlns:p="http://schemas.openxmlformats.org/presentationml/2006/main">
+  <p:cSld>
+    <p:spTree>
+      <p:nvGrpSpPr>
+        <p:cNvPr id="1" name=""/>
+        <p:cNvGrpSpPr/>
+        <p:nvPr/>
+      </p:nvGrpSpPr>
+      <p:grpSpPr>
+        <a:xfrm>
+          <a:off x="0" y="0"/>
+          <a:ext cx="0" cy="0"/>
+          <a:chOff x="0" y="0"/>
+          <a:chExt cx="0" cy="0"/>
+        </a:xfrm>
+      </p:grpSpPr>
+      <p:sp>
+        <p:nvSpPr>
+          <p:cNvPr id="2" name="Title 1"/>
+          <p:cNvSpPr>
+            <a:spLocks noGrp="1"/>
+          </p:cNvSpPr>
+          <p:nvPr>
+            <p:ph type="title"/>
+          </p:nvPr>
+        </p:nvSpPr>
+        <p:spPr/>
+        <p:txBody>
+          <a:bodyPr>
+            <a:normAutofit/>
+          </a:bodyPr>
+          <a:lstStyle/>
+          <a:p>
+            <a:r>
+              <a:rPr lang="en-US" dirty="0"/>
+              <a:t>Class – What, When, Why, &amp; How?</a:t>
+            </a:r>
+          </a:p>
+        </p:txBody>
+      </p:sp>
+      <p:sp>
+        <p:nvSpPr>
+          <p:cNvPr id="3" name="Content Placeholder 2"/>
+          <p:cNvSpPr>
+            <a:spLocks noGrp="1"/>
+          </p:cNvSpPr>
+          <p:nvPr>
+            <p:ph idx="1"/>
+          </p:nvPr>
+        </p:nvSpPr>
+        <p:spPr/>
+        <p:txBody>
+          <a:bodyPr/>
+          <a:lstStyle/>
+          <a:p>
+            <a:pPr marL="0" indent="0">
+              <a:buNone/>
+            </a:pPr>
+            <a:r>
+              <a:rPr lang="en-US" dirty="0"/>
+              <a:t>What:</a:t>
+            </a:r>
+          </a:p>
+          <a:p>
+            <a:r>
+              <a:rPr lang="en-US" dirty="0"/>
+              <a:t>A blueprint for a custom </a:t>
+            </a:r>
+            <a:r>
+              <a:rPr lang="en-US" b="1" dirty="0"/>
+              <a:t>type</a:t>
+            </a:r>
+            <a:endParaRPr lang="en-US" dirty="0"/>
+          </a:p>
+          <a:p>
+            <a:pPr marL="0" indent="0">
+              <a:buNone/>
+            </a:pPr>
+            <a:r>
+              <a:rPr lang="en-US" dirty="0"/>
+              <a:t>When:</a:t>
+            </a:r>
+          </a:p>
+          <a:p>
+            <a:r>
+              <a:rPr lang="en-US" dirty="0"/>
+              <a:t>Define a class when you’re representing a concept (think nouns)</a:t>
+            </a:r>
+          </a:p>
+          <a:p>
+            <a:r>
+              <a:rPr lang="en-US" dirty="0"/>
+              <a:t>When no other existing type can do what you want/need</a:t>
+            </a:r>
+          </a:p>
+        </p:txBody>
+      </p:sp>
+    </p:spTree>
+    <p:extLst>
+      <p:ext uri="{BB962C8B-B14F-4D97-AF65-F5344CB8AC3E}">
+        <p14:creationId xmlns:p14="http://schemas.microsoft.com/office/powerpoint/2010/main" val="2434022835"/>
+      </p:ext>
+    </p:extLst>
+  </p:cSld>
+  <p:clrMapOvr>
+    <a:masterClrMapping/>
+  </p:clrMapOvr>
+</p:sld>
+</file>
+
+<file path=ppt/slides/slide24.xml><?xml version="1.0" encoding="utf-8"?>
+<p:sld xmlns:a="http://schemas.openxmlformats.org/drawingml/2006/main" xmlns:r="http://schemas.openxmlformats.org/officeDocument/2006/relationships" xmlns:p="http://schemas.openxmlformats.org/presentationml/2006/main">
+  <p:cSld>
+    <p:spTree>
+      <p:nvGrpSpPr>
+        <p:cNvPr id="1" name=""/>
+        <p:cNvGrpSpPr/>
+        <p:nvPr/>
+      </p:nvGrpSpPr>
+      <p:grpSpPr>
+        <a:xfrm>
+          <a:off x="0" y="0"/>
+          <a:ext cx="0" cy="0"/>
+          <a:chOff x="0" y="0"/>
+          <a:chExt cx="0" cy="0"/>
+        </a:xfrm>
+      </p:grpSpPr>
+      <p:sp>
+        <p:nvSpPr>
+          <p:cNvPr id="2" name="Title 1"/>
+          <p:cNvSpPr>
+            <a:spLocks noGrp="1"/>
+          </p:cNvSpPr>
+          <p:nvPr>
+            <p:ph type="title"/>
+          </p:nvPr>
+        </p:nvSpPr>
+        <p:spPr/>
+        <p:txBody>
+          <a:bodyPr/>
+          <a:lstStyle/>
+          <a:p>
+            <a:r>
+              <a:rPr lang="en-US" dirty="0"/>
               <a:t>Class – What, When, Why, &amp; How?</a:t>
             </a:r>
           </a:p>
@@ -7491,7 +9412,7 @@
 </p:sld>
 </file>
 
-<file path=ppt/slides/slide22.xml><?xml version="1.0" encoding="utf-8"?>
+<file path=ppt/slides/slide25.xml><?xml version="1.0" encoding="utf-8"?>
 <p:sld xmlns:a="http://schemas.openxmlformats.org/drawingml/2006/main" xmlns:r="http://schemas.openxmlformats.org/officeDocument/2006/relationships" xmlns:p="http://schemas.openxmlformats.org/presentationml/2006/main">
   <p:cSld>
     <p:spTree>
@@ -8182,7 +10103,7 @@
 </p:sld>
 </file>
 
-<file path=ppt/slides/slide23.xml><?xml version="1.0" encoding="utf-8"?>
+<file path=ppt/slides/slide26.xml><?xml version="1.0" encoding="utf-8"?>
 <p:sld xmlns:a="http://schemas.openxmlformats.org/drawingml/2006/main" xmlns:r="http://schemas.openxmlformats.org/officeDocument/2006/relationships" xmlns:p="http://schemas.openxmlformats.org/presentationml/2006/main">
   <p:cSld>
     <p:spTree>
@@ -8310,7 +10231,7 @@
 </p:sld>
 </file>
 
-<file path=ppt/slides/slide24.xml><?xml version="1.0" encoding="utf-8"?>
+<file path=ppt/slides/slide27.xml><?xml version="1.0" encoding="utf-8"?>
 <p:sld xmlns:a="http://schemas.openxmlformats.org/drawingml/2006/main" xmlns:r="http://schemas.openxmlformats.org/officeDocument/2006/relationships" xmlns:p="http://schemas.openxmlformats.org/presentationml/2006/main">
   <p:cSld>
     <p:spTree>
@@ -8692,7 +10613,7 @@
 </p:sld>
 </file>
 
-<file path=ppt/slides/slide25.xml><?xml version="1.0" encoding="utf-8"?>
+<file path=ppt/slides/slide28.xml><?xml version="1.0" encoding="utf-8"?>
 <p:sld xmlns:a="http://schemas.openxmlformats.org/drawingml/2006/main" xmlns:r="http://schemas.openxmlformats.org/officeDocument/2006/relationships" xmlns:p="http://schemas.openxmlformats.org/presentationml/2006/main">
   <p:cSld>
     <p:spTree>
@@ -8859,7 +10780,7 @@
 </p:sld>
 </file>
 
-<file path=ppt/slides/slide26.xml><?xml version="1.0" encoding="utf-8"?>
+<file path=ppt/slides/slide29.xml><?xml version="1.0" encoding="utf-8"?>
 <p:sld xmlns:a="http://schemas.openxmlformats.org/drawingml/2006/main" xmlns:r="http://schemas.openxmlformats.org/officeDocument/2006/relationships" xmlns:p="http://schemas.openxmlformats.org/presentationml/2006/main">
   <p:cSld>
     <p:spTree>
@@ -8895,7 +10816,7 @@
           </a:ln>
           <a:extLst>
             <a:ext uri="{C572A759-6A51-4108-AA02-DFA0A04FC94B}">
-              <ma14:wrappingTextBoxFlag xmlns:ma14="http://schemas.microsoft.com/office/mac/drawingml/2011/main" xmlns="" val="1"/>
+              <ma14:wrappingTextBoxFlag xmlns="" xmlns:ma14="http://schemas.microsoft.com/office/mac/drawingml/2011/main" val="1"/>
             </a:ext>
           </a:extLst>
         </p:spPr>
@@ -9117,7 +11038,7 @@
               <a:effectLst/>
               <a:extLst>
                 <a:ext uri="{C572A759-6A51-4108-AA02-DFA0A04FC94B}">
-                  <ma14:wrappingTextBoxFlag xmlns:ma14="http://schemas.microsoft.com/office/mac/drawingml/2011/main" xmlns="" val="1"/>
+                  <ma14:wrappingTextBoxFlag xmlns="" xmlns:ma14="http://schemas.microsoft.com/office/mac/drawingml/2011/main" val="1"/>
                 </a:ext>
               </a:extLst>
             </p:spPr>
@@ -9296,7 +11217,7 @@
               <a:effectLst/>
               <a:extLst>
                 <a:ext uri="{C572A759-6A51-4108-AA02-DFA0A04FC94B}">
-                  <ma14:wrappingTextBoxFlag xmlns:ma14="http://schemas.microsoft.com/office/mac/drawingml/2011/main" xmlns="" val="1"/>
+                  <ma14:wrappingTextBoxFlag xmlns="" xmlns:ma14="http://schemas.microsoft.com/office/mac/drawingml/2011/main" val="1"/>
                 </a:ext>
               </a:extLst>
             </p:spPr>
@@ -9466,7 +11387,7 @@
               <a:effectLst/>
               <a:extLst>
                 <a:ext uri="{C572A759-6A51-4108-AA02-DFA0A04FC94B}">
-                  <ma14:wrappingTextBoxFlag xmlns:ma14="http://schemas.microsoft.com/office/mac/drawingml/2011/main" xmlns="" val="1"/>
+                  <ma14:wrappingTextBoxFlag xmlns="" xmlns:ma14="http://schemas.microsoft.com/office/mac/drawingml/2011/main" val="1"/>
                 </a:ext>
               </a:extLst>
             </p:spPr>
@@ -9654,7 +11575,7 @@
               <a:effectLst/>
               <a:extLst>
                 <a:ext uri="{C572A759-6A51-4108-AA02-DFA0A04FC94B}">
-                  <ma14:wrappingTextBoxFlag xmlns:ma14="http://schemas.microsoft.com/office/mac/drawingml/2011/main" xmlns="" val="1"/>
+                  <ma14:wrappingTextBoxFlag xmlns="" xmlns:ma14="http://schemas.microsoft.com/office/mac/drawingml/2011/main" val="1"/>
                 </a:ext>
               </a:extLst>
             </p:spPr>
@@ -9799,7 +11720,7 @@
             <a:effectLst/>
             <a:extLst>
               <a:ext uri="{C572A759-6A51-4108-AA02-DFA0A04FC94B}">
-                <ma14:wrappingTextBoxFlag xmlns:ma14="http://schemas.microsoft.com/office/mac/drawingml/2011/main" xmlns="" val="1"/>
+                <ma14:wrappingTextBoxFlag xmlns="" xmlns:ma14="http://schemas.microsoft.com/office/mac/drawingml/2011/main" val="1"/>
               </a:ext>
             </a:extLst>
           </p:spPr>
@@ -9870,7 +11791,81 @@
 </p:sld>
 </file>
 
-<file path=ppt/slides/slide27.xml><?xml version="1.0" encoding="utf-8"?>
+<file path=ppt/slides/slide3.xml><?xml version="1.0" encoding="utf-8"?>
+<p:sld xmlns:a="http://schemas.openxmlformats.org/drawingml/2006/main" xmlns:r="http://schemas.openxmlformats.org/officeDocument/2006/relationships" xmlns:p="http://schemas.openxmlformats.org/presentationml/2006/main">
+  <p:cSld>
+    <p:spTree>
+      <p:nvGrpSpPr>
+        <p:cNvPr id="1" name=""/>
+        <p:cNvGrpSpPr/>
+        <p:nvPr/>
+      </p:nvGrpSpPr>
+      <p:grpSpPr>
+        <a:xfrm>
+          <a:off x="0" y="0"/>
+          <a:ext cx="0" cy="0"/>
+          <a:chOff x="0" y="0"/>
+          <a:chExt cx="0" cy="0"/>
+        </a:xfrm>
+      </p:grpSpPr>
+      <p:sp>
+        <p:nvSpPr>
+          <p:cNvPr id="4" name="Title 3"/>
+          <p:cNvSpPr>
+            <a:spLocks noGrp="1"/>
+          </p:cNvSpPr>
+          <p:nvPr>
+            <p:ph type="ctrTitle"/>
+          </p:nvPr>
+        </p:nvSpPr>
+        <p:spPr/>
+        <p:txBody>
+          <a:bodyPr/>
+          <a:lstStyle/>
+          <a:p>
+            <a:r>
+              <a:rPr lang="en-US" dirty="0"/>
+              <a:t>Writing clean code</a:t>
+            </a:r>
+          </a:p>
+        </p:txBody>
+      </p:sp>
+      <p:sp>
+        <p:nvSpPr>
+          <p:cNvPr id="5" name="Subtitle 4"/>
+          <p:cNvSpPr>
+            <a:spLocks noGrp="1"/>
+          </p:cNvSpPr>
+          <p:nvPr>
+            <p:ph type="subTitle" idx="1"/>
+          </p:nvPr>
+        </p:nvSpPr>
+        <p:spPr/>
+        <p:txBody>
+          <a:bodyPr/>
+          <a:lstStyle/>
+          <a:p>
+            <a:r>
+              <a:rPr lang="en-US" dirty="0"/>
+              <a:t>Comments are only the last resort</a:t>
+            </a:r>
+          </a:p>
+        </p:txBody>
+      </p:sp>
+    </p:spTree>
+    <p:extLst>
+      <p:ext uri="{BB962C8B-B14F-4D97-AF65-F5344CB8AC3E}">
+        <p14:creationId xmlns:p14="http://schemas.microsoft.com/office/powerpoint/2010/main" val="103186050"/>
+      </p:ext>
+    </p:extLst>
+  </p:cSld>
+  <p:clrMapOvr>
+    <a:masterClrMapping/>
+  </p:clrMapOvr>
+</p:sld>
+</file>
+
+<file path=ppt/slides/slide30.xml><?xml version="1.0" encoding="utf-8"?>
 <p:sld xmlns:a="http://schemas.openxmlformats.org/drawingml/2006/main" xmlns:r="http://schemas.openxmlformats.org/officeDocument/2006/relationships" xmlns:p="http://schemas.openxmlformats.org/presentationml/2006/main">
   <p:cSld>
     <p:spTree>
@@ -10008,7 +12003,7 @@
 </p:sld>
 </file>
 
-<file path=ppt/slides/slide28.xml><?xml version="1.0" encoding="utf-8"?>
+<file path=ppt/slides/slide31.xml><?xml version="1.0" encoding="utf-8"?>
 <p:sld xmlns:a="http://schemas.openxmlformats.org/drawingml/2006/main" xmlns:r="http://schemas.openxmlformats.org/officeDocument/2006/relationships" xmlns:p="http://schemas.openxmlformats.org/presentationml/2006/main">
   <p:cSld>
     <p:spTree>
@@ -10188,7 +12183,7 @@
 </p:sld>
 </file>
 
-<file path=ppt/slides/slide29.xml><?xml version="1.0" encoding="utf-8"?>
+<file path=ppt/slides/slide32.xml><?xml version="1.0" encoding="utf-8"?>
 <p:sld xmlns:a="http://schemas.openxmlformats.org/drawingml/2006/main" xmlns:r="http://schemas.openxmlformats.org/officeDocument/2006/relationships" xmlns:p="http://schemas.openxmlformats.org/presentationml/2006/main">
   <p:cSld>
     <p:spTree>
@@ -10233,7 +12228,7 @@
             </a:r>
             <a:r>
               <a:rPr lang="en-US" dirty="0" err="1"/>
-              <a:t>StudentAssignments</a:t>
+              <a:t>StudentGradebook</a:t>
             </a:r>
             <a:r>
               <a:rPr lang="en-US" dirty="0"/>
@@ -10270,11 +12265,11 @@
             </a:r>
             <a:r>
               <a:rPr lang="en-US" dirty="0" err="1"/>
-              <a:t>StudentAssignmentsMain</a:t>
+              <a:t>StudentGradebookMain</a:t>
             </a:r>
             <a:r>
               <a:rPr lang="en-US" dirty="0"/>
-              <a:t> to see what the class ought to do</a:t>
+              <a:t> to see what the class should do</a:t>
             </a:r>
           </a:p>
           <a:p>
@@ -10293,10 +12288,10 @@
       </p:sp>
       <p:pic>
         <p:nvPicPr>
-          <p:cNvPr id="4" name="Picture 3">
+          <p:cNvPr id="6" name="Picture 5">
             <a:extLst>
               <a:ext uri="{FF2B5EF4-FFF2-40B4-BE49-F238E27FC236}">
-                <a16:creationId xmlns:a16="http://schemas.microsoft.com/office/drawing/2014/main" id="{3B8732BA-B90F-B846-AD93-0F8E8BB360D2}"/>
+                <a16:creationId xmlns:a16="http://schemas.microsoft.com/office/drawing/2014/main" id="{FF546FA9-04D7-40C9-B042-53DA17DF7CC7}"/>
               </a:ext>
             </a:extLst>
           </p:cNvPr>
@@ -10313,196 +12308,26 @@
         </p:blipFill>
         <p:spPr>
           <a:xfrm>
-            <a:off x="5347495" y="263046"/>
-            <a:ext cx="3533458" cy="2995026"/>
+            <a:off x="5436227" y="363255"/>
+            <a:ext cx="3101717" cy="2856036"/>
           </a:xfrm>
           <a:prstGeom prst="rect">
             <a:avLst/>
           </a:prstGeom>
+          <a:ln w="38100">
+            <a:solidFill>
+              <a:schemeClr val="tx2">
+                <a:lumMod val="60000"/>
+                <a:lumOff val="40000"/>
+              </a:schemeClr>
+            </a:solidFill>
+          </a:ln>
         </p:spPr>
       </p:pic>
     </p:spTree>
     <p:extLst>
       <p:ext uri="{BB962C8B-B14F-4D97-AF65-F5344CB8AC3E}">
         <p14:creationId xmlns:p14="http://schemas.microsoft.com/office/powerpoint/2010/main" val="3549654333"/>
-      </p:ext>
-    </p:extLst>
-  </p:cSld>
-  <p:clrMapOvr>
-    <a:masterClrMapping/>
-  </p:clrMapOvr>
-</p:sld>
-</file>
-
-<file path=ppt/slides/slide3.xml><?xml version="1.0" encoding="utf-8"?>
-<p:sld xmlns:a="http://schemas.openxmlformats.org/drawingml/2006/main" xmlns:r="http://schemas.openxmlformats.org/officeDocument/2006/relationships" xmlns:p="http://schemas.openxmlformats.org/presentationml/2006/main">
-  <p:cSld>
-    <p:spTree>
-      <p:nvGrpSpPr>
-        <p:cNvPr id="1" name=""/>
-        <p:cNvGrpSpPr/>
-        <p:nvPr/>
-      </p:nvGrpSpPr>
-      <p:grpSpPr>
-        <a:xfrm>
-          <a:off x="0" y="0"/>
-          <a:ext cx="0" cy="0"/>
-          <a:chOff x="0" y="0"/>
-          <a:chExt cx="0" cy="0"/>
-        </a:xfrm>
-      </p:grpSpPr>
-      <p:sp>
-        <p:nvSpPr>
-          <p:cNvPr id="4" name="Title 3"/>
-          <p:cNvSpPr>
-            <a:spLocks noGrp="1"/>
-          </p:cNvSpPr>
-          <p:nvPr>
-            <p:ph type="ctrTitle"/>
-          </p:nvPr>
-        </p:nvSpPr>
-        <p:spPr/>
-        <p:txBody>
-          <a:bodyPr/>
-          <a:lstStyle/>
-          <a:p>
-            <a:r>
-              <a:rPr lang="en-US" dirty="0"/>
-              <a:t>Writing clean code</a:t>
-            </a:r>
-          </a:p>
-        </p:txBody>
-      </p:sp>
-      <p:sp>
-        <p:nvSpPr>
-          <p:cNvPr id="5" name="Subtitle 4"/>
-          <p:cNvSpPr>
-            <a:spLocks noGrp="1"/>
-          </p:cNvSpPr>
-          <p:nvPr>
-            <p:ph type="subTitle" idx="1"/>
-          </p:nvPr>
-        </p:nvSpPr>
-        <p:spPr/>
-        <p:txBody>
-          <a:bodyPr/>
-          <a:lstStyle/>
-          <a:p>
-            <a:r>
-              <a:rPr lang="en-US" dirty="0"/>
-              <a:t>Comments are only the last resort</a:t>
-            </a:r>
-          </a:p>
-        </p:txBody>
-      </p:sp>
-    </p:spTree>
-    <p:extLst>
-      <p:ext uri="{BB962C8B-B14F-4D97-AF65-F5344CB8AC3E}">
-        <p14:creationId xmlns:p14="http://schemas.microsoft.com/office/powerpoint/2010/main" val="103186050"/>
-      </p:ext>
-    </p:extLst>
-  </p:cSld>
-  <p:clrMapOvr>
-    <a:masterClrMapping/>
-  </p:clrMapOvr>
-</p:sld>
-</file>
-
-<file path=ppt/slides/slide30.xml><?xml version="1.0" encoding="utf-8"?>
-<p:sld xmlns:a="http://schemas.openxmlformats.org/drawingml/2006/main" xmlns:r="http://schemas.openxmlformats.org/officeDocument/2006/relationships" xmlns:p="http://schemas.openxmlformats.org/presentationml/2006/main">
-  <p:cSld>
-    <p:spTree>
-      <p:nvGrpSpPr>
-        <p:cNvPr id="1" name=""/>
-        <p:cNvGrpSpPr/>
-        <p:nvPr/>
-      </p:nvGrpSpPr>
-      <p:grpSpPr>
-        <a:xfrm>
-          <a:off x="0" y="0"/>
-          <a:ext cx="0" cy="0"/>
-          <a:chOff x="0" y="0"/>
-          <a:chExt cx="0" cy="0"/>
-        </a:xfrm>
-      </p:grpSpPr>
-      <p:sp>
-        <p:nvSpPr>
-          <p:cNvPr id="2" name="Title 1"/>
-          <p:cNvSpPr>
-            <a:spLocks noGrp="1"/>
-          </p:cNvSpPr>
-          <p:nvPr>
-            <p:ph type="title"/>
-          </p:nvPr>
-        </p:nvSpPr>
-        <p:spPr/>
-        <p:txBody>
-          <a:bodyPr>
-            <a:normAutofit fontScale="90000"/>
-          </a:bodyPr>
-          <a:lstStyle/>
-          <a:p>
-            <a:r>
-              <a:rPr lang="en-US" dirty="0"/>
-              <a:t>Now code the </a:t>
-            </a:r>
-            <a:r>
-              <a:rPr lang="en-US" dirty="0" err="1"/>
-              <a:t>StudentAssignments</a:t>
-            </a:r>
-            <a:r>
-              <a:rPr lang="en-US" dirty="0"/>
-              <a:t> class yourself</a:t>
-            </a:r>
-          </a:p>
-        </p:txBody>
-      </p:sp>
-      <p:sp>
-        <p:nvSpPr>
-          <p:cNvPr id="3" name="Content Placeholder 2"/>
-          <p:cNvSpPr>
-            <a:spLocks noGrp="1"/>
-          </p:cNvSpPr>
-          <p:nvPr>
-            <p:ph idx="1"/>
-          </p:nvPr>
-        </p:nvSpPr>
-        <p:spPr/>
-        <p:txBody>
-          <a:bodyPr/>
-          <a:lstStyle/>
-          <a:p>
-            <a:r>
-              <a:rPr lang="en-US" dirty="0"/>
-              <a:t>Uncomment the stuff in </a:t>
-            </a:r>
-            <a:r>
-              <a:rPr lang="en-US" i="1" dirty="0" err="1"/>
-              <a:t>StudentAssignmentsMain</a:t>
-            </a:r>
-            <a:r>
-              <a:rPr lang="en-US" dirty="0"/>
-              <a:t> to see what the class ought to do</a:t>
-            </a:r>
-          </a:p>
-          <a:p>
-            <a:r>
-              <a:rPr lang="en-US" dirty="0"/>
-              <a:t>Then create the class and add the constructors and methods you need</a:t>
-            </a:r>
-          </a:p>
-          <a:p>
-            <a:r>
-              <a:rPr lang="en-US" dirty="0"/>
-              <a:t>If you finish early, add a function to compute the student’s average grade</a:t>
-            </a:r>
-          </a:p>
-        </p:txBody>
-      </p:sp>
-    </p:spTree>
-    <p:extLst>
-      <p:ext uri="{BB962C8B-B14F-4D97-AF65-F5344CB8AC3E}">
-        <p14:creationId xmlns:p14="http://schemas.microsoft.com/office/powerpoint/2010/main" val="4215195480"/>
       </p:ext>
     </p:extLst>
   </p:cSld>
@@ -10945,7 +12770,7 @@
             <a:effectLst/>
             <a:extLst>
               <a:ext uri="{C572A759-6A51-4108-AA02-DFA0A04FC94B}">
-                <ma14:wrappingTextBoxFlag xmlns="" xmlns:ma14="http://schemas.microsoft.com/office/mac/drawingml/2011/main" val="1"/>
+                <ma14:wrappingTextBoxFlag xmlns:ma14="http://schemas.microsoft.com/office/mac/drawingml/2011/main" xmlns="" val="1"/>
               </a:ext>
             </a:extLst>
           </p:spPr>
@@ -11715,7 +13540,7 @@
           </a:ln>
           <a:extLst>
             <a:ext uri="{C572A759-6A51-4108-AA02-DFA0A04FC94B}">
-              <ma14:wrappingTextBoxFlag xmlns="" xmlns:ma14="http://schemas.microsoft.com/office/mac/drawingml/2011/main" val="1"/>
+              <ma14:wrappingTextBoxFlag xmlns:ma14="http://schemas.microsoft.com/office/mac/drawingml/2011/main" xmlns="" val="1"/>
             </a:ext>
           </a:extLst>
         </p:spPr>
@@ -12239,8 +14064,16 @@
               <a:defRPr sz="1800"/>
             </a:pPr>
             <a:r>
-              <a:rPr sz="2400" dirty="0"/>
-              <a:t>Use Ctrl-Shift-F in Eclipse to format your code.</a:t>
+              <a:rPr sz="2400" b="1" dirty="0">
+                <a:highlight>
+                  <a:srgbClr val="FFFF00"/>
+                </a:highlight>
+              </a:rPr>
+              <a:t>Use Ctrl-Shift-F in Eclipse to format your code</a:t>
+            </a:r>
+            <a:r>
+              <a:rPr sz="2400" b="1" dirty="0"/>
+              <a:t>.</a:t>
             </a:r>
           </a:p>
         </p:txBody>
@@ -12374,7 +14207,7 @@
             <a:effectLst/>
             <a:extLst>
               <a:ext uri="{C572A759-6A51-4108-AA02-DFA0A04FC94B}">
-                <ma14:wrappingTextBoxFlag xmlns="" xmlns:ma14="http://schemas.microsoft.com/office/mac/drawingml/2011/main" val="1"/>
+                <ma14:wrappingTextBoxFlag xmlns:ma14="http://schemas.microsoft.com/office/mac/drawingml/2011/main" xmlns="" val="1"/>
               </a:ext>
             </a:extLst>
           </p:spPr>

</xml_diff>